<commit_message>
added introduction to computers
</commit_message>
<xml_diff>
--- a/10.) Pointers/Pointers.pptx
+++ b/10.) Pointers/Pointers.pptx
@@ -6,6 +6,7 @@
   </p:sldMasterIdLst>
   <p:sldIdLst>
     <p:sldId id="256" r:id="rId2"/>
+    <p:sldId id="257" r:id="rId3"/>
   </p:sldIdLst>
   <p:sldSz cx="12192000" cy="6858000"/>
   <p:notesSz cx="6858000" cy="9144000"/>
@@ -104,6 +105,11 @@
       </a:defRPr>
     </a:lvl9pPr>
   </p:defaultTextStyle>
+  <p:extLst>
+    <p:ext uri="{EFAFB233-063F-42B5-8137-9DF3F51BA10A}">
+      <p15:sldGuideLst xmlns:p15="http://schemas.microsoft.com/office/powerpoint/2012/main"/>
+    </p:ext>
+  </p:extLst>
 </p:presentation>
 </file>
 
@@ -112,9 +118,15 @@
   <p:cSld name="Title Slide">
     <p:bg>
       <p:bgPr>
-        <a:solidFill>
-          <a:schemeClr val="bg2"/>
-        </a:solidFill>
+        <a:blipFill dpi="0" rotWithShape="1">
+          <a:blip r:embed="rId2">
+            <a:lum/>
+          </a:blip>
+          <a:srcRect/>
+          <a:stretch>
+            <a:fillRect t="-9000" b="-9000"/>
+          </a:stretch>
+        </a:blipFill>
         <a:effectLst/>
       </p:bgPr>
     </p:bg>
@@ -411,7 +423,7 @@
               </a:pathLst>
             </a:custGeom>
             <a:solidFill>
-              <a:schemeClr val="tx2"/>
+              <a:schemeClr val="bg1"/>
             </a:solidFill>
             <a:ln w="0">
               <a:noFill/>
@@ -421,6 +433,13 @@
               <a:tailEnd/>
             </a:ln>
           </p:spPr>
+          <p:txBody>
+            <a:bodyPr/>
+            <a:lstStyle/>
+            <a:p>
+              <a:endParaRPr lang="en-US" dirty="0"/>
+            </a:p>
+          </p:txBody>
         </p:sp>
         <p:sp>
           <p:nvSpPr>
@@ -469,7 +488,7 @@
               </a:pathLst>
             </a:custGeom>
             <a:solidFill>
-              <a:schemeClr val="tx2"/>
+              <a:schemeClr val="bg1"/>
             </a:solidFill>
             <a:ln w="0">
               <a:noFill/>
@@ -479,6 +498,13 @@
               <a:tailEnd/>
             </a:ln>
           </p:spPr>
+          <p:txBody>
+            <a:bodyPr/>
+            <a:lstStyle/>
+            <a:p>
+              <a:endParaRPr lang="en-US" dirty="0"/>
+            </a:p>
+          </p:txBody>
         </p:sp>
       </p:grpSp>
     </p:spTree>
@@ -1004,7 +1030,7 @@
   <p:cSld name="Section Header">
     <p:bg>
       <p:bgRef idx="1001">
-        <a:schemeClr val="bg2"/>
+        <a:schemeClr val="bg1"/>
       </p:bgRef>
     </p:bg>
     <p:spTree>
@@ -1350,7 +1376,7 @@
     </p:spTree>
   </p:cSld>
   <p:clrMapOvr>
-    <a:overrideClrMapping bg1="dk1" tx1="lt1" bg2="dk2" tx2="lt2" accent1="accent1" accent2="accent2" accent3="accent3" accent4="accent4" accent5="accent5" accent6="accent6" hlink="hlink" folHlink="folHlink"/>
+    <a:overrideClrMapping bg1="lt1" tx1="dk1" bg2="lt2" tx2="dk2" accent1="accent1" accent2="accent2" accent3="accent3" accent4="accent4" accent5="accent5" accent6="accent6" hlink="hlink" folHlink="folHlink"/>
   </p:clrMapOvr>
 </p:sldLayout>
 </file>
@@ -3180,10 +3206,9 @@
           <a:lstStyle/>
           <a:p>
             <a:r>
-              <a:rPr lang="en-US"/>
+              <a:rPr lang="en-US" dirty="0"/>
               <a:t>Click to edit Master title style</a:t>
             </a:r>
-            <a:endParaRPr lang="en-US" dirty="0"/>
           </a:p>
         </p:txBody>
       </p:sp>
@@ -3214,38 +3239,37 @@
           <a:p>
             <a:pPr lvl="0"/>
             <a:r>
-              <a:rPr lang="en-US"/>
+              <a:rPr lang="en-US" dirty="0"/>
               <a:t>Click to edit Master text styles</a:t>
             </a:r>
           </a:p>
           <a:p>
             <a:pPr lvl="1"/>
             <a:r>
-              <a:rPr lang="en-US"/>
+              <a:rPr lang="en-US" dirty="0"/>
               <a:t>Second level</a:t>
             </a:r>
           </a:p>
           <a:p>
             <a:pPr lvl="2"/>
             <a:r>
-              <a:rPr lang="en-US"/>
+              <a:rPr lang="en-US" dirty="0"/>
               <a:t>Third level</a:t>
             </a:r>
           </a:p>
           <a:p>
             <a:pPr lvl="3"/>
             <a:r>
-              <a:rPr lang="en-US"/>
+              <a:rPr lang="en-US" dirty="0"/>
               <a:t>Fourth level</a:t>
             </a:r>
           </a:p>
           <a:p>
             <a:pPr lvl="4"/>
             <a:r>
-              <a:rPr lang="en-US"/>
+              <a:rPr lang="en-US" dirty="0"/>
               <a:t>Fifth level</a:t>
             </a:r>
-            <a:endParaRPr lang="en-US" dirty="0"/>
           </a:p>
         </p:txBody>
       </p:sp>
@@ -3432,7 +3456,7 @@
           <a:solidFill>
             <a:schemeClr val="tx2"/>
           </a:solidFill>
-          <a:latin typeface="+mj-lt"/>
+          <a:latin typeface="Avenir LT Std 55 Roman" panose="020B0503020203020204" pitchFamily="34" charset="0"/>
           <a:ea typeface="+mj-ea"/>
           <a:cs typeface="+mj-cs"/>
         </a:defRPr>
@@ -3455,7 +3479,7 @@
           <a:solidFill>
             <a:schemeClr val="tx2"/>
           </a:solidFill>
-          <a:latin typeface="+mn-lt"/>
+          <a:latin typeface="Avenir LT Std 35 Light" panose="020B0402020203020204" pitchFamily="34" charset="0"/>
           <a:ea typeface="+mn-ea"/>
           <a:cs typeface="+mn-cs"/>
         </a:defRPr>
@@ -3476,7 +3500,7 @@
           <a:solidFill>
             <a:schemeClr val="tx2"/>
           </a:solidFill>
-          <a:latin typeface="+mn-lt"/>
+          <a:latin typeface="Avenir LT Std 35 Light" panose="020B0402020203020204" pitchFamily="34" charset="0"/>
           <a:ea typeface="+mn-ea"/>
           <a:cs typeface="+mn-cs"/>
         </a:defRPr>
@@ -3497,7 +3521,7 @@
           <a:solidFill>
             <a:schemeClr val="tx2"/>
           </a:solidFill>
-          <a:latin typeface="+mn-lt"/>
+          <a:latin typeface="Avenir LT Std 35 Light" panose="020B0402020203020204" pitchFamily="34" charset="0"/>
           <a:ea typeface="+mn-ea"/>
           <a:cs typeface="+mn-cs"/>
         </a:defRPr>
@@ -3518,7 +3542,7 @@
           <a:solidFill>
             <a:schemeClr val="tx2"/>
           </a:solidFill>
-          <a:latin typeface="+mn-lt"/>
+          <a:latin typeface="Avenir LT Std 35 Light" panose="020B0402020203020204" pitchFamily="34" charset="0"/>
           <a:ea typeface="+mn-ea"/>
           <a:cs typeface="+mn-cs"/>
         </a:defRPr>
@@ -3539,7 +3563,7 @@
           <a:solidFill>
             <a:schemeClr val="tx2"/>
           </a:solidFill>
-          <a:latin typeface="+mn-lt"/>
+          <a:latin typeface="Avenir LT Std 35 Light" panose="020B0402020203020204" pitchFamily="34" charset="0"/>
           <a:ea typeface="+mn-ea"/>
           <a:cs typeface="+mn-cs"/>
         </a:defRPr>
@@ -3807,12 +3831,29 @@
             <p:ph type="ctrTitle"/>
           </p:nvPr>
         </p:nvSpPr>
-        <p:spPr/>
+        <p:spPr>
+          <a:xfrm>
+            <a:off x="2680163" y="1965960"/>
+            <a:ext cx="6831673" cy="1257780"/>
+          </a:xfrm>
+          <a:solidFill>
+            <a:schemeClr val="tx1">
+              <a:alpha val="75000"/>
+            </a:schemeClr>
+          </a:solidFill>
+        </p:spPr>
         <p:txBody>
           <a:bodyPr/>
           <a:lstStyle/>
           <a:p>
-            <a:endParaRPr lang="en-US" cap="none" dirty="0"/>
+            <a:r>
+              <a:rPr lang="en-US" cap="none" dirty="0">
+                <a:solidFill>
+                  <a:schemeClr val="bg1"/>
+                </a:solidFill>
+              </a:rPr>
+              <a:t>Pointers</a:t>
+            </a:r>
           </a:p>
         </p:txBody>
       </p:sp>
@@ -3832,12 +3873,46 @@
             <p:ph type="subTitle" idx="1"/>
           </p:nvPr>
         </p:nvSpPr>
-        <p:spPr/>
+        <p:spPr>
+          <a:xfrm>
+            <a:off x="2680163" y="3223740"/>
+            <a:ext cx="6831673" cy="1496850"/>
+          </a:xfrm>
+          <a:solidFill>
+            <a:schemeClr val="tx1">
+              <a:alpha val="75000"/>
+            </a:schemeClr>
+          </a:solidFill>
+        </p:spPr>
         <p:txBody>
           <a:bodyPr/>
           <a:lstStyle/>
           <a:p>
-            <a:endParaRPr lang="en-US"/>
+            <a:r>
+              <a:rPr lang="en-US" sz="2000" dirty="0">
+                <a:solidFill>
+                  <a:schemeClr val="bg1"/>
+                </a:solidFill>
+              </a:rPr>
+              <a:t>If only they pointed you in the right direction</a:t>
+            </a:r>
+          </a:p>
+          <a:p>
+            <a:endParaRPr lang="en-US" sz="2000" dirty="0">
+              <a:solidFill>
+                <a:schemeClr val="bg1"/>
+              </a:solidFill>
+            </a:endParaRPr>
+          </a:p>
+          <a:p>
+            <a:r>
+              <a:rPr lang="en-US" dirty="0">
+                <a:solidFill>
+                  <a:schemeClr val="bg1"/>
+                </a:solidFill>
+              </a:rPr>
+              <a:t>Prepared by Simeon Ramjit</a:t>
+            </a:r>
           </a:p>
         </p:txBody>
       </p:sp>
@@ -3845,6 +3920,86 @@
     <p:extLst>
       <p:ext uri="{BB962C8B-B14F-4D97-AF65-F5344CB8AC3E}">
         <p14:creationId xmlns:p14="http://schemas.microsoft.com/office/powerpoint/2010/main" val="993668438"/>
+      </p:ext>
+    </p:extLst>
+  </p:cSld>
+  <p:clrMapOvr>
+    <a:masterClrMapping/>
+  </p:clrMapOvr>
+</p:sld>
+</file>
+
+<file path=ppt/slides/slide2.xml><?xml version="1.0" encoding="utf-8"?>
+<p:sld xmlns:a="http://schemas.openxmlformats.org/drawingml/2006/main" xmlns:r="http://schemas.openxmlformats.org/officeDocument/2006/relationships" xmlns:p="http://schemas.openxmlformats.org/presentationml/2006/main">
+  <p:cSld>
+    <p:spTree>
+      <p:nvGrpSpPr>
+        <p:cNvPr id="1" name=""/>
+        <p:cNvGrpSpPr/>
+        <p:nvPr/>
+      </p:nvGrpSpPr>
+      <p:grpSpPr>
+        <a:xfrm>
+          <a:off x="0" y="0"/>
+          <a:ext cx="0" cy="0"/>
+          <a:chOff x="0" y="0"/>
+          <a:chExt cx="0" cy="0"/>
+        </a:xfrm>
+      </p:grpSpPr>
+      <p:sp>
+        <p:nvSpPr>
+          <p:cNvPr id="2" name="Title 1">
+            <a:extLst>
+              <a:ext uri="{FF2B5EF4-FFF2-40B4-BE49-F238E27FC236}">
+                <a16:creationId xmlns:a16="http://schemas.microsoft.com/office/drawing/2014/main" id="{370A12F9-281C-46C8-AE2C-15D1910958B0}"/>
+              </a:ext>
+            </a:extLst>
+          </p:cNvPr>
+          <p:cNvSpPr>
+            <a:spLocks noGrp="1"/>
+          </p:cNvSpPr>
+          <p:nvPr>
+            <p:ph type="title"/>
+          </p:nvPr>
+        </p:nvSpPr>
+        <p:spPr/>
+        <p:txBody>
+          <a:bodyPr/>
+          <a:lstStyle/>
+          <a:p>
+            <a:endParaRPr lang="en-US"/>
+          </a:p>
+        </p:txBody>
+      </p:sp>
+      <p:sp>
+        <p:nvSpPr>
+          <p:cNvPr id="3" name="Content Placeholder 2">
+            <a:extLst>
+              <a:ext uri="{FF2B5EF4-FFF2-40B4-BE49-F238E27FC236}">
+                <a16:creationId xmlns:a16="http://schemas.microsoft.com/office/drawing/2014/main" id="{2C06C73B-97C8-4203-B063-FF8DC01B180D}"/>
+              </a:ext>
+            </a:extLst>
+          </p:cNvPr>
+          <p:cNvSpPr>
+            <a:spLocks noGrp="1"/>
+          </p:cNvSpPr>
+          <p:nvPr>
+            <p:ph idx="1"/>
+          </p:nvPr>
+        </p:nvSpPr>
+        <p:spPr/>
+        <p:txBody>
+          <a:bodyPr/>
+          <a:lstStyle/>
+          <a:p>
+            <a:endParaRPr lang="en-US"/>
+          </a:p>
+        </p:txBody>
+      </p:sp>
+    </p:spTree>
+    <p:extLst>
+      <p:ext uri="{BB962C8B-B14F-4D97-AF65-F5344CB8AC3E}">
+        <p14:creationId xmlns:p14="http://schemas.microsoft.com/office/powerpoint/2010/main" val="1842587426"/>
       </p:ext>
     </p:extLst>
   </p:cSld>

</xml_diff>

<commit_message>
added introduction to computers and pointers
</commit_message>
<xml_diff>
--- a/10.) Pointers/Pointers.pptx
+++ b/10.) Pointers/Pointers.pptx
@@ -7,6 +7,16 @@
   <p:sldIdLst>
     <p:sldId id="256" r:id="rId2"/>
     <p:sldId id="257" r:id="rId3"/>
+    <p:sldId id="271" r:id="rId4"/>
+    <p:sldId id="272" r:id="rId5"/>
+    <p:sldId id="273" r:id="rId6"/>
+    <p:sldId id="274" r:id="rId7"/>
+    <p:sldId id="275" r:id="rId8"/>
+    <p:sldId id="276" r:id="rId9"/>
+    <p:sldId id="277" r:id="rId10"/>
+    <p:sldId id="278" r:id="rId11"/>
+    <p:sldId id="279" r:id="rId12"/>
+    <p:sldId id="270" r:id="rId13"/>
   </p:sldIdLst>
   <p:sldSz cx="12192000" cy="6858000"/>
   <p:notesSz cx="6858000" cy="9144000"/>
@@ -116,20 +126,6 @@
 <file path=ppt/slideLayouts/slideLayout1.xml><?xml version="1.0" encoding="utf-8"?>
 <p:sldLayout xmlns:a="http://schemas.openxmlformats.org/drawingml/2006/main" xmlns:r="http://schemas.openxmlformats.org/officeDocument/2006/relationships" xmlns:p="http://schemas.openxmlformats.org/presentationml/2006/main" showMasterSp="0" type="title" preserve="1">
   <p:cSld name="Title Slide">
-    <p:bg>
-      <p:bgPr>
-        <a:blipFill dpi="0" rotWithShape="1">
-          <a:blip r:embed="rId2">
-            <a:lum/>
-          </a:blip>
-          <a:srcRect/>
-          <a:stretch>
-            <a:fillRect t="-9000" b="-9000"/>
-          </a:stretch>
-        </a:blipFill>
-        <a:effectLst/>
-      </p:bgPr>
-    </p:bg>
     <p:spTree>
       <p:nvGrpSpPr>
         <p:cNvPr id="1" name=""/>
@@ -289,7 +285,7 @@
             <a:fld id="{87DE6118-2437-4B30-8E3C-4D2BE6020583}" type="datetimeFigureOut">
               <a:rPr lang="en-US" dirty="0"/>
               <a:pPr/>
-              <a:t>2020-01-22</a:t>
+              <a:t>2020-01-23</a:t>
             </a:fld>
             <a:endParaRPr lang="en-US" dirty="0"/>
           </a:p>
@@ -510,7 +506,7 @@
     </p:spTree>
   </p:cSld>
   <p:clrMapOvr>
-    <a:overrideClrMapping bg1="lt1" tx1="dk1" bg2="lt2" tx2="dk2" accent1="accent1" accent2="accent2" accent3="accent3" accent4="accent4" accent5="accent5" accent6="accent6" hlink="hlink" folHlink="folHlink"/>
+    <a:masterClrMapping/>
   </p:clrMapOvr>
 </p:sldLayout>
 </file>
@@ -629,7 +625,7 @@
           <a:p>
             <a:fld id="{87DE6118-2437-4B30-8E3C-4D2BE6020583}" type="datetimeFigureOut">
               <a:rPr lang="en-US" dirty="0"/>
-              <a:t>2020-01-22</a:t>
+              <a:t>2020-01-23</a:t>
             </a:fld>
             <a:endParaRPr lang="en-US" dirty="0"/>
           </a:p>
@@ -804,7 +800,7 @@
           <a:p>
             <a:fld id="{87DE6118-2437-4B30-8E3C-4D2BE6020583}" type="datetimeFigureOut">
               <a:rPr lang="en-US" dirty="0"/>
-              <a:t>2020-01-22</a:t>
+              <a:t>2020-01-23</a:t>
             </a:fld>
             <a:endParaRPr lang="en-US" dirty="0"/>
           </a:p>
@@ -969,7 +965,7 @@
           <a:p>
             <a:fld id="{87DE6118-2437-4B30-8E3C-4D2BE6020583}" type="datetimeFigureOut">
               <a:rPr lang="en-US" dirty="0"/>
-              <a:t>2020-01-22</a:t>
+              <a:t>2020-01-23</a:t>
             </a:fld>
             <a:endParaRPr lang="en-US" dirty="0"/>
           </a:p>
@@ -1028,11 +1024,6 @@
 <file path=ppt/slideLayouts/slideLayout3.xml><?xml version="1.0" encoding="utf-8"?>
 <p:sldLayout xmlns:a="http://schemas.openxmlformats.org/drawingml/2006/main" xmlns:r="http://schemas.openxmlformats.org/officeDocument/2006/relationships" xmlns:p="http://schemas.openxmlformats.org/presentationml/2006/main" showMasterSp="0" type="secHead" preserve="1">
   <p:cSld name="Section Header">
-    <p:bg>
-      <p:bgRef idx="1001">
-        <a:schemeClr val="bg1"/>
-      </p:bgRef>
-    </p:bg>
     <p:spTree>
       <p:nvGrpSpPr>
         <p:cNvPr id="1" name=""/>
@@ -1242,7 +1233,7 @@
             <a:fld id="{87DE6118-2437-4B30-8E3C-4D2BE6020583}" type="datetimeFigureOut">
               <a:rPr lang="en-US" dirty="0"/>
               <a:pPr/>
-              <a:t>2020-01-22</a:t>
+              <a:t>2020-01-23</a:t>
             </a:fld>
             <a:endParaRPr lang="en-US" dirty="0"/>
           </a:p>
@@ -1376,7 +1367,7 @@
     </p:spTree>
   </p:cSld>
   <p:clrMapOvr>
-    <a:overrideClrMapping bg1="lt1" tx1="dk1" bg2="lt2" tx2="dk2" accent1="accent1" accent2="accent2" accent3="accent3" accent4="accent4" accent5="accent5" accent6="accent6" hlink="hlink" folHlink="folHlink"/>
+    <a:masterClrMapping/>
   </p:clrMapOvr>
 </p:sldLayout>
 </file>
@@ -1632,7 +1623,7 @@
           <a:p>
             <a:fld id="{87DE6118-2437-4B30-8E3C-4D2BE6020583}" type="datetimeFigureOut">
               <a:rPr lang="en-US" dirty="0"/>
-              <a:t>2020-01-22</a:t>
+              <a:t>2020-01-23</a:t>
             </a:fld>
             <a:endParaRPr lang="en-US" dirty="0"/>
           </a:p>
@@ -2104,7 +2095,7 @@
           <a:p>
             <a:fld id="{87DE6118-2437-4B30-8E3C-4D2BE6020583}" type="datetimeFigureOut">
               <a:rPr lang="en-US" dirty="0"/>
-              <a:t>2020-01-22</a:t>
+              <a:t>2020-01-23</a:t>
             </a:fld>
             <a:endParaRPr lang="en-US" dirty="0"/>
           </a:p>
@@ -2217,7 +2208,7 @@
           <a:p>
             <a:fld id="{87DE6118-2437-4B30-8E3C-4D2BE6020583}" type="datetimeFigureOut">
               <a:rPr lang="en-US" dirty="0"/>
-              <a:t>2020-01-22</a:t>
+              <a:t>2020-01-23</a:t>
             </a:fld>
             <a:endParaRPr lang="en-US" dirty="0"/>
           </a:p>
@@ -2307,7 +2298,7 @@
           <a:p>
             <a:fld id="{87DE6118-2437-4B30-8E3C-4D2BE6020583}" type="datetimeFigureOut">
               <a:rPr lang="en-US" dirty="0"/>
-              <a:t>2020-01-22</a:t>
+              <a:t>2020-01-23</a:t>
             </a:fld>
             <a:endParaRPr lang="en-US" dirty="0"/>
           </a:p>
@@ -2649,7 +2640,7 @@
             <a:fld id="{87DE6118-2437-4B30-8E3C-4D2BE6020583}" type="datetimeFigureOut">
               <a:rPr lang="en-US" dirty="0"/>
               <a:pPr/>
-              <a:t>2020-01-22</a:t>
+              <a:t>2020-01-23</a:t>
             </a:fld>
             <a:endParaRPr lang="en-US" dirty="0"/>
           </a:p>
@@ -3034,7 +3025,7 @@
             <a:fld id="{87DE6118-2437-4B30-8E3C-4D2BE6020583}" type="datetimeFigureOut">
               <a:rPr lang="en-US" dirty="0"/>
               <a:pPr/>
-              <a:t>2020-01-22</a:t>
+              <a:t>2020-01-23</a:t>
             </a:fld>
             <a:endParaRPr lang="en-US" dirty="0"/>
           </a:p>
@@ -3159,12 +3150,9 @@
 <p:sldMaster xmlns:a="http://schemas.openxmlformats.org/drawingml/2006/main" xmlns:r="http://schemas.openxmlformats.org/officeDocument/2006/relationships" xmlns:p="http://schemas.openxmlformats.org/presentationml/2006/main">
   <p:cSld>
     <p:bg>
-      <p:bgPr>
-        <a:solidFill>
-          <a:schemeClr val="bg2"/>
-        </a:solidFill>
-        <a:effectLst/>
-      </p:bgPr>
+      <p:bgRef idx="1001">
+        <a:schemeClr val="bg1"/>
+      </p:bgRef>
     </p:bg>
     <p:spTree>
       <p:nvGrpSpPr>
@@ -3307,7 +3295,7 @@
             <a:fld id="{87DE6118-2437-4B30-8E3C-4D2BE6020583}" type="datetimeFigureOut">
               <a:rPr lang="en-US" dirty="0"/>
               <a:pPr/>
-              <a:t>2020-01-22</a:t>
+              <a:t>2020-01-23</a:t>
             </a:fld>
             <a:endParaRPr lang="en-US" dirty="0"/>
           </a:p>
@@ -3403,7 +3391,7 @@
             <a:avLst/>
           </a:prstGeom>
           <a:solidFill>
-            <a:schemeClr val="tx2"/>
+            <a:schemeClr val="tx1"/>
           </a:solidFill>
           <a:ln>
             <a:noFill/>
@@ -3801,6 +3789,20 @@
 <file path=ppt/slides/slide1.xml><?xml version="1.0" encoding="utf-8"?>
 <p:sld xmlns:a="http://schemas.openxmlformats.org/drawingml/2006/main" xmlns:r="http://schemas.openxmlformats.org/officeDocument/2006/relationships" xmlns:p="http://schemas.openxmlformats.org/presentationml/2006/main">
   <p:cSld>
+    <p:bg>
+      <p:bgPr>
+        <a:blipFill dpi="0" rotWithShape="1">
+          <a:blip r:embed="rId2">
+            <a:lum/>
+          </a:blip>
+          <a:srcRect/>
+          <a:stretch>
+            <a:fillRect t="-9000" b="-9000"/>
+          </a:stretch>
+        </a:blipFill>
+        <a:effectLst/>
+      </p:bgPr>
+    </p:bg>
     <p:spTree>
       <p:nvGrpSpPr>
         <p:cNvPr id="1" name=""/>
@@ -3920,6 +3922,748 @@
     <p:extLst>
       <p:ext uri="{BB962C8B-B14F-4D97-AF65-F5344CB8AC3E}">
         <p14:creationId xmlns:p14="http://schemas.microsoft.com/office/powerpoint/2010/main" val="993668438"/>
+      </p:ext>
+    </p:extLst>
+  </p:cSld>
+  <p:clrMapOvr>
+    <a:masterClrMapping/>
+  </p:clrMapOvr>
+</p:sld>
+</file>
+
+<file path=ppt/slides/slide10.xml><?xml version="1.0" encoding="utf-8"?>
+<p:sld xmlns:a="http://schemas.openxmlformats.org/drawingml/2006/main" xmlns:r="http://schemas.openxmlformats.org/officeDocument/2006/relationships" xmlns:p="http://schemas.openxmlformats.org/presentationml/2006/main">
+  <p:cSld>
+    <p:spTree>
+      <p:nvGrpSpPr>
+        <p:cNvPr id="1" name=""/>
+        <p:cNvGrpSpPr/>
+        <p:nvPr/>
+      </p:nvGrpSpPr>
+      <p:grpSpPr>
+        <a:xfrm>
+          <a:off x="0" y="0"/>
+          <a:ext cx="0" cy="0"/>
+          <a:chOff x="0" y="0"/>
+          <a:chExt cx="0" cy="0"/>
+        </a:xfrm>
+      </p:grpSpPr>
+      <p:sp>
+        <p:nvSpPr>
+          <p:cNvPr id="2" name="Title 1">
+            <a:extLst>
+              <a:ext uri="{FF2B5EF4-FFF2-40B4-BE49-F238E27FC236}">
+                <a16:creationId xmlns:a16="http://schemas.microsoft.com/office/drawing/2014/main" id="{370A12F9-281C-46C8-AE2C-15D1910958B0}"/>
+              </a:ext>
+            </a:extLst>
+          </p:cNvPr>
+          <p:cNvSpPr>
+            <a:spLocks noGrp="1"/>
+          </p:cNvSpPr>
+          <p:nvPr>
+            <p:ph type="title"/>
+          </p:nvPr>
+        </p:nvSpPr>
+        <p:spPr/>
+        <p:txBody>
+          <a:bodyPr/>
+          <a:lstStyle/>
+          <a:p>
+            <a:r>
+              <a:rPr lang="en-US" dirty="0"/>
+              <a:t>Pointers in C++</a:t>
+            </a:r>
+          </a:p>
+        </p:txBody>
+      </p:sp>
+      <p:sp>
+        <p:nvSpPr>
+          <p:cNvPr id="3" name="Content Placeholder 2">
+            <a:extLst>
+              <a:ext uri="{FF2B5EF4-FFF2-40B4-BE49-F238E27FC236}">
+                <a16:creationId xmlns:a16="http://schemas.microsoft.com/office/drawing/2014/main" id="{2C06C73B-97C8-4203-B063-FF8DC01B180D}"/>
+              </a:ext>
+            </a:extLst>
+          </p:cNvPr>
+          <p:cNvSpPr>
+            <a:spLocks noGrp="1"/>
+          </p:cNvSpPr>
+          <p:nvPr>
+            <p:ph idx="1"/>
+          </p:nvPr>
+        </p:nvSpPr>
+        <p:spPr>
+          <a:xfrm>
+            <a:off x="1371600" y="1638300"/>
+            <a:ext cx="9601200" cy="4796790"/>
+          </a:xfrm>
+        </p:spPr>
+        <p:txBody>
+          <a:bodyPr>
+            <a:normAutofit/>
+          </a:bodyPr>
+          <a:lstStyle/>
+          <a:p>
+            <a:pPr>
+              <a:lnSpc>
+                <a:spcPct val="150000"/>
+              </a:lnSpc>
+            </a:pPr>
+            <a:r>
+              <a:rPr lang="en-US" dirty="0"/>
+              <a:t>Sometimes we need to initialize a pointer but we don’t have use for it yet. In that case there exists </a:t>
+            </a:r>
+            <a:r>
+              <a:rPr lang="en-US" dirty="0" err="1">
+                <a:latin typeface="Consolas" panose="020B0609020204030204" pitchFamily="49" charset="0"/>
+              </a:rPr>
+              <a:t>nullptr</a:t>
+            </a:r>
+            <a:endParaRPr lang="en-US" dirty="0">
+              <a:latin typeface="Consolas" panose="020B0609020204030204" pitchFamily="49" charset="0"/>
+            </a:endParaRPr>
+          </a:p>
+          <a:p>
+            <a:pPr>
+              <a:lnSpc>
+                <a:spcPct val="150000"/>
+              </a:lnSpc>
+            </a:pPr>
+            <a:endParaRPr lang="en-US" dirty="0"/>
+          </a:p>
+          <a:p>
+            <a:pPr>
+              <a:lnSpc>
+                <a:spcPct val="150000"/>
+              </a:lnSpc>
+            </a:pPr>
+            <a:r>
+              <a:rPr lang="en-US" dirty="0"/>
+              <a:t>Do not use a pointer that has been initialized with </a:t>
+            </a:r>
+            <a:r>
+              <a:rPr lang="en-US" dirty="0" err="1">
+                <a:solidFill>
+                  <a:srgbClr val="0000FF"/>
+                </a:solidFill>
+                <a:latin typeface="Consolas" panose="020B0609020204030204" pitchFamily="49" charset="0"/>
+              </a:rPr>
+              <a:t>nullptr</a:t>
+            </a:r>
+            <a:r>
+              <a:rPr lang="en-US" dirty="0"/>
+              <a:t> unless a valid value have been written to it. That will result in undefined behaviour</a:t>
+            </a:r>
+          </a:p>
+          <a:p>
+            <a:pPr>
+              <a:lnSpc>
+                <a:spcPct val="150000"/>
+              </a:lnSpc>
+            </a:pPr>
+            <a:endParaRPr lang="en-US" dirty="0"/>
+          </a:p>
+        </p:txBody>
+      </p:sp>
+      <p:sp>
+        <p:nvSpPr>
+          <p:cNvPr id="4" name="Rectangle 1">
+            <a:extLst>
+              <a:ext uri="{FF2B5EF4-FFF2-40B4-BE49-F238E27FC236}">
+                <a16:creationId xmlns:a16="http://schemas.microsoft.com/office/drawing/2014/main" id="{E05D0DAC-40AC-4E8A-B73A-3D4ED0612085}"/>
+              </a:ext>
+            </a:extLst>
+          </p:cNvPr>
+          <p:cNvSpPr>
+            <a:spLocks noChangeArrowheads="1"/>
+          </p:cNvSpPr>
+          <p:nvPr/>
+        </p:nvSpPr>
+        <p:spPr bwMode="auto">
+          <a:xfrm>
+            <a:off x="4310896" y="2724090"/>
+            <a:ext cx="3570208" cy="400110"/>
+          </a:xfrm>
+          <a:prstGeom prst="rect">
+            <a:avLst/>
+          </a:prstGeom>
+          <a:solidFill>
+            <a:srgbClr val="FFFFFF"/>
+          </a:solidFill>
+          <a:ln>
+            <a:noFill/>
+          </a:ln>
+          <a:effectLst/>
+          <a:extLst>
+            <a:ext uri="{91240B29-F687-4F45-9708-019B960494DF}">
+              <a14:hiddenLine xmlns:a14="http://schemas.microsoft.com/office/drawing/2010/main" w="9525">
+                <a:solidFill>
+                  <a:schemeClr val="tx1"/>
+                </a:solidFill>
+                <a:miter lim="800000"/>
+                <a:headEnd/>
+                <a:tailEnd/>
+              </a14:hiddenLine>
+            </a:ext>
+            <a:ext uri="{AF507438-7753-43E0-B8FC-AC1667EBCBE1}">
+              <a14:hiddenEffects xmlns:a14="http://schemas.microsoft.com/office/drawing/2010/main">
+                <a:effectLst>
+                  <a:outerShdw dist="35921" dir="2700000" algn="ctr" rotWithShape="0">
+                    <a:schemeClr val="bg2"/>
+                  </a:outerShdw>
+                </a:effectLst>
+              </a14:hiddenEffects>
+            </a:ext>
+          </a:extLst>
+        </p:spPr>
+        <p:txBody>
+          <a:bodyPr vert="horz" wrap="none" lIns="91440" tIns="45720" rIns="91440" bIns="45720" numCol="1" anchor="ctr" anchorCtr="0" compatLnSpc="1">
+            <a:prstTxWarp prst="textNoShape">
+              <a:avLst/>
+            </a:prstTxWarp>
+            <a:spAutoFit/>
+          </a:bodyPr>
+          <a:lstStyle/>
+          <a:p>
+            <a:pPr marL="0" marR="0" lvl="0" indent="0" algn="l" defTabSz="914400" rtl="0" eaLnBrk="0" fontAlgn="base" latinLnBrk="0" hangingPunct="0">
+              <a:lnSpc>
+                <a:spcPct val="100000"/>
+              </a:lnSpc>
+              <a:spcBef>
+                <a:spcPct val="0"/>
+              </a:spcBef>
+              <a:spcAft>
+                <a:spcPct val="0"/>
+              </a:spcAft>
+              <a:buClrTx/>
+              <a:buSzTx/>
+              <a:buFontTx/>
+              <a:buNone/>
+              <a:tabLst/>
+            </a:pPr>
+            <a:r>
+              <a:rPr kumimoji="0" lang="en-US" altLang="en-US" sz="2000" b="0" i="0" u="none" strike="noStrike" cap="none" normalizeH="0" baseline="0" dirty="0">
+                <a:ln>
+                  <a:noFill/>
+                </a:ln>
+                <a:solidFill>
+                  <a:srgbClr val="0000FF"/>
+                </a:solidFill>
+                <a:effectLst/>
+                <a:latin typeface="Consolas" panose="020B0609020204030204" pitchFamily="49" charset="0"/>
+              </a:rPr>
+              <a:t>int</a:t>
+            </a:r>
+            <a:r>
+              <a:rPr kumimoji="0" lang="en-US" altLang="en-US" sz="2000" b="0" i="0" u="none" strike="noStrike" cap="none" normalizeH="0" baseline="0" dirty="0">
+                <a:ln>
+                  <a:noFill/>
+                </a:ln>
+                <a:solidFill>
+                  <a:srgbClr val="000000"/>
+                </a:solidFill>
+                <a:effectLst/>
+                <a:latin typeface="Consolas" panose="020B0609020204030204" pitchFamily="49" charset="0"/>
+              </a:rPr>
+              <a:t>* </a:t>
+            </a:r>
+            <a:r>
+              <a:rPr kumimoji="0" lang="en-US" altLang="en-US" sz="2000" b="0" i="0" u="none" strike="noStrike" cap="none" normalizeH="0" baseline="0" dirty="0" err="1">
+                <a:ln>
+                  <a:noFill/>
+                </a:ln>
+                <a:solidFill>
+                  <a:srgbClr val="1F377F"/>
+                </a:solidFill>
+                <a:effectLst/>
+                <a:latin typeface="Consolas" panose="020B0609020204030204" pitchFamily="49" charset="0"/>
+              </a:rPr>
+              <a:t>myintptr</a:t>
+            </a:r>
+            <a:r>
+              <a:rPr kumimoji="0" lang="en-US" altLang="en-US" sz="2000" b="0" i="0" u="none" strike="noStrike" cap="none" normalizeH="0" baseline="0" dirty="0">
+                <a:ln>
+                  <a:noFill/>
+                </a:ln>
+                <a:solidFill>
+                  <a:srgbClr val="000000"/>
+                </a:solidFill>
+                <a:effectLst/>
+                <a:latin typeface="Consolas" panose="020B0609020204030204" pitchFamily="49" charset="0"/>
+              </a:rPr>
+              <a:t> = </a:t>
+            </a:r>
+            <a:r>
+              <a:rPr kumimoji="0" lang="en-US" altLang="en-US" sz="2000" b="0" i="0" u="none" strike="noStrike" cap="none" normalizeH="0" baseline="0" dirty="0" err="1">
+                <a:ln>
+                  <a:noFill/>
+                </a:ln>
+                <a:solidFill>
+                  <a:srgbClr val="0000FF"/>
+                </a:solidFill>
+                <a:effectLst/>
+                <a:latin typeface="Consolas" panose="020B0609020204030204" pitchFamily="49" charset="0"/>
+              </a:rPr>
+              <a:t>nullptr</a:t>
+            </a:r>
+            <a:r>
+              <a:rPr kumimoji="0" lang="en-US" altLang="en-US" sz="2000" b="0" i="0" u="none" strike="noStrike" cap="none" normalizeH="0" baseline="0" dirty="0">
+                <a:ln>
+                  <a:noFill/>
+                </a:ln>
+                <a:solidFill>
+                  <a:srgbClr val="000000"/>
+                </a:solidFill>
+                <a:effectLst/>
+                <a:latin typeface="Consolas" panose="020B0609020204030204" pitchFamily="49" charset="0"/>
+              </a:rPr>
+              <a:t>;</a:t>
+            </a:r>
+            <a:endParaRPr kumimoji="0" lang="en-US" altLang="en-US" sz="4800" b="0" i="0" u="none" strike="noStrike" cap="none" normalizeH="0" baseline="0" dirty="0">
+              <a:ln>
+                <a:noFill/>
+              </a:ln>
+              <a:solidFill>
+                <a:schemeClr val="tx1"/>
+              </a:solidFill>
+              <a:effectLst/>
+              <a:latin typeface="Arial" panose="020B0604020202020204" pitchFamily="34" charset="0"/>
+            </a:endParaRPr>
+          </a:p>
+        </p:txBody>
+      </p:sp>
+    </p:spTree>
+    <p:extLst>
+      <p:ext uri="{BB962C8B-B14F-4D97-AF65-F5344CB8AC3E}">
+        <p14:creationId xmlns:p14="http://schemas.microsoft.com/office/powerpoint/2010/main" val="3575722522"/>
+      </p:ext>
+    </p:extLst>
+  </p:cSld>
+  <p:clrMapOvr>
+    <a:masterClrMapping/>
+  </p:clrMapOvr>
+</p:sld>
+</file>
+
+<file path=ppt/slides/slide11.xml><?xml version="1.0" encoding="utf-8"?>
+<p:sld xmlns:a="http://schemas.openxmlformats.org/drawingml/2006/main" xmlns:r="http://schemas.openxmlformats.org/officeDocument/2006/relationships" xmlns:p="http://schemas.openxmlformats.org/presentationml/2006/main">
+  <p:cSld>
+    <p:spTree>
+      <p:nvGrpSpPr>
+        <p:cNvPr id="1" name=""/>
+        <p:cNvGrpSpPr/>
+        <p:nvPr/>
+      </p:nvGrpSpPr>
+      <p:grpSpPr>
+        <a:xfrm>
+          <a:off x="0" y="0"/>
+          <a:ext cx="0" cy="0"/>
+          <a:chOff x="0" y="0"/>
+          <a:chExt cx="0" cy="0"/>
+        </a:xfrm>
+      </p:grpSpPr>
+      <p:sp>
+        <p:nvSpPr>
+          <p:cNvPr id="2" name="Title 1">
+            <a:extLst>
+              <a:ext uri="{FF2B5EF4-FFF2-40B4-BE49-F238E27FC236}">
+                <a16:creationId xmlns:a16="http://schemas.microsoft.com/office/drawing/2014/main" id="{370A12F9-281C-46C8-AE2C-15D1910958B0}"/>
+              </a:ext>
+            </a:extLst>
+          </p:cNvPr>
+          <p:cNvSpPr>
+            <a:spLocks noGrp="1"/>
+          </p:cNvSpPr>
+          <p:nvPr>
+            <p:ph type="title"/>
+          </p:nvPr>
+        </p:nvSpPr>
+        <p:spPr/>
+        <p:txBody>
+          <a:bodyPr/>
+          <a:lstStyle/>
+          <a:p>
+            <a:r>
+              <a:rPr lang="en-US" dirty="0"/>
+              <a:t>That’s a wrap!</a:t>
+            </a:r>
+          </a:p>
+        </p:txBody>
+      </p:sp>
+      <p:sp>
+        <p:nvSpPr>
+          <p:cNvPr id="3" name="Content Placeholder 2">
+            <a:extLst>
+              <a:ext uri="{FF2B5EF4-FFF2-40B4-BE49-F238E27FC236}">
+                <a16:creationId xmlns:a16="http://schemas.microsoft.com/office/drawing/2014/main" id="{2C06C73B-97C8-4203-B063-FF8DC01B180D}"/>
+              </a:ext>
+            </a:extLst>
+          </p:cNvPr>
+          <p:cNvSpPr>
+            <a:spLocks noGrp="1"/>
+          </p:cNvSpPr>
+          <p:nvPr>
+            <p:ph idx="1"/>
+          </p:nvPr>
+        </p:nvSpPr>
+        <p:spPr>
+          <a:xfrm>
+            <a:off x="1371600" y="1638300"/>
+            <a:ext cx="9601200" cy="4796790"/>
+          </a:xfrm>
+        </p:spPr>
+        <p:txBody>
+          <a:bodyPr>
+            <a:normAutofit/>
+          </a:bodyPr>
+          <a:lstStyle/>
+          <a:p>
+            <a:pPr>
+              <a:lnSpc>
+                <a:spcPct val="150000"/>
+              </a:lnSpc>
+            </a:pPr>
+            <a:r>
+              <a:rPr lang="en-US" dirty="0"/>
+              <a:t>Challenge for you</a:t>
+            </a:r>
+          </a:p>
+          <a:p>
+            <a:pPr lvl="1">
+              <a:lnSpc>
+                <a:spcPct val="150000"/>
+              </a:lnSpc>
+            </a:pPr>
+            <a:r>
+              <a:rPr lang="en-US" i="0" dirty="0"/>
+              <a:t>Create a function that adds two numbers but the arguments are passed via reference</a:t>
+            </a:r>
+          </a:p>
+          <a:p>
+            <a:pPr lvl="1">
+              <a:lnSpc>
+                <a:spcPct val="150000"/>
+              </a:lnSpc>
+            </a:pPr>
+            <a:r>
+              <a:rPr lang="en-US" i="0" dirty="0"/>
+              <a:t>Create a function that takes in array of 5 integers, increments each value by 1 and returns the modified array to main. Print the array before and after modification</a:t>
+            </a:r>
+            <a:br>
+              <a:rPr lang="en-US" i="0" dirty="0"/>
+            </a:br>
+            <a:r>
+              <a:rPr lang="en-US" dirty="0">
+                <a:hlinkClick r:id="rId2"/>
+              </a:rPr>
+              <a:t>https://www.tutorialspoint.com/cplusplus/cpp_passing_arrays_to_functions.htm</a:t>
+            </a:r>
+            <a:endParaRPr lang="en-US" i="0" dirty="0"/>
+          </a:p>
+          <a:p>
+            <a:pPr>
+              <a:lnSpc>
+                <a:spcPct val="150000"/>
+              </a:lnSpc>
+            </a:pPr>
+            <a:endParaRPr lang="en-US" dirty="0"/>
+          </a:p>
+        </p:txBody>
+      </p:sp>
+    </p:spTree>
+    <p:extLst>
+      <p:ext uri="{BB962C8B-B14F-4D97-AF65-F5344CB8AC3E}">
+        <p14:creationId xmlns:p14="http://schemas.microsoft.com/office/powerpoint/2010/main" val="3567095348"/>
+      </p:ext>
+    </p:extLst>
+  </p:cSld>
+  <p:clrMapOvr>
+    <a:masterClrMapping/>
+  </p:clrMapOvr>
+</p:sld>
+</file>
+
+<file path=ppt/slides/slide12.xml><?xml version="1.0" encoding="utf-8"?>
+<p:sld xmlns:a="http://schemas.openxmlformats.org/drawingml/2006/main" xmlns:r="http://schemas.openxmlformats.org/officeDocument/2006/relationships" xmlns:p="http://schemas.openxmlformats.org/presentationml/2006/main">
+  <p:cSld>
+    <p:spTree>
+      <p:nvGrpSpPr>
+        <p:cNvPr id="1" name=""/>
+        <p:cNvGrpSpPr/>
+        <p:nvPr/>
+      </p:nvGrpSpPr>
+      <p:grpSpPr>
+        <a:xfrm>
+          <a:off x="0" y="0"/>
+          <a:ext cx="0" cy="0"/>
+          <a:chOff x="0" y="0"/>
+          <a:chExt cx="0" cy="0"/>
+        </a:xfrm>
+      </p:grpSpPr>
+      <p:sp>
+        <p:nvSpPr>
+          <p:cNvPr id="2" name="Title 1">
+            <a:extLst>
+              <a:ext uri="{FF2B5EF4-FFF2-40B4-BE49-F238E27FC236}">
+                <a16:creationId xmlns:a16="http://schemas.microsoft.com/office/drawing/2014/main" id="{211586D5-9C46-4298-8DD1-685B59298C69}"/>
+              </a:ext>
+            </a:extLst>
+          </p:cNvPr>
+          <p:cNvSpPr>
+            <a:spLocks noGrp="1"/>
+          </p:cNvSpPr>
+          <p:nvPr>
+            <p:ph type="title"/>
+          </p:nvPr>
+        </p:nvSpPr>
+        <p:spPr>
+          <a:xfrm>
+            <a:off x="1295400" y="2284622"/>
+            <a:ext cx="9601200" cy="694592"/>
+          </a:xfrm>
+        </p:spPr>
+        <p:txBody>
+          <a:bodyPr>
+            <a:normAutofit/>
+          </a:bodyPr>
+          <a:lstStyle/>
+          <a:p>
+            <a:pPr algn="ctr"/>
+            <a:r>
+              <a:rPr lang="en-TT" dirty="0"/>
+              <a:t>Questions?</a:t>
+            </a:r>
+          </a:p>
+        </p:txBody>
+      </p:sp>
+      <p:pic>
+        <p:nvPicPr>
+          <p:cNvPr id="5" name="Content Placeholder 4" descr="Envelope">
+            <a:extLst>
+              <a:ext uri="{FF2B5EF4-FFF2-40B4-BE49-F238E27FC236}">
+                <a16:creationId xmlns:a16="http://schemas.microsoft.com/office/drawing/2014/main" id="{8F04317B-AC85-436E-980C-FB1BF17EC929}"/>
+              </a:ext>
+            </a:extLst>
+          </p:cNvPr>
+          <p:cNvPicPr>
+            <a:picLocks noGrp="1" noChangeAspect="1"/>
+          </p:cNvPicPr>
+          <p:nvPr>
+            <p:ph idx="1"/>
+          </p:nvPr>
+        </p:nvPicPr>
+        <p:blipFill>
+          <a:blip r:embed="rId2">
+            <a:extLst>
+              <a:ext uri="{96DAC541-7B7A-43D3-8B79-37D633B846F1}">
+                <asvg:svgBlip xmlns:asvg="http://schemas.microsoft.com/office/drawing/2016/SVG/main" r:embed="rId3"/>
+              </a:ext>
+            </a:extLst>
+          </a:blip>
+          <a:stretch>
+            <a:fillRect/>
+          </a:stretch>
+        </p:blipFill>
+        <p:spPr>
+          <a:xfrm>
+            <a:off x="3273195" y="3400564"/>
+            <a:ext cx="469900" cy="469900"/>
+          </a:xfrm>
+        </p:spPr>
+      </p:pic>
+      <p:grpSp>
+        <p:nvGrpSpPr>
+          <p:cNvPr id="11" name="Group 10">
+            <a:extLst>
+              <a:ext uri="{FF2B5EF4-FFF2-40B4-BE49-F238E27FC236}">
+                <a16:creationId xmlns:a16="http://schemas.microsoft.com/office/drawing/2014/main" id="{FD72AAD1-1AB7-4C19-B72B-29E91180299E}"/>
+              </a:ext>
+            </a:extLst>
+          </p:cNvPr>
+          <p:cNvGrpSpPr/>
+          <p:nvPr/>
+        </p:nvGrpSpPr>
+        <p:grpSpPr>
+          <a:xfrm>
+            <a:off x="3331991" y="3455408"/>
+            <a:ext cx="6904822" cy="984211"/>
+            <a:chOff x="3013975" y="2775171"/>
+            <a:chExt cx="6904822" cy="984211"/>
+          </a:xfrm>
+        </p:grpSpPr>
+        <p:sp>
+          <p:nvSpPr>
+            <p:cNvPr id="8" name="TextBox 7">
+              <a:extLst>
+                <a:ext uri="{FF2B5EF4-FFF2-40B4-BE49-F238E27FC236}">
+                  <a16:creationId xmlns:a16="http://schemas.microsoft.com/office/drawing/2014/main" id="{BC9D207D-CF63-4362-AED7-241142869A58}"/>
+                </a:ext>
+              </a:extLst>
+            </p:cNvPr>
+            <p:cNvSpPr txBox="1"/>
+            <p:nvPr/>
+          </p:nvSpPr>
+          <p:spPr>
+            <a:xfrm>
+              <a:off x="3383307" y="2775171"/>
+              <a:ext cx="6485206" cy="646331"/>
+            </a:xfrm>
+            <a:prstGeom prst="rect">
+              <a:avLst/>
+            </a:prstGeom>
+            <a:noFill/>
+          </p:spPr>
+          <p:txBody>
+            <a:bodyPr wrap="square" rtlCol="0">
+              <a:spAutoFit/>
+            </a:bodyPr>
+            <a:lstStyle/>
+            <a:p>
+              <a:r>
+                <a:rPr lang="en-TT" dirty="0">
+                  <a:latin typeface="Avenir LT Std 35 Light" panose="020B0402020203020204" pitchFamily="34" charset="0"/>
+                </a:rPr>
+                <a:t>simeon.ramjit@sta.uwi.edu</a:t>
+              </a:r>
+              <a:br>
+                <a:rPr lang="en-TT" dirty="0">
+                  <a:latin typeface="Avenir LT Std 35 Light" panose="020B0402020203020204" pitchFamily="34" charset="0"/>
+                </a:rPr>
+              </a:br>
+              <a:endParaRPr lang="en-TT" dirty="0">
+                <a:latin typeface="Avenir LT Std 35 Light" panose="020B0402020203020204" pitchFamily="34" charset="0"/>
+              </a:endParaRPr>
+            </a:p>
+          </p:txBody>
+        </p:sp>
+        <p:grpSp>
+          <p:nvGrpSpPr>
+            <p:cNvPr id="10" name="Group 9">
+              <a:extLst>
+                <a:ext uri="{FF2B5EF4-FFF2-40B4-BE49-F238E27FC236}">
+                  <a16:creationId xmlns:a16="http://schemas.microsoft.com/office/drawing/2014/main" id="{B1528EF1-7749-4B39-A843-0C85DDD5FC66}"/>
+                </a:ext>
+              </a:extLst>
+            </p:cNvPr>
+            <p:cNvGrpSpPr/>
+            <p:nvPr/>
+          </p:nvGrpSpPr>
+          <p:grpSpPr>
+            <a:xfrm>
+              <a:off x="3013975" y="3390050"/>
+              <a:ext cx="6904822" cy="369332"/>
+              <a:chOff x="3013975" y="3853058"/>
+              <a:chExt cx="6904822" cy="369332"/>
+            </a:xfrm>
+          </p:grpSpPr>
+          <p:pic>
+            <p:nvPicPr>
+              <p:cNvPr id="7" name="Graphic 6">
+                <a:extLst>
+                  <a:ext uri="{FF2B5EF4-FFF2-40B4-BE49-F238E27FC236}">
+                    <a16:creationId xmlns:a16="http://schemas.microsoft.com/office/drawing/2014/main" id="{0ACE3A61-2832-43E4-AA7B-86488A0B9B83}"/>
+                  </a:ext>
+                </a:extLst>
+              </p:cNvPr>
+              <p:cNvPicPr>
+                <a:picLocks noChangeAspect="1"/>
+              </p:cNvPicPr>
+              <p:nvPr/>
+            </p:nvPicPr>
+            <p:blipFill>
+              <a:blip r:embed="rId4">
+                <a:extLst>
+                  <a:ext uri="{96DAC541-7B7A-43D3-8B79-37D633B846F1}">
+                    <asvg:svgBlip xmlns:asvg="http://schemas.microsoft.com/office/drawing/2016/SVG/main" r:embed="rId5"/>
+                  </a:ext>
+                </a:extLst>
+              </a:blip>
+              <a:stretch>
+                <a:fillRect/>
+              </a:stretch>
+            </p:blipFill>
+            <p:spPr>
+              <a:xfrm>
+                <a:off x="3013975" y="3853058"/>
+                <a:ext cx="369332" cy="369332"/>
+              </a:xfrm>
+              <a:prstGeom prst="rect">
+                <a:avLst/>
+              </a:prstGeom>
+            </p:spPr>
+          </p:pic>
+          <p:sp>
+            <p:nvSpPr>
+              <p:cNvPr id="9" name="TextBox 8">
+                <a:extLst>
+                  <a:ext uri="{FF2B5EF4-FFF2-40B4-BE49-F238E27FC236}">
+                    <a16:creationId xmlns:a16="http://schemas.microsoft.com/office/drawing/2014/main" id="{BF839DEA-B22B-400C-ADBB-EB835428EC3A}"/>
+                  </a:ext>
+                </a:extLst>
+              </p:cNvPr>
+              <p:cNvSpPr txBox="1"/>
+              <p:nvPr/>
+            </p:nvSpPr>
+            <p:spPr>
+              <a:xfrm>
+                <a:off x="3433591" y="3853058"/>
+                <a:ext cx="6485206" cy="369332"/>
+              </a:xfrm>
+              <a:prstGeom prst="rect">
+                <a:avLst/>
+              </a:prstGeom>
+              <a:noFill/>
+            </p:spPr>
+            <p:txBody>
+              <a:bodyPr wrap="square" rtlCol="0">
+                <a:spAutoFit/>
+              </a:bodyPr>
+              <a:lstStyle/>
+              <a:p>
+                <a:r>
+                  <a:rPr lang="en-TT" dirty="0">
+                    <a:latin typeface="Avenir LT Std 35 Light" panose="020B0402020203020204" pitchFamily="34" charset="0"/>
+                  </a:rPr>
+                  <a:t>github.com/simeon9696/programmingworkshop</a:t>
+                </a:r>
+              </a:p>
+            </p:txBody>
+          </p:sp>
+        </p:grpSp>
+      </p:grpSp>
+      <p:sp>
+        <p:nvSpPr>
+          <p:cNvPr id="3" name="Slide Number Placeholder 2">
+            <a:extLst>
+              <a:ext uri="{FF2B5EF4-FFF2-40B4-BE49-F238E27FC236}">
+                <a16:creationId xmlns:a16="http://schemas.microsoft.com/office/drawing/2014/main" id="{0F495189-46AB-45F8-AA2A-2A633A345D5B}"/>
+              </a:ext>
+            </a:extLst>
+          </p:cNvPr>
+          <p:cNvSpPr>
+            <a:spLocks noGrp="1"/>
+          </p:cNvSpPr>
+          <p:nvPr>
+            <p:ph type="sldNum" sz="quarter" idx="12"/>
+          </p:nvPr>
+        </p:nvSpPr>
+        <p:spPr/>
+        <p:txBody>
+          <a:bodyPr/>
+          <a:lstStyle/>
+          <a:p>
+            <a:fld id="{69E57DC2-970A-4B3E-BB1C-7A09969E49DF}" type="slidenum">
+              <a:rPr lang="en-US" smtClean="0"/>
+              <a:t>12</a:t>
+            </a:fld>
+            <a:endParaRPr lang="en-US" dirty="0"/>
+          </a:p>
+        </p:txBody>
+      </p:sp>
+    </p:spTree>
+    <p:extLst>
+      <p:ext uri="{BB962C8B-B14F-4D97-AF65-F5344CB8AC3E}">
+        <p14:creationId xmlns:p14="http://schemas.microsoft.com/office/powerpoint/2010/main" val="2060982713"/>
       </p:ext>
     </p:extLst>
   </p:cSld>
@@ -3967,7 +4711,10 @@
           <a:bodyPr/>
           <a:lstStyle/>
           <a:p>
-            <a:endParaRPr lang="en-US"/>
+            <a:r>
+              <a:rPr lang="en-US" dirty="0"/>
+              <a:t>What is a pointer? </a:t>
+            </a:r>
           </a:p>
         </p:txBody>
       </p:sp>
@@ -3987,12 +4734,69 @@
             <p:ph idx="1"/>
           </p:nvPr>
         </p:nvSpPr>
-        <p:spPr/>
-        <p:txBody>
-          <a:bodyPr/>
+        <p:spPr>
+          <a:xfrm>
+            <a:off x="1371600" y="1638300"/>
+            <a:ext cx="9601200" cy="4796790"/>
+          </a:xfrm>
+        </p:spPr>
+        <p:txBody>
+          <a:bodyPr>
+            <a:normAutofit/>
+          </a:bodyPr>
           <a:lstStyle/>
           <a:p>
-            <a:endParaRPr lang="en-US"/>
+            <a:pPr>
+              <a:lnSpc>
+                <a:spcPct val="150000"/>
+              </a:lnSpc>
+            </a:pPr>
+            <a:r>
+              <a:rPr lang="en-US" dirty="0"/>
+              <a:t>We’ll get there soon, we first need to evaluate how we’ve been handling variables all this time</a:t>
+            </a:r>
+          </a:p>
+          <a:p>
+            <a:pPr>
+              <a:lnSpc>
+                <a:spcPct val="150000"/>
+              </a:lnSpc>
+            </a:pPr>
+            <a:r>
+              <a:rPr lang="en-US" dirty="0"/>
+              <a:t>It was done by declaring a datatype, variable name and then an assignment to some value</a:t>
+            </a:r>
+          </a:p>
+          <a:p>
+            <a:pPr>
+              <a:lnSpc>
+                <a:spcPct val="150000"/>
+              </a:lnSpc>
+            </a:pPr>
+            <a:r>
+              <a:rPr lang="en-US" dirty="0"/>
+              <a:t>The operating system decides where in memory (RAM) that variable will live</a:t>
+            </a:r>
+          </a:p>
+          <a:p>
+            <a:pPr>
+              <a:lnSpc>
+                <a:spcPct val="150000"/>
+              </a:lnSpc>
+            </a:pPr>
+            <a:r>
+              <a:rPr lang="en-US" dirty="0"/>
+              <a:t>That place also has a memory </a:t>
+            </a:r>
+            <a:r>
+              <a:rPr lang="en-US" b="1" dirty="0"/>
+              <a:t>address. </a:t>
+            </a:r>
+            <a:r>
+              <a:rPr lang="en-US" dirty="0"/>
+              <a:t>Normally, to use the variable we use the variable name, however it may be useful to use the address of the variable instead.</a:t>
+            </a:r>
+            <a:endParaRPr lang="en-US" b="1" dirty="0"/>
           </a:p>
         </p:txBody>
       </p:sp>
@@ -4000,6 +4804,3832 @@
     <p:extLst>
       <p:ext uri="{BB962C8B-B14F-4D97-AF65-F5344CB8AC3E}">
         <p14:creationId xmlns:p14="http://schemas.microsoft.com/office/powerpoint/2010/main" val="1842587426"/>
+      </p:ext>
+    </p:extLst>
+  </p:cSld>
+  <p:clrMapOvr>
+    <a:masterClrMapping/>
+  </p:clrMapOvr>
+</p:sld>
+</file>
+
+<file path=ppt/slides/slide3.xml><?xml version="1.0" encoding="utf-8"?>
+<p:sld xmlns:a="http://schemas.openxmlformats.org/drawingml/2006/main" xmlns:r="http://schemas.openxmlformats.org/officeDocument/2006/relationships" xmlns:p="http://schemas.openxmlformats.org/presentationml/2006/main">
+  <p:cSld>
+    <p:spTree>
+      <p:nvGrpSpPr>
+        <p:cNvPr id="1" name=""/>
+        <p:cNvGrpSpPr/>
+        <p:nvPr/>
+      </p:nvGrpSpPr>
+      <p:grpSpPr>
+        <a:xfrm>
+          <a:off x="0" y="0"/>
+          <a:ext cx="0" cy="0"/>
+          <a:chOff x="0" y="0"/>
+          <a:chExt cx="0" cy="0"/>
+        </a:xfrm>
+      </p:grpSpPr>
+      <p:sp>
+        <p:nvSpPr>
+          <p:cNvPr id="2" name="Title 1">
+            <a:extLst>
+              <a:ext uri="{FF2B5EF4-FFF2-40B4-BE49-F238E27FC236}">
+                <a16:creationId xmlns:a16="http://schemas.microsoft.com/office/drawing/2014/main" id="{370A12F9-281C-46C8-AE2C-15D1910958B0}"/>
+              </a:ext>
+            </a:extLst>
+          </p:cNvPr>
+          <p:cNvSpPr>
+            <a:spLocks noGrp="1"/>
+          </p:cNvSpPr>
+          <p:nvPr>
+            <p:ph type="title"/>
+          </p:nvPr>
+        </p:nvSpPr>
+        <p:spPr/>
+        <p:txBody>
+          <a:bodyPr/>
+          <a:lstStyle/>
+          <a:p>
+            <a:r>
+              <a:rPr lang="en-US" dirty="0"/>
+              <a:t>Variable Address</a:t>
+            </a:r>
+          </a:p>
+        </p:txBody>
+      </p:sp>
+      <p:sp>
+        <p:nvSpPr>
+          <p:cNvPr id="3" name="Content Placeholder 2">
+            <a:extLst>
+              <a:ext uri="{FF2B5EF4-FFF2-40B4-BE49-F238E27FC236}">
+                <a16:creationId xmlns:a16="http://schemas.microsoft.com/office/drawing/2014/main" id="{2C06C73B-97C8-4203-B063-FF8DC01B180D}"/>
+              </a:ext>
+            </a:extLst>
+          </p:cNvPr>
+          <p:cNvSpPr>
+            <a:spLocks noGrp="1"/>
+          </p:cNvSpPr>
+          <p:nvPr>
+            <p:ph idx="1"/>
+          </p:nvPr>
+        </p:nvSpPr>
+        <p:spPr>
+          <a:xfrm>
+            <a:off x="1371600" y="1638300"/>
+            <a:ext cx="9601200" cy="4796790"/>
+          </a:xfrm>
+        </p:spPr>
+        <p:txBody>
+          <a:bodyPr>
+            <a:normAutofit/>
+          </a:bodyPr>
+          <a:lstStyle/>
+          <a:p>
+            <a:pPr>
+              <a:lnSpc>
+                <a:spcPct val="150000"/>
+              </a:lnSpc>
+            </a:pPr>
+            <a:r>
+              <a:rPr lang="en-US" dirty="0"/>
+              <a:t>To get the address of a variable, we need to use the address-of operator, </a:t>
+            </a:r>
+            <a:r>
+              <a:rPr lang="en-US" dirty="0">
+                <a:latin typeface="Consolas" panose="020B0609020204030204" pitchFamily="49" charset="0"/>
+              </a:rPr>
+              <a:t>&amp;</a:t>
+            </a:r>
+          </a:p>
+          <a:p>
+            <a:pPr>
+              <a:lnSpc>
+                <a:spcPct val="150000"/>
+              </a:lnSpc>
+            </a:pPr>
+            <a:endParaRPr lang="en-US" b="1" dirty="0"/>
+          </a:p>
+          <a:p>
+            <a:pPr>
+              <a:lnSpc>
+                <a:spcPct val="150000"/>
+              </a:lnSpc>
+            </a:pPr>
+            <a:endParaRPr lang="en-US" b="1" dirty="0"/>
+          </a:p>
+          <a:p>
+            <a:pPr>
+              <a:lnSpc>
+                <a:spcPct val="150000"/>
+              </a:lnSpc>
+            </a:pPr>
+            <a:endParaRPr lang="en-US" b="1" dirty="0"/>
+          </a:p>
+          <a:p>
+            <a:pPr>
+              <a:lnSpc>
+                <a:spcPct val="150000"/>
+              </a:lnSpc>
+            </a:pPr>
+            <a:endParaRPr lang="en-US" b="1" dirty="0"/>
+          </a:p>
+          <a:p>
+            <a:pPr>
+              <a:lnSpc>
+                <a:spcPct val="150000"/>
+              </a:lnSpc>
+            </a:pPr>
+            <a:r>
+              <a:rPr lang="en-US" dirty="0"/>
+              <a:t>Run this program again, note the different address on every run but the same value</a:t>
+            </a:r>
+          </a:p>
+          <a:p>
+            <a:pPr>
+              <a:lnSpc>
+                <a:spcPct val="150000"/>
+              </a:lnSpc>
+            </a:pPr>
+            <a:r>
+              <a:rPr lang="en-US" dirty="0"/>
+              <a:t>The OS will usually place it in a different place in memory every time.</a:t>
+            </a:r>
+          </a:p>
+        </p:txBody>
+      </p:sp>
+      <p:sp>
+        <p:nvSpPr>
+          <p:cNvPr id="4" name="Rectangle 1">
+            <a:extLst>
+              <a:ext uri="{FF2B5EF4-FFF2-40B4-BE49-F238E27FC236}">
+                <a16:creationId xmlns:a16="http://schemas.microsoft.com/office/drawing/2014/main" id="{DB57F842-1CFA-418D-9821-AF1209681316}"/>
+              </a:ext>
+            </a:extLst>
+          </p:cNvPr>
+          <p:cNvSpPr>
+            <a:spLocks noChangeArrowheads="1"/>
+          </p:cNvSpPr>
+          <p:nvPr/>
+        </p:nvSpPr>
+        <p:spPr bwMode="auto">
+          <a:xfrm>
+            <a:off x="1737360" y="2305615"/>
+            <a:ext cx="9777035" cy="2246769"/>
+          </a:xfrm>
+          <a:prstGeom prst="rect">
+            <a:avLst/>
+          </a:prstGeom>
+          <a:solidFill>
+            <a:srgbClr val="FFFFFF"/>
+          </a:solidFill>
+          <a:ln>
+            <a:noFill/>
+          </a:ln>
+          <a:effectLst/>
+          <a:extLst>
+            <a:ext uri="{91240B29-F687-4F45-9708-019B960494DF}">
+              <a14:hiddenLine xmlns:a14="http://schemas.microsoft.com/office/drawing/2010/main" w="9525">
+                <a:solidFill>
+                  <a:schemeClr val="tx1"/>
+                </a:solidFill>
+                <a:miter lim="800000"/>
+                <a:headEnd/>
+                <a:tailEnd/>
+              </a14:hiddenLine>
+            </a:ext>
+            <a:ext uri="{AF507438-7753-43E0-B8FC-AC1667EBCBE1}">
+              <a14:hiddenEffects xmlns:a14="http://schemas.microsoft.com/office/drawing/2010/main">
+                <a:effectLst>
+                  <a:outerShdw dist="35921" dir="2700000" algn="ctr" rotWithShape="0">
+                    <a:schemeClr val="bg2"/>
+                  </a:outerShdw>
+                </a:effectLst>
+              </a14:hiddenEffects>
+            </a:ext>
+          </a:extLst>
+        </p:spPr>
+        <p:txBody>
+          <a:bodyPr vert="horz" wrap="none" lIns="91440" tIns="45720" rIns="91440" bIns="45720" numCol="1" anchor="ctr" anchorCtr="0" compatLnSpc="1">
+            <a:prstTxWarp prst="textNoShape">
+              <a:avLst/>
+            </a:prstTxWarp>
+            <a:spAutoFit/>
+          </a:bodyPr>
+          <a:lstStyle/>
+          <a:p>
+            <a:pPr marL="0" marR="0" lvl="0" indent="0" algn="l" defTabSz="914400" rtl="0" eaLnBrk="0" fontAlgn="base" latinLnBrk="0" hangingPunct="0">
+              <a:lnSpc>
+                <a:spcPct val="100000"/>
+              </a:lnSpc>
+              <a:spcBef>
+                <a:spcPct val="0"/>
+              </a:spcBef>
+              <a:spcAft>
+                <a:spcPct val="0"/>
+              </a:spcAft>
+              <a:buClrTx/>
+              <a:buSzTx/>
+              <a:buFontTx/>
+              <a:buNone/>
+              <a:tabLst/>
+            </a:pPr>
+            <a:r>
+              <a:rPr kumimoji="0" lang="en-US" altLang="en-US" sz="2000" b="0" i="0" u="none" strike="noStrike" cap="none" normalizeH="0" baseline="0" dirty="0">
+                <a:ln>
+                  <a:noFill/>
+                </a:ln>
+                <a:solidFill>
+                  <a:srgbClr val="808080"/>
+                </a:solidFill>
+                <a:effectLst/>
+                <a:latin typeface="Consolas" panose="020B0609020204030204" pitchFamily="49" charset="0"/>
+              </a:rPr>
+              <a:t>#include</a:t>
+            </a:r>
+            <a:r>
+              <a:rPr kumimoji="0" lang="en-US" altLang="en-US" sz="2000" b="0" i="0" u="none" strike="noStrike" cap="none" normalizeH="0" baseline="0" dirty="0">
+                <a:ln>
+                  <a:noFill/>
+                </a:ln>
+                <a:solidFill>
+                  <a:srgbClr val="E21F1F"/>
+                </a:solidFill>
+                <a:effectLst/>
+                <a:latin typeface="Consolas" panose="020B0609020204030204" pitchFamily="49" charset="0"/>
+              </a:rPr>
+              <a:t>&lt;</a:t>
+            </a:r>
+            <a:r>
+              <a:rPr kumimoji="0" lang="en-US" altLang="en-US" sz="2000" b="0" i="0" u="none" strike="noStrike" cap="none" normalizeH="0" baseline="0" dirty="0">
+                <a:ln>
+                  <a:noFill/>
+                </a:ln>
+                <a:solidFill>
+                  <a:srgbClr val="A31515"/>
+                </a:solidFill>
+                <a:effectLst/>
+                <a:latin typeface="Consolas" panose="020B0609020204030204" pitchFamily="49" charset="0"/>
+              </a:rPr>
+              <a:t>iostream</a:t>
+            </a:r>
+            <a:r>
+              <a:rPr kumimoji="0" lang="en-US" altLang="en-US" sz="2000" b="0" i="0" u="none" strike="noStrike" cap="none" normalizeH="0" baseline="0" dirty="0">
+                <a:ln>
+                  <a:noFill/>
+                </a:ln>
+                <a:solidFill>
+                  <a:srgbClr val="E21F1F"/>
+                </a:solidFill>
+                <a:effectLst/>
+                <a:latin typeface="Consolas" panose="020B0609020204030204" pitchFamily="49" charset="0"/>
+              </a:rPr>
+              <a:t>&gt;</a:t>
+            </a:r>
+            <a:r>
+              <a:rPr kumimoji="0" lang="en-US" altLang="en-US" sz="2000" b="0" i="0" u="none" strike="noStrike" cap="none" normalizeH="0" baseline="0" dirty="0">
+                <a:ln>
+                  <a:noFill/>
+                </a:ln>
+                <a:solidFill>
+                  <a:srgbClr val="000000"/>
+                </a:solidFill>
+                <a:effectLst/>
+                <a:latin typeface="Consolas" panose="020B0609020204030204" pitchFamily="49" charset="0"/>
+              </a:rPr>
+              <a:t> </a:t>
+            </a:r>
+          </a:p>
+          <a:p>
+            <a:pPr marL="0" marR="0" lvl="0" indent="0" algn="l" defTabSz="914400" rtl="0" eaLnBrk="0" fontAlgn="base" latinLnBrk="0" hangingPunct="0">
+              <a:lnSpc>
+                <a:spcPct val="100000"/>
+              </a:lnSpc>
+              <a:spcBef>
+                <a:spcPct val="0"/>
+              </a:spcBef>
+              <a:spcAft>
+                <a:spcPct val="0"/>
+              </a:spcAft>
+              <a:buClrTx/>
+              <a:buSzTx/>
+              <a:buFontTx/>
+              <a:buNone/>
+              <a:tabLst/>
+            </a:pPr>
+            <a:r>
+              <a:rPr kumimoji="0" lang="en-US" altLang="en-US" sz="2000" b="0" i="0" u="none" strike="noStrike" cap="none" normalizeH="0" baseline="0" dirty="0">
+                <a:ln>
+                  <a:noFill/>
+                </a:ln>
+                <a:solidFill>
+                  <a:srgbClr val="0000FF"/>
+                </a:solidFill>
+                <a:effectLst/>
+                <a:latin typeface="Consolas" panose="020B0609020204030204" pitchFamily="49" charset="0"/>
+              </a:rPr>
+              <a:t>int</a:t>
+            </a:r>
+            <a:r>
+              <a:rPr kumimoji="0" lang="en-US" altLang="en-US" sz="2000" b="0" i="0" u="none" strike="noStrike" cap="none" normalizeH="0" baseline="0" dirty="0">
+                <a:ln>
+                  <a:noFill/>
+                </a:ln>
+                <a:solidFill>
+                  <a:srgbClr val="000000"/>
+                </a:solidFill>
+                <a:effectLst/>
+                <a:latin typeface="Consolas" panose="020B0609020204030204" pitchFamily="49" charset="0"/>
+              </a:rPr>
+              <a:t> </a:t>
+            </a:r>
+            <a:r>
+              <a:rPr kumimoji="0" lang="en-US" altLang="en-US" sz="2000" b="0" i="0" u="none" strike="noStrike" cap="none" normalizeH="0" baseline="0" dirty="0">
+                <a:ln>
+                  <a:noFill/>
+                </a:ln>
+                <a:solidFill>
+                  <a:srgbClr val="74531F"/>
+                </a:solidFill>
+                <a:effectLst/>
+                <a:latin typeface="Consolas" panose="020B0609020204030204" pitchFamily="49" charset="0"/>
+              </a:rPr>
+              <a:t>main</a:t>
+            </a:r>
+            <a:r>
+              <a:rPr kumimoji="0" lang="en-US" altLang="en-US" sz="2000" b="0" i="0" u="none" strike="noStrike" cap="none" normalizeH="0" baseline="0" dirty="0">
+                <a:ln>
+                  <a:noFill/>
+                </a:ln>
+                <a:solidFill>
+                  <a:srgbClr val="000000"/>
+                </a:solidFill>
+                <a:effectLst/>
+                <a:latin typeface="Consolas" panose="020B0609020204030204" pitchFamily="49" charset="0"/>
+              </a:rPr>
+              <a:t>() { </a:t>
+            </a:r>
+          </a:p>
+          <a:p>
+            <a:pPr lvl="0" defTabSz="914400" eaLnBrk="0" fontAlgn="base" hangingPunct="0">
+              <a:spcBef>
+                <a:spcPct val="0"/>
+              </a:spcBef>
+              <a:spcAft>
+                <a:spcPct val="0"/>
+              </a:spcAft>
+            </a:pPr>
+            <a:r>
+              <a:rPr kumimoji="0" lang="en-US" altLang="en-US" sz="2000" b="0" i="0" u="none" strike="noStrike" cap="none" normalizeH="0" baseline="0" dirty="0">
+                <a:ln>
+                  <a:noFill/>
+                </a:ln>
+                <a:solidFill>
+                  <a:srgbClr val="0000FF"/>
+                </a:solidFill>
+                <a:effectLst/>
+                <a:latin typeface="Consolas" panose="020B0609020204030204" pitchFamily="49" charset="0"/>
+              </a:rPr>
+              <a:t>  int</a:t>
+            </a:r>
+            <a:r>
+              <a:rPr kumimoji="0" lang="en-US" altLang="en-US" sz="2000" b="0" i="0" u="none" strike="noStrike" cap="none" normalizeH="0" baseline="0" dirty="0">
+                <a:ln>
+                  <a:noFill/>
+                </a:ln>
+                <a:solidFill>
+                  <a:srgbClr val="000000"/>
+                </a:solidFill>
+                <a:effectLst/>
+                <a:latin typeface="Consolas" panose="020B0609020204030204" pitchFamily="49" charset="0"/>
+              </a:rPr>
+              <a:t> </a:t>
+            </a:r>
+            <a:r>
+              <a:rPr kumimoji="0" lang="en-US" altLang="en-US" sz="2000" b="0" i="0" u="none" strike="noStrike" cap="none" normalizeH="0" baseline="0" dirty="0" err="1">
+                <a:ln>
+                  <a:noFill/>
+                </a:ln>
+                <a:solidFill>
+                  <a:srgbClr val="1F377F"/>
+                </a:solidFill>
+                <a:effectLst/>
+                <a:latin typeface="Consolas" panose="020B0609020204030204" pitchFamily="49" charset="0"/>
+              </a:rPr>
+              <a:t>myvariable</a:t>
+            </a:r>
+            <a:r>
+              <a:rPr kumimoji="0" lang="en-US" altLang="en-US" sz="2000" b="0" i="0" u="none" strike="noStrike" cap="none" normalizeH="0" baseline="0" dirty="0">
+                <a:ln>
+                  <a:noFill/>
+                </a:ln>
+                <a:solidFill>
+                  <a:srgbClr val="000000"/>
+                </a:solidFill>
+                <a:effectLst/>
+                <a:latin typeface="Consolas" panose="020B0609020204030204" pitchFamily="49" charset="0"/>
+              </a:rPr>
+              <a:t> = 90; </a:t>
+            </a:r>
+            <a:r>
+              <a:rPr lang="en-US" altLang="en-US" sz="2000" dirty="0">
+                <a:solidFill>
+                  <a:srgbClr val="008000"/>
+                </a:solidFill>
+                <a:latin typeface="Consolas" panose="020B0609020204030204" pitchFamily="49" charset="0"/>
+              </a:rPr>
+              <a:t>//declare and </a:t>
+            </a:r>
+            <a:r>
+              <a:rPr lang="en-US" altLang="en-US" sz="2000" dirty="0" err="1">
+                <a:solidFill>
+                  <a:srgbClr val="008000"/>
+                </a:solidFill>
+                <a:latin typeface="Consolas" panose="020B0609020204030204" pitchFamily="49" charset="0"/>
+              </a:rPr>
+              <a:t>init</a:t>
+            </a:r>
+            <a:r>
+              <a:rPr lang="en-US" altLang="en-US" sz="2000" dirty="0">
+                <a:solidFill>
+                  <a:srgbClr val="008000"/>
+                </a:solidFill>
+                <a:latin typeface="Consolas" panose="020B0609020204030204" pitchFamily="49" charset="0"/>
+              </a:rPr>
+              <a:t> variable</a:t>
+            </a:r>
+            <a:endParaRPr kumimoji="0" lang="en-US" altLang="en-US" sz="2000" b="0" i="0" u="none" strike="noStrike" cap="none" normalizeH="0" baseline="0" dirty="0">
+              <a:ln>
+                <a:noFill/>
+              </a:ln>
+              <a:solidFill>
+                <a:srgbClr val="000000"/>
+              </a:solidFill>
+              <a:effectLst/>
+              <a:latin typeface="Consolas" panose="020B0609020204030204" pitchFamily="49" charset="0"/>
+            </a:endParaRPr>
+          </a:p>
+          <a:p>
+            <a:pPr defTabSz="914400" eaLnBrk="0" fontAlgn="base" hangingPunct="0">
+              <a:spcBef>
+                <a:spcPct val="0"/>
+              </a:spcBef>
+              <a:spcAft>
+                <a:spcPct val="0"/>
+              </a:spcAft>
+            </a:pPr>
+            <a:r>
+              <a:rPr kumimoji="0" lang="en-US" altLang="en-US" sz="2000" b="0" i="0" u="none" strike="noStrike" cap="none" normalizeH="0" baseline="0" dirty="0">
+                <a:ln>
+                  <a:noFill/>
+                </a:ln>
+                <a:solidFill>
+                  <a:srgbClr val="000000"/>
+                </a:solidFill>
+                <a:effectLst/>
+                <a:latin typeface="Consolas" panose="020B0609020204030204" pitchFamily="49" charset="0"/>
+              </a:rPr>
+              <a:t>  std::cout </a:t>
+            </a:r>
+            <a:r>
+              <a:rPr kumimoji="0" lang="en-US" altLang="en-US" sz="2000" b="0" i="0" u="none" strike="noStrike" cap="none" normalizeH="0" baseline="0" dirty="0">
+                <a:ln>
+                  <a:noFill/>
+                </a:ln>
+                <a:solidFill>
+                  <a:srgbClr val="008080"/>
+                </a:solidFill>
+                <a:effectLst/>
+                <a:latin typeface="Consolas" panose="020B0609020204030204" pitchFamily="49" charset="0"/>
+              </a:rPr>
+              <a:t>&lt;&lt;</a:t>
+            </a:r>
+            <a:r>
+              <a:rPr kumimoji="0" lang="en-US" altLang="en-US" sz="2000" b="0" i="0" u="none" strike="noStrike" cap="none" normalizeH="0" baseline="0" dirty="0">
+                <a:ln>
+                  <a:noFill/>
+                </a:ln>
+                <a:solidFill>
+                  <a:srgbClr val="000000"/>
+                </a:solidFill>
+                <a:effectLst/>
+                <a:latin typeface="Consolas" panose="020B0609020204030204" pitchFamily="49" charset="0"/>
+              </a:rPr>
+              <a:t> &amp;</a:t>
+            </a:r>
+            <a:r>
+              <a:rPr kumimoji="0" lang="en-US" altLang="en-US" sz="2000" b="0" i="0" u="none" strike="noStrike" cap="none" normalizeH="0" baseline="0" dirty="0" err="1">
+                <a:ln>
+                  <a:noFill/>
+                </a:ln>
+                <a:solidFill>
+                  <a:srgbClr val="1F377F"/>
+                </a:solidFill>
+                <a:effectLst/>
+                <a:latin typeface="Consolas" panose="020B0609020204030204" pitchFamily="49" charset="0"/>
+              </a:rPr>
+              <a:t>myvariable</a:t>
+            </a:r>
+            <a:r>
+              <a:rPr kumimoji="0" lang="en-US" altLang="en-US" sz="2000" b="0" i="0" u="none" strike="noStrike" cap="none" normalizeH="0" baseline="0" dirty="0">
+                <a:ln>
+                  <a:noFill/>
+                </a:ln>
+                <a:solidFill>
+                  <a:srgbClr val="000000"/>
+                </a:solidFill>
+                <a:effectLst/>
+                <a:latin typeface="Consolas" panose="020B0609020204030204" pitchFamily="49" charset="0"/>
+              </a:rPr>
+              <a:t> </a:t>
+            </a:r>
+            <a:r>
+              <a:rPr kumimoji="0" lang="en-US" altLang="en-US" sz="2000" b="0" i="0" u="none" strike="noStrike" cap="none" normalizeH="0" baseline="0" dirty="0">
+                <a:ln>
+                  <a:noFill/>
+                </a:ln>
+                <a:solidFill>
+                  <a:srgbClr val="008080"/>
+                </a:solidFill>
+                <a:effectLst/>
+                <a:latin typeface="Consolas" panose="020B0609020204030204" pitchFamily="49" charset="0"/>
+              </a:rPr>
+              <a:t>&lt;&lt;</a:t>
+            </a:r>
+            <a:r>
+              <a:rPr kumimoji="0" lang="en-US" altLang="en-US" sz="2000" b="0" i="0" u="none" strike="noStrike" cap="none" normalizeH="0" baseline="0" dirty="0">
+                <a:ln>
+                  <a:noFill/>
+                </a:ln>
+                <a:solidFill>
+                  <a:srgbClr val="000000"/>
+                </a:solidFill>
+                <a:effectLst/>
+                <a:latin typeface="Consolas" panose="020B0609020204030204" pitchFamily="49" charset="0"/>
+              </a:rPr>
+              <a:t> std::</a:t>
+            </a:r>
+            <a:r>
+              <a:rPr kumimoji="0" lang="en-US" altLang="en-US" sz="2000" b="0" i="0" u="none" strike="noStrike" cap="none" normalizeH="0" baseline="0" dirty="0">
+                <a:ln>
+                  <a:noFill/>
+                </a:ln>
+                <a:solidFill>
+                  <a:srgbClr val="74531F"/>
+                </a:solidFill>
+                <a:effectLst/>
+                <a:latin typeface="Consolas" panose="020B0609020204030204" pitchFamily="49" charset="0"/>
+              </a:rPr>
+              <a:t>endl</a:t>
+            </a:r>
+            <a:r>
+              <a:rPr kumimoji="0" lang="en-US" altLang="en-US" sz="2000" b="0" i="0" u="none" strike="noStrike" cap="none" normalizeH="0" baseline="0" dirty="0">
+                <a:ln>
+                  <a:noFill/>
+                </a:ln>
+                <a:solidFill>
+                  <a:srgbClr val="000000"/>
+                </a:solidFill>
+                <a:effectLst/>
+                <a:latin typeface="Consolas" panose="020B0609020204030204" pitchFamily="49" charset="0"/>
+              </a:rPr>
+              <a:t>; </a:t>
+            </a:r>
+            <a:r>
+              <a:rPr lang="en-US" altLang="en-US" sz="2000" dirty="0">
+                <a:solidFill>
+                  <a:srgbClr val="008000"/>
+                </a:solidFill>
+                <a:latin typeface="Consolas" panose="020B0609020204030204" pitchFamily="49" charset="0"/>
+              </a:rPr>
+              <a:t>//print address of variable</a:t>
+            </a:r>
+            <a:endParaRPr kumimoji="0" lang="en-US" altLang="en-US" sz="2000" b="0" i="0" u="none" strike="noStrike" cap="none" normalizeH="0" baseline="0" dirty="0">
+              <a:ln>
+                <a:noFill/>
+              </a:ln>
+              <a:solidFill>
+                <a:srgbClr val="000000"/>
+              </a:solidFill>
+              <a:effectLst/>
+              <a:latin typeface="Consolas" panose="020B0609020204030204" pitchFamily="49" charset="0"/>
+            </a:endParaRPr>
+          </a:p>
+          <a:p>
+            <a:pPr defTabSz="914400" eaLnBrk="0" fontAlgn="base" hangingPunct="0">
+              <a:spcBef>
+                <a:spcPct val="0"/>
+              </a:spcBef>
+              <a:spcAft>
+                <a:spcPct val="0"/>
+              </a:spcAft>
+            </a:pPr>
+            <a:r>
+              <a:rPr lang="en-US" altLang="en-US" sz="2000" dirty="0">
+                <a:solidFill>
+                  <a:srgbClr val="000000"/>
+                </a:solidFill>
+                <a:latin typeface="Consolas" panose="020B0609020204030204" pitchFamily="49" charset="0"/>
+              </a:rPr>
+              <a:t>  std::cout </a:t>
+            </a:r>
+            <a:r>
+              <a:rPr lang="en-US" altLang="en-US" sz="2000" dirty="0">
+                <a:solidFill>
+                  <a:srgbClr val="008080"/>
+                </a:solidFill>
+                <a:latin typeface="Consolas" panose="020B0609020204030204" pitchFamily="49" charset="0"/>
+              </a:rPr>
+              <a:t>&lt;&lt;</a:t>
+            </a:r>
+            <a:r>
+              <a:rPr lang="en-US" altLang="en-US" sz="2000" dirty="0">
+                <a:solidFill>
+                  <a:srgbClr val="000000"/>
+                </a:solidFill>
+                <a:latin typeface="Consolas" panose="020B0609020204030204" pitchFamily="49" charset="0"/>
+              </a:rPr>
+              <a:t> </a:t>
+            </a:r>
+            <a:r>
+              <a:rPr lang="en-US" altLang="en-US" sz="2000" dirty="0" err="1">
+                <a:solidFill>
+                  <a:srgbClr val="1F377F"/>
+                </a:solidFill>
+                <a:latin typeface="Consolas" panose="020B0609020204030204" pitchFamily="49" charset="0"/>
+              </a:rPr>
+              <a:t>myvariable</a:t>
+            </a:r>
+            <a:r>
+              <a:rPr lang="en-US" altLang="en-US" sz="2000" dirty="0">
+                <a:solidFill>
+                  <a:srgbClr val="000000"/>
+                </a:solidFill>
+                <a:latin typeface="Consolas" panose="020B0609020204030204" pitchFamily="49" charset="0"/>
+              </a:rPr>
+              <a:t> </a:t>
+            </a:r>
+            <a:r>
+              <a:rPr lang="en-US" altLang="en-US" sz="2000" dirty="0">
+                <a:solidFill>
+                  <a:srgbClr val="008080"/>
+                </a:solidFill>
+                <a:latin typeface="Consolas" panose="020B0609020204030204" pitchFamily="49" charset="0"/>
+              </a:rPr>
+              <a:t>&lt;&lt;</a:t>
+            </a:r>
+            <a:r>
+              <a:rPr lang="en-US" altLang="en-US" sz="2000" dirty="0">
+                <a:solidFill>
+                  <a:srgbClr val="000000"/>
+                </a:solidFill>
+                <a:latin typeface="Consolas" panose="020B0609020204030204" pitchFamily="49" charset="0"/>
+              </a:rPr>
+              <a:t> std::</a:t>
+            </a:r>
+            <a:r>
+              <a:rPr lang="en-US" altLang="en-US" sz="2000" dirty="0">
+                <a:solidFill>
+                  <a:srgbClr val="74531F"/>
+                </a:solidFill>
+                <a:latin typeface="Consolas" panose="020B0609020204030204" pitchFamily="49" charset="0"/>
+              </a:rPr>
+              <a:t>endl</a:t>
+            </a:r>
+            <a:r>
+              <a:rPr lang="en-US" altLang="en-US" sz="2000" dirty="0">
+                <a:solidFill>
+                  <a:srgbClr val="000000"/>
+                </a:solidFill>
+                <a:latin typeface="Consolas" panose="020B0609020204030204" pitchFamily="49" charset="0"/>
+              </a:rPr>
+              <a:t>;</a:t>
+            </a:r>
+            <a:r>
+              <a:rPr kumimoji="0" lang="en-US" altLang="en-US" sz="2000" b="0" i="0" u="none" strike="noStrike" cap="none" normalizeH="0" baseline="0" dirty="0">
+                <a:ln>
+                  <a:noFill/>
+                </a:ln>
+                <a:solidFill>
+                  <a:srgbClr val="000000"/>
+                </a:solidFill>
+                <a:effectLst/>
+                <a:latin typeface="Consolas" panose="020B0609020204030204" pitchFamily="49" charset="0"/>
+              </a:rPr>
+              <a:t> </a:t>
+            </a:r>
+            <a:r>
+              <a:rPr lang="en-US" altLang="en-US" sz="2000" dirty="0">
+                <a:solidFill>
+                  <a:srgbClr val="008000"/>
+                </a:solidFill>
+                <a:latin typeface="Consolas" panose="020B0609020204030204" pitchFamily="49" charset="0"/>
+              </a:rPr>
+              <a:t>//print value of variable</a:t>
+            </a:r>
+          </a:p>
+          <a:p>
+            <a:pPr defTabSz="914400" eaLnBrk="0" fontAlgn="base" hangingPunct="0">
+              <a:spcBef>
+                <a:spcPct val="0"/>
+              </a:spcBef>
+              <a:spcAft>
+                <a:spcPct val="0"/>
+              </a:spcAft>
+            </a:pPr>
+            <a:r>
+              <a:rPr kumimoji="0" lang="en-US" altLang="en-US" sz="2000" b="0" i="0" u="none" strike="noStrike" cap="none" normalizeH="0" baseline="0" dirty="0">
+                <a:ln>
+                  <a:noFill/>
+                </a:ln>
+                <a:solidFill>
+                  <a:srgbClr val="8F08C4"/>
+                </a:solidFill>
+                <a:effectLst/>
+                <a:latin typeface="Consolas" panose="020B0609020204030204" pitchFamily="49" charset="0"/>
+              </a:rPr>
+              <a:t>  return</a:t>
+            </a:r>
+            <a:r>
+              <a:rPr kumimoji="0" lang="en-US" altLang="en-US" sz="2000" b="0" i="0" u="none" strike="noStrike" cap="none" normalizeH="0" baseline="0" dirty="0">
+                <a:ln>
+                  <a:noFill/>
+                </a:ln>
+                <a:solidFill>
+                  <a:srgbClr val="000000"/>
+                </a:solidFill>
+                <a:effectLst/>
+                <a:latin typeface="Consolas" panose="020B0609020204030204" pitchFamily="49" charset="0"/>
+              </a:rPr>
+              <a:t> 0; </a:t>
+            </a:r>
+          </a:p>
+          <a:p>
+            <a:pPr marL="0" marR="0" lvl="0" indent="0" algn="l" defTabSz="914400" rtl="0" eaLnBrk="0" fontAlgn="base" latinLnBrk="0" hangingPunct="0">
+              <a:lnSpc>
+                <a:spcPct val="100000"/>
+              </a:lnSpc>
+              <a:spcBef>
+                <a:spcPct val="0"/>
+              </a:spcBef>
+              <a:spcAft>
+                <a:spcPct val="0"/>
+              </a:spcAft>
+              <a:buClrTx/>
+              <a:buSzTx/>
+              <a:buFontTx/>
+              <a:buNone/>
+              <a:tabLst/>
+            </a:pPr>
+            <a:r>
+              <a:rPr kumimoji="0" lang="en-US" altLang="en-US" sz="2000" b="0" i="0" u="none" strike="noStrike" cap="none" normalizeH="0" baseline="0" dirty="0">
+                <a:ln>
+                  <a:noFill/>
+                </a:ln>
+                <a:solidFill>
+                  <a:srgbClr val="000000"/>
+                </a:solidFill>
+                <a:effectLst/>
+                <a:latin typeface="Consolas" panose="020B0609020204030204" pitchFamily="49" charset="0"/>
+              </a:rPr>
+              <a:t>}</a:t>
+            </a:r>
+            <a:endParaRPr kumimoji="0" lang="en-US" altLang="en-US" sz="4800" b="0" i="0" u="none" strike="noStrike" cap="none" normalizeH="0" baseline="0" dirty="0">
+              <a:ln>
+                <a:noFill/>
+              </a:ln>
+              <a:solidFill>
+                <a:schemeClr val="tx1"/>
+              </a:solidFill>
+              <a:effectLst/>
+              <a:latin typeface="Arial" panose="020B0604020202020204" pitchFamily="34" charset="0"/>
+            </a:endParaRPr>
+          </a:p>
+        </p:txBody>
+      </p:sp>
+    </p:spTree>
+    <p:extLst>
+      <p:ext uri="{BB962C8B-B14F-4D97-AF65-F5344CB8AC3E}">
+        <p14:creationId xmlns:p14="http://schemas.microsoft.com/office/powerpoint/2010/main" val="2939417908"/>
+      </p:ext>
+    </p:extLst>
+  </p:cSld>
+  <p:clrMapOvr>
+    <a:masterClrMapping/>
+  </p:clrMapOvr>
+</p:sld>
+</file>
+
+<file path=ppt/slides/slide4.xml><?xml version="1.0" encoding="utf-8"?>
+<p:sld xmlns:a="http://schemas.openxmlformats.org/drawingml/2006/main" xmlns:r="http://schemas.openxmlformats.org/officeDocument/2006/relationships" xmlns:p="http://schemas.openxmlformats.org/presentationml/2006/main">
+  <p:cSld>
+    <p:spTree>
+      <p:nvGrpSpPr>
+        <p:cNvPr id="1" name=""/>
+        <p:cNvGrpSpPr/>
+        <p:nvPr/>
+      </p:nvGrpSpPr>
+      <p:grpSpPr>
+        <a:xfrm>
+          <a:off x="0" y="0"/>
+          <a:ext cx="0" cy="0"/>
+          <a:chOff x="0" y="0"/>
+          <a:chExt cx="0" cy="0"/>
+        </a:xfrm>
+      </p:grpSpPr>
+      <p:sp>
+        <p:nvSpPr>
+          <p:cNvPr id="2" name="Title 1">
+            <a:extLst>
+              <a:ext uri="{FF2B5EF4-FFF2-40B4-BE49-F238E27FC236}">
+                <a16:creationId xmlns:a16="http://schemas.microsoft.com/office/drawing/2014/main" id="{370A12F9-281C-46C8-AE2C-15D1910958B0}"/>
+              </a:ext>
+            </a:extLst>
+          </p:cNvPr>
+          <p:cNvSpPr>
+            <a:spLocks noGrp="1"/>
+          </p:cNvSpPr>
+          <p:nvPr>
+            <p:ph type="title"/>
+          </p:nvPr>
+        </p:nvSpPr>
+        <p:spPr/>
+        <p:txBody>
+          <a:bodyPr/>
+          <a:lstStyle/>
+          <a:p>
+            <a:r>
+              <a:rPr lang="en-US" dirty="0"/>
+              <a:t>Variable Address</a:t>
+            </a:r>
+          </a:p>
+        </p:txBody>
+      </p:sp>
+      <p:sp>
+        <p:nvSpPr>
+          <p:cNvPr id="3" name="Content Placeholder 2">
+            <a:extLst>
+              <a:ext uri="{FF2B5EF4-FFF2-40B4-BE49-F238E27FC236}">
+                <a16:creationId xmlns:a16="http://schemas.microsoft.com/office/drawing/2014/main" id="{2C06C73B-97C8-4203-B063-FF8DC01B180D}"/>
+              </a:ext>
+            </a:extLst>
+          </p:cNvPr>
+          <p:cNvSpPr>
+            <a:spLocks noGrp="1"/>
+          </p:cNvSpPr>
+          <p:nvPr>
+            <p:ph idx="1"/>
+          </p:nvPr>
+        </p:nvSpPr>
+        <p:spPr>
+          <a:xfrm>
+            <a:off x="1371600" y="1638300"/>
+            <a:ext cx="9601200" cy="4796790"/>
+          </a:xfrm>
+        </p:spPr>
+        <p:txBody>
+          <a:bodyPr>
+            <a:normAutofit/>
+          </a:bodyPr>
+          <a:lstStyle/>
+          <a:p>
+            <a:pPr>
+              <a:lnSpc>
+                <a:spcPct val="150000"/>
+              </a:lnSpc>
+            </a:pPr>
+            <a:r>
+              <a:rPr lang="en-US" dirty="0"/>
+              <a:t>The ability to access the address of a variable means we can use the address of variable in calculations or pass them into functions for a performance boost</a:t>
+            </a:r>
+          </a:p>
+          <a:p>
+            <a:pPr>
+              <a:lnSpc>
+                <a:spcPct val="150000"/>
+              </a:lnSpc>
+            </a:pPr>
+            <a:r>
+              <a:rPr lang="en-US" dirty="0"/>
+              <a:t>When you use the variable name, you pass a copy of the variable which is slow. Using the address will help especially when your variables are large as in the case of arrays and vectors (pass by reference vs pass by value)</a:t>
+            </a:r>
+          </a:p>
+          <a:p>
+            <a:pPr>
+              <a:lnSpc>
+                <a:spcPct val="150000"/>
+              </a:lnSpc>
+            </a:pPr>
+            <a:endParaRPr lang="en-US" dirty="0"/>
+          </a:p>
+        </p:txBody>
+      </p:sp>
+    </p:spTree>
+    <p:extLst>
+      <p:ext uri="{BB962C8B-B14F-4D97-AF65-F5344CB8AC3E}">
+        <p14:creationId xmlns:p14="http://schemas.microsoft.com/office/powerpoint/2010/main" val="2661392723"/>
+      </p:ext>
+    </p:extLst>
+  </p:cSld>
+  <p:clrMapOvr>
+    <a:masterClrMapping/>
+  </p:clrMapOvr>
+</p:sld>
+</file>
+
+<file path=ppt/slides/slide5.xml><?xml version="1.0" encoding="utf-8"?>
+<p:sld xmlns:a="http://schemas.openxmlformats.org/drawingml/2006/main" xmlns:r="http://schemas.openxmlformats.org/officeDocument/2006/relationships" xmlns:p="http://schemas.openxmlformats.org/presentationml/2006/main">
+  <p:cSld>
+    <p:spTree>
+      <p:nvGrpSpPr>
+        <p:cNvPr id="1" name=""/>
+        <p:cNvGrpSpPr/>
+        <p:nvPr/>
+      </p:nvGrpSpPr>
+      <p:grpSpPr>
+        <a:xfrm>
+          <a:off x="0" y="0"/>
+          <a:ext cx="0" cy="0"/>
+          <a:chOff x="0" y="0"/>
+          <a:chExt cx="0" cy="0"/>
+        </a:xfrm>
+      </p:grpSpPr>
+      <p:sp>
+        <p:nvSpPr>
+          <p:cNvPr id="2" name="Title 1">
+            <a:extLst>
+              <a:ext uri="{FF2B5EF4-FFF2-40B4-BE49-F238E27FC236}">
+                <a16:creationId xmlns:a16="http://schemas.microsoft.com/office/drawing/2014/main" id="{370A12F9-281C-46C8-AE2C-15D1910958B0}"/>
+              </a:ext>
+            </a:extLst>
+          </p:cNvPr>
+          <p:cNvSpPr>
+            <a:spLocks noGrp="1"/>
+          </p:cNvSpPr>
+          <p:nvPr>
+            <p:ph type="title"/>
+          </p:nvPr>
+        </p:nvSpPr>
+        <p:spPr/>
+        <p:txBody>
+          <a:bodyPr/>
+          <a:lstStyle/>
+          <a:p>
+            <a:r>
+              <a:rPr lang="en-US" dirty="0"/>
+              <a:t>So, what is a pointer?</a:t>
+            </a:r>
+          </a:p>
+        </p:txBody>
+      </p:sp>
+      <p:sp>
+        <p:nvSpPr>
+          <p:cNvPr id="3" name="Content Placeholder 2">
+            <a:extLst>
+              <a:ext uri="{FF2B5EF4-FFF2-40B4-BE49-F238E27FC236}">
+                <a16:creationId xmlns:a16="http://schemas.microsoft.com/office/drawing/2014/main" id="{2C06C73B-97C8-4203-B063-FF8DC01B180D}"/>
+              </a:ext>
+            </a:extLst>
+          </p:cNvPr>
+          <p:cNvSpPr>
+            <a:spLocks noGrp="1"/>
+          </p:cNvSpPr>
+          <p:nvPr>
+            <p:ph idx="1"/>
+          </p:nvPr>
+        </p:nvSpPr>
+        <p:spPr>
+          <a:xfrm>
+            <a:off x="1371600" y="1638300"/>
+            <a:ext cx="9601200" cy="4796790"/>
+          </a:xfrm>
+        </p:spPr>
+        <p:txBody>
+          <a:bodyPr>
+            <a:normAutofit/>
+          </a:bodyPr>
+          <a:lstStyle/>
+          <a:p>
+            <a:pPr>
+              <a:lnSpc>
+                <a:spcPct val="150000"/>
+              </a:lnSpc>
+            </a:pPr>
+            <a:r>
+              <a:rPr lang="en-US" dirty="0"/>
+              <a:t>It’s a </a:t>
+            </a:r>
+            <a:r>
+              <a:rPr lang="en-US" b="1" dirty="0"/>
+              <a:t>variable</a:t>
+            </a:r>
+            <a:r>
+              <a:rPr lang="en-US" dirty="0"/>
+              <a:t> that </a:t>
+            </a:r>
+            <a:r>
+              <a:rPr lang="en-US" b="1" dirty="0"/>
+              <a:t>stores the address </a:t>
+            </a:r>
+            <a:r>
+              <a:rPr lang="en-US" dirty="0"/>
+              <a:t>of another variable. </a:t>
+            </a:r>
+          </a:p>
+          <a:p>
+            <a:pPr>
+              <a:lnSpc>
+                <a:spcPct val="150000"/>
+              </a:lnSpc>
+            </a:pPr>
+            <a:r>
+              <a:rPr lang="en-US" dirty="0"/>
+              <a:t>They have the name pointer since they ‘point to’ the variable who’s address they store</a:t>
+            </a:r>
+          </a:p>
+          <a:p>
+            <a:pPr>
+              <a:lnSpc>
+                <a:spcPct val="150000"/>
+              </a:lnSpc>
+            </a:pPr>
+            <a:r>
+              <a:rPr lang="en-US" dirty="0"/>
+              <a:t>Let’s assume we have ‘</a:t>
+            </a:r>
+            <a:r>
+              <a:rPr lang="en-US" dirty="0" err="1"/>
+              <a:t>myvariable</a:t>
+            </a:r>
+            <a:r>
+              <a:rPr lang="en-US" dirty="0"/>
+              <a:t>’ and then ‘</a:t>
+            </a:r>
+            <a:r>
+              <a:rPr lang="en-US" dirty="0" err="1"/>
+              <a:t>mypointer</a:t>
+            </a:r>
+            <a:r>
+              <a:rPr lang="en-US" dirty="0"/>
+              <a:t>’ has the address of ‘</a:t>
+            </a:r>
+            <a:r>
+              <a:rPr lang="en-US" dirty="0" err="1"/>
+              <a:t>myvariable</a:t>
+            </a:r>
+            <a:r>
+              <a:rPr lang="en-US" dirty="0"/>
+              <a:t>’</a:t>
+            </a:r>
+          </a:p>
+          <a:p>
+            <a:pPr>
+              <a:lnSpc>
+                <a:spcPct val="150000"/>
+              </a:lnSpc>
+            </a:pPr>
+            <a:endParaRPr lang="en-US" dirty="0"/>
+          </a:p>
+          <a:p>
+            <a:pPr>
+              <a:lnSpc>
+                <a:spcPct val="150000"/>
+              </a:lnSpc>
+            </a:pPr>
+            <a:endParaRPr lang="en-US" dirty="0"/>
+          </a:p>
+        </p:txBody>
+      </p:sp>
+    </p:spTree>
+    <p:extLst>
+      <p:ext uri="{BB962C8B-B14F-4D97-AF65-F5344CB8AC3E}">
+        <p14:creationId xmlns:p14="http://schemas.microsoft.com/office/powerpoint/2010/main" val="39150009"/>
+      </p:ext>
+    </p:extLst>
+  </p:cSld>
+  <p:clrMapOvr>
+    <a:masterClrMapping/>
+  </p:clrMapOvr>
+</p:sld>
+</file>
+
+<file path=ppt/slides/slide6.xml><?xml version="1.0" encoding="utf-8"?>
+<p:sld xmlns:a="http://schemas.openxmlformats.org/drawingml/2006/main" xmlns:r="http://schemas.openxmlformats.org/officeDocument/2006/relationships" xmlns:p="http://schemas.openxmlformats.org/presentationml/2006/main">
+  <p:cSld>
+    <p:spTree>
+      <p:nvGrpSpPr>
+        <p:cNvPr id="1" name=""/>
+        <p:cNvGrpSpPr/>
+        <p:nvPr/>
+      </p:nvGrpSpPr>
+      <p:grpSpPr>
+        <a:xfrm>
+          <a:off x="0" y="0"/>
+          <a:ext cx="0" cy="0"/>
+          <a:chOff x="0" y="0"/>
+          <a:chExt cx="0" cy="0"/>
+        </a:xfrm>
+      </p:grpSpPr>
+      <p:sp>
+        <p:nvSpPr>
+          <p:cNvPr id="2" name="Title 1">
+            <a:extLst>
+              <a:ext uri="{FF2B5EF4-FFF2-40B4-BE49-F238E27FC236}">
+                <a16:creationId xmlns:a16="http://schemas.microsoft.com/office/drawing/2014/main" id="{370A12F9-281C-46C8-AE2C-15D1910958B0}"/>
+              </a:ext>
+            </a:extLst>
+          </p:cNvPr>
+          <p:cNvSpPr>
+            <a:spLocks noGrp="1"/>
+          </p:cNvSpPr>
+          <p:nvPr>
+            <p:ph type="title"/>
+          </p:nvPr>
+        </p:nvSpPr>
+        <p:spPr/>
+        <p:txBody>
+          <a:bodyPr/>
+          <a:lstStyle/>
+          <a:p>
+            <a:r>
+              <a:rPr lang="en-US" dirty="0"/>
+              <a:t>So, what is a pointer?</a:t>
+            </a:r>
+          </a:p>
+        </p:txBody>
+      </p:sp>
+      <p:sp>
+        <p:nvSpPr>
+          <p:cNvPr id="3" name="Content Placeholder 2">
+            <a:extLst>
+              <a:ext uri="{FF2B5EF4-FFF2-40B4-BE49-F238E27FC236}">
+                <a16:creationId xmlns:a16="http://schemas.microsoft.com/office/drawing/2014/main" id="{2C06C73B-97C8-4203-B063-FF8DC01B180D}"/>
+              </a:ext>
+            </a:extLst>
+          </p:cNvPr>
+          <p:cNvSpPr>
+            <a:spLocks noGrp="1"/>
+          </p:cNvSpPr>
+          <p:nvPr>
+            <p:ph idx="1"/>
+          </p:nvPr>
+        </p:nvSpPr>
+        <p:spPr>
+          <a:xfrm>
+            <a:off x="1371600" y="1638300"/>
+            <a:ext cx="9601200" cy="4796790"/>
+          </a:xfrm>
+        </p:spPr>
+        <p:txBody>
+          <a:bodyPr>
+            <a:normAutofit/>
+          </a:bodyPr>
+          <a:lstStyle/>
+          <a:p>
+            <a:pPr>
+              <a:lnSpc>
+                <a:spcPct val="150000"/>
+              </a:lnSpc>
+            </a:pPr>
+            <a:r>
+              <a:rPr lang="en-US" dirty="0"/>
+              <a:t>The </a:t>
+            </a:r>
+            <a:r>
+              <a:rPr lang="en-US" b="1" dirty="0"/>
+              <a:t>value </a:t>
+            </a:r>
+            <a:r>
+              <a:rPr lang="en-US" dirty="0"/>
+              <a:t>that a pointer has is the </a:t>
+            </a:r>
+            <a:r>
+              <a:rPr lang="en-US" b="1" dirty="0"/>
+              <a:t>address</a:t>
+            </a:r>
+            <a:r>
+              <a:rPr lang="en-US" dirty="0"/>
+              <a:t> of the variable it points to </a:t>
+            </a:r>
+          </a:p>
+          <a:p>
+            <a:pPr>
+              <a:lnSpc>
+                <a:spcPct val="150000"/>
+              </a:lnSpc>
+            </a:pPr>
+            <a:endParaRPr lang="en-US" dirty="0"/>
+          </a:p>
+          <a:p>
+            <a:pPr>
+              <a:lnSpc>
+                <a:spcPct val="150000"/>
+              </a:lnSpc>
+            </a:pPr>
+            <a:endParaRPr lang="en-US" dirty="0"/>
+          </a:p>
+          <a:p>
+            <a:pPr>
+              <a:lnSpc>
+                <a:spcPct val="150000"/>
+              </a:lnSpc>
+            </a:pPr>
+            <a:endParaRPr lang="en-US" dirty="0"/>
+          </a:p>
+          <a:p>
+            <a:pPr>
+              <a:lnSpc>
+                <a:spcPct val="150000"/>
+              </a:lnSpc>
+            </a:pPr>
+            <a:endParaRPr lang="en-US" dirty="0"/>
+          </a:p>
+          <a:p>
+            <a:pPr>
+              <a:lnSpc>
+                <a:spcPct val="150000"/>
+              </a:lnSpc>
+            </a:pPr>
+            <a:endParaRPr lang="en-US" dirty="0"/>
+          </a:p>
+          <a:p>
+            <a:pPr>
+              <a:lnSpc>
+                <a:spcPct val="150000"/>
+              </a:lnSpc>
+            </a:pPr>
+            <a:endParaRPr lang="en-US" dirty="0"/>
+          </a:p>
+        </p:txBody>
+      </p:sp>
+      <p:graphicFrame>
+        <p:nvGraphicFramePr>
+          <p:cNvPr id="6" name="Table 6">
+            <a:extLst>
+              <a:ext uri="{FF2B5EF4-FFF2-40B4-BE49-F238E27FC236}">
+                <a16:creationId xmlns:a16="http://schemas.microsoft.com/office/drawing/2014/main" id="{DB02E47F-6A7B-4A16-B1FD-5113243AAD4C}"/>
+              </a:ext>
+            </a:extLst>
+          </p:cNvPr>
+          <p:cNvGraphicFramePr>
+            <a:graphicFrameLocks noGrp="1"/>
+          </p:cNvGraphicFramePr>
+          <p:nvPr>
+            <p:extLst>
+              <p:ext uri="{D42A27DB-BD31-4B8C-83A1-F6EECF244321}">
+                <p14:modId xmlns:p14="http://schemas.microsoft.com/office/powerpoint/2010/main" val="624439871"/>
+              </p:ext>
+            </p:extLst>
+          </p:nvPr>
+        </p:nvGraphicFramePr>
+        <p:xfrm>
+          <a:off x="2032000" y="2654935"/>
+          <a:ext cx="8127999" cy="1381760"/>
+        </p:xfrm>
+        <a:graphic>
+          <a:graphicData uri="http://schemas.openxmlformats.org/drawingml/2006/table">
+            <a:tbl>
+              <a:tblPr firstRow="1" bandRow="1">
+                <a:tableStyleId>{5C22544A-7EE6-4342-B048-85BDC9FD1C3A}</a:tableStyleId>
+              </a:tblPr>
+              <a:tblGrid>
+                <a:gridCol w="2709333">
+                  <a:extLst>
+                    <a:ext uri="{9D8B030D-6E8A-4147-A177-3AD203B41FA5}">
+                      <a16:colId xmlns:a16="http://schemas.microsoft.com/office/drawing/2014/main" val="3259214635"/>
+                    </a:ext>
+                  </a:extLst>
+                </a:gridCol>
+                <a:gridCol w="2709333">
+                  <a:extLst>
+                    <a:ext uri="{9D8B030D-6E8A-4147-A177-3AD203B41FA5}">
+                      <a16:colId xmlns:a16="http://schemas.microsoft.com/office/drawing/2014/main" val="3604912846"/>
+                    </a:ext>
+                  </a:extLst>
+                </a:gridCol>
+                <a:gridCol w="2709333">
+                  <a:extLst>
+                    <a:ext uri="{9D8B030D-6E8A-4147-A177-3AD203B41FA5}">
+                      <a16:colId xmlns:a16="http://schemas.microsoft.com/office/drawing/2014/main" val="3957247685"/>
+                    </a:ext>
+                  </a:extLst>
+                </a:gridCol>
+              </a:tblGrid>
+              <a:tr h="370840">
+                <a:tc>
+                  <a:txBody>
+                    <a:bodyPr/>
+                    <a:lstStyle/>
+                    <a:p>
+                      <a:pPr algn="ctr"/>
+                      <a:r>
+                        <a:rPr lang="en-US" dirty="0">
+                          <a:latin typeface="Consolas" panose="020B0609020204030204" pitchFamily="49" charset="0"/>
+                        </a:rPr>
+                        <a:t>Variable Name</a:t>
+                      </a:r>
+                    </a:p>
+                  </a:txBody>
+                  <a:tcPr/>
+                </a:tc>
+                <a:tc>
+                  <a:txBody>
+                    <a:bodyPr/>
+                    <a:lstStyle/>
+                    <a:p>
+                      <a:pPr algn="ctr"/>
+                      <a:r>
+                        <a:rPr lang="en-US" dirty="0">
+                          <a:latin typeface="Consolas" panose="020B0609020204030204" pitchFamily="49" charset="0"/>
+                        </a:rPr>
+                        <a:t>Value</a:t>
+                      </a:r>
+                    </a:p>
+                  </a:txBody>
+                  <a:tcPr/>
+                </a:tc>
+                <a:tc>
+                  <a:txBody>
+                    <a:bodyPr/>
+                    <a:lstStyle/>
+                    <a:p>
+                      <a:pPr algn="ctr"/>
+                      <a:r>
+                        <a:rPr lang="en-US" dirty="0">
+                          <a:latin typeface="Consolas" panose="020B0609020204030204" pitchFamily="49" charset="0"/>
+                        </a:rPr>
+                        <a:t>Address</a:t>
+                      </a:r>
+                    </a:p>
+                  </a:txBody>
+                  <a:tcPr/>
+                </a:tc>
+                <a:extLst>
+                  <a:ext uri="{0D108BD9-81ED-4DB2-BD59-A6C34878D82A}">
+                    <a16:rowId xmlns:a16="http://schemas.microsoft.com/office/drawing/2014/main" val="3355338914"/>
+                  </a:ext>
+                </a:extLst>
+              </a:tr>
+              <a:tr h="370840">
+                <a:tc>
+                  <a:txBody>
+                    <a:bodyPr/>
+                    <a:lstStyle/>
+                    <a:p>
+                      <a:pPr algn="ctr"/>
+                      <a:r>
+                        <a:rPr lang="en-US" dirty="0" err="1">
+                          <a:latin typeface="Consolas" panose="020B0609020204030204" pitchFamily="49" charset="0"/>
+                        </a:rPr>
+                        <a:t>myvariable</a:t>
+                      </a:r>
+                      <a:endParaRPr lang="en-US" dirty="0">
+                        <a:latin typeface="Consolas" panose="020B0609020204030204" pitchFamily="49" charset="0"/>
+                      </a:endParaRPr>
+                    </a:p>
+                  </a:txBody>
+                  <a:tcPr/>
+                </a:tc>
+                <a:tc>
+                  <a:txBody>
+                    <a:bodyPr/>
+                    <a:lstStyle/>
+                    <a:p>
+                      <a:pPr algn="ctr"/>
+                      <a:r>
+                        <a:rPr lang="en-US" dirty="0">
+                          <a:latin typeface="Consolas" panose="020B0609020204030204" pitchFamily="49" charset="0"/>
+                        </a:rPr>
+                        <a:t>90</a:t>
+                      </a:r>
+                    </a:p>
+                  </a:txBody>
+                  <a:tcPr/>
+                </a:tc>
+                <a:tc>
+                  <a:txBody>
+                    <a:bodyPr/>
+                    <a:lstStyle/>
+                    <a:p>
+                      <a:pPr algn="ctr"/>
+                      <a:r>
+                        <a:rPr lang="en-US" dirty="0">
+                          <a:latin typeface="Consolas" panose="020B0609020204030204" pitchFamily="49" charset="0"/>
+                        </a:rPr>
+                        <a:t>0x80808080</a:t>
+                      </a:r>
+                    </a:p>
+                  </a:txBody>
+                  <a:tcPr/>
+                </a:tc>
+                <a:extLst>
+                  <a:ext uri="{0D108BD9-81ED-4DB2-BD59-A6C34878D82A}">
+                    <a16:rowId xmlns:a16="http://schemas.microsoft.com/office/drawing/2014/main" val="2104464815"/>
+                  </a:ext>
+                </a:extLst>
+              </a:tr>
+              <a:tr h="370840">
+                <a:tc>
+                  <a:txBody>
+                    <a:bodyPr/>
+                    <a:lstStyle/>
+                    <a:p>
+                      <a:pPr algn="ctr"/>
+                      <a:r>
+                        <a:rPr lang="en-US" dirty="0" err="1">
+                          <a:latin typeface="Consolas" panose="020B0609020204030204" pitchFamily="49" charset="0"/>
+                        </a:rPr>
+                        <a:t>mypointer</a:t>
+                      </a:r>
+                      <a:endParaRPr lang="en-US" dirty="0">
+                        <a:latin typeface="Consolas" panose="020B0609020204030204" pitchFamily="49" charset="0"/>
+                      </a:endParaRPr>
+                    </a:p>
+                  </a:txBody>
+                  <a:tcPr/>
+                </a:tc>
+                <a:tc>
+                  <a:txBody>
+                    <a:bodyPr/>
+                    <a:lstStyle/>
+                    <a:p>
+                      <a:pPr marL="0" marR="0" lvl="0" indent="0" algn="ctr" defTabSz="914400" rtl="0" eaLnBrk="1" fontAlgn="auto" latinLnBrk="0" hangingPunct="1">
+                        <a:lnSpc>
+                          <a:spcPct val="100000"/>
+                        </a:lnSpc>
+                        <a:spcBef>
+                          <a:spcPts val="0"/>
+                        </a:spcBef>
+                        <a:spcAft>
+                          <a:spcPts val="0"/>
+                        </a:spcAft>
+                        <a:buClrTx/>
+                        <a:buSzTx/>
+                        <a:buFontTx/>
+                        <a:buNone/>
+                        <a:tabLst/>
+                        <a:defRPr/>
+                      </a:pPr>
+                      <a:r>
+                        <a:rPr lang="en-US" dirty="0">
+                          <a:latin typeface="Consolas" panose="020B0609020204030204" pitchFamily="49" charset="0"/>
+                        </a:rPr>
+                        <a:t>0x80808080 = </a:t>
+                      </a:r>
+                    </a:p>
+                    <a:p>
+                      <a:pPr algn="ctr"/>
+                      <a:r>
+                        <a:rPr lang="en-US" dirty="0">
+                          <a:latin typeface="Consolas" panose="020B0609020204030204" pitchFamily="49" charset="0"/>
+                        </a:rPr>
+                        <a:t>‭2,155,905,152‬</a:t>
+                      </a:r>
+                    </a:p>
+                  </a:txBody>
+                  <a:tcPr/>
+                </a:tc>
+                <a:tc>
+                  <a:txBody>
+                    <a:bodyPr/>
+                    <a:lstStyle/>
+                    <a:p>
+                      <a:pPr algn="ctr"/>
+                      <a:r>
+                        <a:rPr lang="en-US" dirty="0">
+                          <a:latin typeface="Consolas" panose="020B0609020204030204" pitchFamily="49" charset="0"/>
+                        </a:rPr>
+                        <a:t>0x11110000</a:t>
+                      </a:r>
+                    </a:p>
+                  </a:txBody>
+                  <a:tcPr/>
+                </a:tc>
+                <a:extLst>
+                  <a:ext uri="{0D108BD9-81ED-4DB2-BD59-A6C34878D82A}">
+                    <a16:rowId xmlns:a16="http://schemas.microsoft.com/office/drawing/2014/main" val="2765885749"/>
+                  </a:ext>
+                </a:extLst>
+              </a:tr>
+            </a:tbl>
+          </a:graphicData>
+        </a:graphic>
+      </p:graphicFrame>
+    </p:spTree>
+    <p:extLst>
+      <p:ext uri="{BB962C8B-B14F-4D97-AF65-F5344CB8AC3E}">
+        <p14:creationId xmlns:p14="http://schemas.microsoft.com/office/powerpoint/2010/main" val="837542702"/>
+      </p:ext>
+    </p:extLst>
+  </p:cSld>
+  <p:clrMapOvr>
+    <a:masterClrMapping/>
+  </p:clrMapOvr>
+</p:sld>
+</file>
+
+<file path=ppt/slides/slide7.xml><?xml version="1.0" encoding="utf-8"?>
+<p:sld xmlns:a="http://schemas.openxmlformats.org/drawingml/2006/main" xmlns:r="http://schemas.openxmlformats.org/officeDocument/2006/relationships" xmlns:p="http://schemas.openxmlformats.org/presentationml/2006/main">
+  <p:cSld>
+    <p:spTree>
+      <p:nvGrpSpPr>
+        <p:cNvPr id="1" name=""/>
+        <p:cNvGrpSpPr/>
+        <p:nvPr/>
+      </p:nvGrpSpPr>
+      <p:grpSpPr>
+        <a:xfrm>
+          <a:off x="0" y="0"/>
+          <a:ext cx="0" cy="0"/>
+          <a:chOff x="0" y="0"/>
+          <a:chExt cx="0" cy="0"/>
+        </a:xfrm>
+      </p:grpSpPr>
+      <p:sp>
+        <p:nvSpPr>
+          <p:cNvPr id="2" name="Title 1">
+            <a:extLst>
+              <a:ext uri="{FF2B5EF4-FFF2-40B4-BE49-F238E27FC236}">
+                <a16:creationId xmlns:a16="http://schemas.microsoft.com/office/drawing/2014/main" id="{370A12F9-281C-46C8-AE2C-15D1910958B0}"/>
+              </a:ext>
+            </a:extLst>
+          </p:cNvPr>
+          <p:cNvSpPr>
+            <a:spLocks noGrp="1"/>
+          </p:cNvSpPr>
+          <p:nvPr>
+            <p:ph type="title"/>
+          </p:nvPr>
+        </p:nvSpPr>
+        <p:spPr/>
+        <p:txBody>
+          <a:bodyPr/>
+          <a:lstStyle/>
+          <a:p>
+            <a:r>
+              <a:rPr lang="en-US" dirty="0"/>
+              <a:t>Pointers in C++</a:t>
+            </a:r>
+          </a:p>
+        </p:txBody>
+      </p:sp>
+      <p:sp>
+        <p:nvSpPr>
+          <p:cNvPr id="3" name="Content Placeholder 2">
+            <a:extLst>
+              <a:ext uri="{FF2B5EF4-FFF2-40B4-BE49-F238E27FC236}">
+                <a16:creationId xmlns:a16="http://schemas.microsoft.com/office/drawing/2014/main" id="{2C06C73B-97C8-4203-B063-FF8DC01B180D}"/>
+              </a:ext>
+            </a:extLst>
+          </p:cNvPr>
+          <p:cNvSpPr>
+            <a:spLocks noGrp="1"/>
+          </p:cNvSpPr>
+          <p:nvPr>
+            <p:ph idx="1"/>
+          </p:nvPr>
+        </p:nvSpPr>
+        <p:spPr>
+          <a:xfrm>
+            <a:off x="1371600" y="1638300"/>
+            <a:ext cx="9932670" cy="4796790"/>
+          </a:xfrm>
+        </p:spPr>
+        <p:txBody>
+          <a:bodyPr>
+            <a:normAutofit/>
+          </a:bodyPr>
+          <a:lstStyle/>
+          <a:p>
+            <a:pPr>
+              <a:lnSpc>
+                <a:spcPct val="150000"/>
+              </a:lnSpc>
+            </a:pPr>
+            <a:r>
+              <a:rPr lang="en-US" dirty="0"/>
+              <a:t>Pointers themselves have to match the datatype of the variable they’re pointing to</a:t>
+            </a:r>
+          </a:p>
+          <a:p>
+            <a:pPr>
+              <a:lnSpc>
+                <a:spcPct val="150000"/>
+              </a:lnSpc>
+            </a:pPr>
+            <a:r>
+              <a:rPr lang="en-US" dirty="0"/>
+              <a:t>Pointers have a special declaration in C++</a:t>
+            </a:r>
+          </a:p>
+          <a:p>
+            <a:pPr>
+              <a:lnSpc>
+                <a:spcPct val="150000"/>
+              </a:lnSpc>
+            </a:pPr>
+            <a:r>
+              <a:rPr lang="en-US" dirty="0"/>
+              <a:t>To get the value of the variable that’s being pointed to from the pointer, the pointer has to be dereferenced</a:t>
+            </a:r>
+          </a:p>
+          <a:p>
+            <a:pPr>
+              <a:lnSpc>
+                <a:spcPct val="150000"/>
+              </a:lnSpc>
+            </a:pPr>
+            <a:r>
+              <a:rPr lang="en-US" dirty="0"/>
+              <a:t>E.g. if we wanted the value of ‘</a:t>
+            </a:r>
+            <a:r>
+              <a:rPr lang="en-US" dirty="0" err="1"/>
+              <a:t>myvariable</a:t>
+            </a:r>
+            <a:r>
+              <a:rPr lang="en-US" dirty="0"/>
+              <a:t>’ from ‘</a:t>
+            </a:r>
+            <a:r>
+              <a:rPr lang="en-US" dirty="0" err="1"/>
+              <a:t>mypointer</a:t>
+            </a:r>
+            <a:r>
+              <a:rPr lang="en-US" dirty="0"/>
+              <a:t>’ we’d have to dereference ‘</a:t>
+            </a:r>
+            <a:r>
+              <a:rPr lang="en-US" dirty="0" err="1"/>
+              <a:t>mypointer</a:t>
+            </a:r>
+            <a:r>
+              <a:rPr lang="en-US" dirty="0"/>
+              <a:t>’</a:t>
+            </a:r>
+          </a:p>
+          <a:p>
+            <a:pPr>
+              <a:lnSpc>
+                <a:spcPct val="150000"/>
+              </a:lnSpc>
+            </a:pPr>
+            <a:r>
+              <a:rPr lang="en-US" dirty="0"/>
+              <a:t>The dereference operator in C++ is </a:t>
+            </a:r>
+            <a:r>
+              <a:rPr lang="en-US" dirty="0">
+                <a:latin typeface="Consolas" panose="020B0609020204030204" pitchFamily="49" charset="0"/>
+              </a:rPr>
+              <a:t>*</a:t>
+            </a:r>
+          </a:p>
+          <a:p>
+            <a:pPr>
+              <a:lnSpc>
+                <a:spcPct val="150000"/>
+              </a:lnSpc>
+            </a:pPr>
+            <a:endParaRPr lang="en-US" dirty="0"/>
+          </a:p>
+          <a:p>
+            <a:pPr>
+              <a:lnSpc>
+                <a:spcPct val="150000"/>
+              </a:lnSpc>
+            </a:pPr>
+            <a:endParaRPr lang="en-US" dirty="0"/>
+          </a:p>
+          <a:p>
+            <a:pPr>
+              <a:lnSpc>
+                <a:spcPct val="150000"/>
+              </a:lnSpc>
+            </a:pPr>
+            <a:endParaRPr lang="en-US" dirty="0"/>
+          </a:p>
+          <a:p>
+            <a:pPr>
+              <a:lnSpc>
+                <a:spcPct val="150000"/>
+              </a:lnSpc>
+            </a:pPr>
+            <a:endParaRPr lang="en-US" dirty="0"/>
+          </a:p>
+          <a:p>
+            <a:pPr>
+              <a:lnSpc>
+                <a:spcPct val="150000"/>
+              </a:lnSpc>
+            </a:pPr>
+            <a:endParaRPr lang="en-US" dirty="0"/>
+          </a:p>
+          <a:p>
+            <a:pPr>
+              <a:lnSpc>
+                <a:spcPct val="150000"/>
+              </a:lnSpc>
+            </a:pPr>
+            <a:endParaRPr lang="en-US" dirty="0"/>
+          </a:p>
+        </p:txBody>
+      </p:sp>
+      <p:pic>
+        <p:nvPicPr>
+          <p:cNvPr id="3074" name="Picture 2" descr="Exploding Head on WhatsApp 2.19.352">
+            <a:extLst>
+              <a:ext uri="{FF2B5EF4-FFF2-40B4-BE49-F238E27FC236}">
+                <a16:creationId xmlns:a16="http://schemas.microsoft.com/office/drawing/2014/main" id="{9291C4D6-0517-40C0-A93E-0ED1C7CBC434}"/>
+              </a:ext>
+            </a:extLst>
+          </p:cNvPr>
+          <p:cNvPicPr>
+            <a:picLocks noChangeAspect="1" noChangeArrowheads="1"/>
+          </p:cNvPicPr>
+          <p:nvPr/>
+        </p:nvPicPr>
+        <p:blipFill>
+          <a:blip r:embed="rId2">
+            <a:extLst>
+              <a:ext uri="{28A0092B-C50C-407E-A947-70E740481C1C}">
+                <a14:useLocalDpi xmlns:a14="http://schemas.microsoft.com/office/drawing/2010/main" val="0"/>
+              </a:ext>
+            </a:extLst>
+          </a:blip>
+          <a:srcRect/>
+          <a:stretch>
+            <a:fillRect/>
+          </a:stretch>
+        </p:blipFill>
+        <p:spPr bwMode="auto">
+          <a:xfrm>
+            <a:off x="5421630" y="3303270"/>
+            <a:ext cx="514350" cy="514350"/>
+          </a:xfrm>
+          <a:prstGeom prst="rect">
+            <a:avLst/>
+          </a:prstGeom>
+          <a:noFill/>
+          <a:extLst>
+            <a:ext uri="{909E8E84-426E-40DD-AFC4-6F175D3DCCD1}">
+              <a14:hiddenFill xmlns:a14="http://schemas.microsoft.com/office/drawing/2010/main">
+                <a:solidFill>
+                  <a:srgbClr val="FFFFFF"/>
+                </a:solidFill>
+              </a14:hiddenFill>
+            </a:ext>
+          </a:extLst>
+        </p:spPr>
+      </p:pic>
+    </p:spTree>
+    <p:extLst>
+      <p:ext uri="{BB962C8B-B14F-4D97-AF65-F5344CB8AC3E}">
+        <p14:creationId xmlns:p14="http://schemas.microsoft.com/office/powerpoint/2010/main" val="3651302968"/>
+      </p:ext>
+    </p:extLst>
+  </p:cSld>
+  <p:clrMapOvr>
+    <a:masterClrMapping/>
+  </p:clrMapOvr>
+</p:sld>
+</file>
+
+<file path=ppt/slides/slide8.xml><?xml version="1.0" encoding="utf-8"?>
+<p:sld xmlns:a="http://schemas.openxmlformats.org/drawingml/2006/main" xmlns:r="http://schemas.openxmlformats.org/officeDocument/2006/relationships" xmlns:p="http://schemas.openxmlformats.org/presentationml/2006/main">
+  <p:cSld>
+    <p:spTree>
+      <p:nvGrpSpPr>
+        <p:cNvPr id="1" name=""/>
+        <p:cNvGrpSpPr/>
+        <p:nvPr/>
+      </p:nvGrpSpPr>
+      <p:grpSpPr>
+        <a:xfrm>
+          <a:off x="0" y="0"/>
+          <a:ext cx="0" cy="0"/>
+          <a:chOff x="0" y="0"/>
+          <a:chExt cx="0" cy="0"/>
+        </a:xfrm>
+      </p:grpSpPr>
+      <p:sp>
+        <p:nvSpPr>
+          <p:cNvPr id="2" name="Title 1">
+            <a:extLst>
+              <a:ext uri="{FF2B5EF4-FFF2-40B4-BE49-F238E27FC236}">
+                <a16:creationId xmlns:a16="http://schemas.microsoft.com/office/drawing/2014/main" id="{370A12F9-281C-46C8-AE2C-15D1910958B0}"/>
+              </a:ext>
+            </a:extLst>
+          </p:cNvPr>
+          <p:cNvSpPr>
+            <a:spLocks noGrp="1"/>
+          </p:cNvSpPr>
+          <p:nvPr>
+            <p:ph type="title"/>
+          </p:nvPr>
+        </p:nvSpPr>
+        <p:spPr/>
+        <p:txBody>
+          <a:bodyPr/>
+          <a:lstStyle/>
+          <a:p>
+            <a:r>
+              <a:rPr lang="en-US" dirty="0"/>
+              <a:t>Pointers in C++</a:t>
+            </a:r>
+          </a:p>
+        </p:txBody>
+      </p:sp>
+      <p:sp>
+        <p:nvSpPr>
+          <p:cNvPr id="3" name="Content Placeholder 2">
+            <a:extLst>
+              <a:ext uri="{FF2B5EF4-FFF2-40B4-BE49-F238E27FC236}">
+                <a16:creationId xmlns:a16="http://schemas.microsoft.com/office/drawing/2014/main" id="{2C06C73B-97C8-4203-B063-FF8DC01B180D}"/>
+              </a:ext>
+            </a:extLst>
+          </p:cNvPr>
+          <p:cNvSpPr>
+            <a:spLocks noGrp="1"/>
+          </p:cNvSpPr>
+          <p:nvPr>
+            <p:ph idx="1"/>
+          </p:nvPr>
+        </p:nvSpPr>
+        <p:spPr>
+          <a:xfrm>
+            <a:off x="1371600" y="1638300"/>
+            <a:ext cx="9601200" cy="4796790"/>
+          </a:xfrm>
+        </p:spPr>
+        <p:txBody>
+          <a:bodyPr>
+            <a:normAutofit/>
+          </a:bodyPr>
+          <a:lstStyle/>
+          <a:p>
+            <a:pPr>
+              <a:lnSpc>
+                <a:spcPct val="150000"/>
+              </a:lnSpc>
+            </a:pPr>
+            <a:endParaRPr lang="en-US" dirty="0"/>
+          </a:p>
+          <a:p>
+            <a:pPr>
+              <a:lnSpc>
+                <a:spcPct val="150000"/>
+              </a:lnSpc>
+            </a:pPr>
+            <a:endParaRPr lang="en-US" dirty="0"/>
+          </a:p>
+          <a:p>
+            <a:pPr>
+              <a:lnSpc>
+                <a:spcPct val="150000"/>
+              </a:lnSpc>
+            </a:pPr>
+            <a:endParaRPr lang="en-US" dirty="0"/>
+          </a:p>
+          <a:p>
+            <a:pPr>
+              <a:lnSpc>
+                <a:spcPct val="150000"/>
+              </a:lnSpc>
+            </a:pPr>
+            <a:endParaRPr lang="en-US" dirty="0"/>
+          </a:p>
+          <a:p>
+            <a:pPr>
+              <a:lnSpc>
+                <a:spcPct val="150000"/>
+              </a:lnSpc>
+            </a:pPr>
+            <a:endParaRPr lang="en-US" dirty="0"/>
+          </a:p>
+          <a:p>
+            <a:pPr>
+              <a:lnSpc>
+                <a:spcPct val="150000"/>
+              </a:lnSpc>
+            </a:pPr>
+            <a:endParaRPr lang="en-US" dirty="0"/>
+          </a:p>
+        </p:txBody>
+      </p:sp>
+      <p:sp>
+        <p:nvSpPr>
+          <p:cNvPr id="4" name="Rectangle 1">
+            <a:extLst>
+              <a:ext uri="{FF2B5EF4-FFF2-40B4-BE49-F238E27FC236}">
+                <a16:creationId xmlns:a16="http://schemas.microsoft.com/office/drawing/2014/main" id="{2782700F-7F1D-4BD4-A137-EBF41D82C307}"/>
+              </a:ext>
+            </a:extLst>
+          </p:cNvPr>
+          <p:cNvSpPr>
+            <a:spLocks noChangeArrowheads="1"/>
+          </p:cNvSpPr>
+          <p:nvPr/>
+        </p:nvSpPr>
+        <p:spPr bwMode="auto">
+          <a:xfrm>
+            <a:off x="1587252" y="1374427"/>
+            <a:ext cx="9494907" cy="5324535"/>
+          </a:xfrm>
+          <a:prstGeom prst="rect">
+            <a:avLst/>
+          </a:prstGeom>
+          <a:solidFill>
+            <a:srgbClr val="FFFFFF"/>
+          </a:solidFill>
+          <a:ln>
+            <a:noFill/>
+          </a:ln>
+          <a:effectLst/>
+          <a:extLst>
+            <a:ext uri="{91240B29-F687-4F45-9708-019B960494DF}">
+              <a14:hiddenLine xmlns:a14="http://schemas.microsoft.com/office/drawing/2010/main" w="9525">
+                <a:solidFill>
+                  <a:schemeClr val="tx1"/>
+                </a:solidFill>
+                <a:miter lim="800000"/>
+                <a:headEnd/>
+                <a:tailEnd/>
+              </a14:hiddenLine>
+            </a:ext>
+            <a:ext uri="{AF507438-7753-43E0-B8FC-AC1667EBCBE1}">
+              <a14:hiddenEffects xmlns:a14="http://schemas.microsoft.com/office/drawing/2010/main">
+                <a:effectLst>
+                  <a:outerShdw dist="35921" dir="2700000" algn="ctr" rotWithShape="0">
+                    <a:schemeClr val="bg2"/>
+                  </a:outerShdw>
+                </a:effectLst>
+              </a14:hiddenEffects>
+            </a:ext>
+          </a:extLst>
+        </p:spPr>
+        <p:txBody>
+          <a:bodyPr vert="horz" wrap="none" lIns="91440" tIns="45720" rIns="91440" bIns="45720" numCol="1" anchor="ctr" anchorCtr="0" compatLnSpc="1">
+            <a:prstTxWarp prst="textNoShape">
+              <a:avLst/>
+            </a:prstTxWarp>
+            <a:spAutoFit/>
+          </a:bodyPr>
+          <a:lstStyle/>
+          <a:p>
+            <a:pPr marL="0" marR="0" lvl="0" indent="0" algn="l" defTabSz="914400" rtl="0" eaLnBrk="0" fontAlgn="base" latinLnBrk="0" hangingPunct="0">
+              <a:lnSpc>
+                <a:spcPct val="100000"/>
+              </a:lnSpc>
+              <a:spcBef>
+                <a:spcPct val="0"/>
+              </a:spcBef>
+              <a:spcAft>
+                <a:spcPct val="0"/>
+              </a:spcAft>
+              <a:buClrTx/>
+              <a:buSzTx/>
+              <a:buFontTx/>
+              <a:buNone/>
+              <a:tabLst/>
+            </a:pPr>
+            <a:r>
+              <a:rPr kumimoji="0" lang="en-US" altLang="en-US" sz="2000" b="0" i="0" u="none" strike="noStrike" cap="none" normalizeH="0" baseline="0" dirty="0">
+                <a:ln>
+                  <a:noFill/>
+                </a:ln>
+                <a:solidFill>
+                  <a:srgbClr val="808080"/>
+                </a:solidFill>
+                <a:effectLst/>
+                <a:latin typeface="Consolas" panose="020B0609020204030204" pitchFamily="49" charset="0"/>
+              </a:rPr>
+              <a:t>#include</a:t>
+            </a:r>
+            <a:r>
+              <a:rPr kumimoji="0" lang="en-US" altLang="en-US" sz="2000" b="0" i="0" u="none" strike="noStrike" cap="none" normalizeH="0" baseline="0" dirty="0">
+                <a:ln>
+                  <a:noFill/>
+                </a:ln>
+                <a:solidFill>
+                  <a:srgbClr val="E21F1F"/>
+                </a:solidFill>
+                <a:effectLst/>
+                <a:latin typeface="Consolas" panose="020B0609020204030204" pitchFamily="49" charset="0"/>
+              </a:rPr>
+              <a:t>&lt;</a:t>
+            </a:r>
+            <a:r>
+              <a:rPr kumimoji="0" lang="en-US" altLang="en-US" sz="2000" b="0" i="0" u="none" strike="noStrike" cap="none" normalizeH="0" baseline="0" dirty="0">
+                <a:ln>
+                  <a:noFill/>
+                </a:ln>
+                <a:solidFill>
+                  <a:srgbClr val="A31515"/>
+                </a:solidFill>
+                <a:effectLst/>
+                <a:latin typeface="Consolas" panose="020B0609020204030204" pitchFamily="49" charset="0"/>
+              </a:rPr>
+              <a:t>iostream</a:t>
+            </a:r>
+            <a:r>
+              <a:rPr kumimoji="0" lang="en-US" altLang="en-US" sz="2000" b="0" i="0" u="none" strike="noStrike" cap="none" normalizeH="0" baseline="0" dirty="0">
+                <a:ln>
+                  <a:noFill/>
+                </a:ln>
+                <a:solidFill>
+                  <a:srgbClr val="E21F1F"/>
+                </a:solidFill>
+                <a:effectLst/>
+                <a:latin typeface="Consolas" panose="020B0609020204030204" pitchFamily="49" charset="0"/>
+              </a:rPr>
+              <a:t>&gt;</a:t>
+            </a:r>
+            <a:r>
+              <a:rPr kumimoji="0" lang="en-US" altLang="en-US" sz="2000" b="0" i="0" u="none" strike="noStrike" cap="none" normalizeH="0" baseline="0" dirty="0">
+                <a:ln>
+                  <a:noFill/>
+                </a:ln>
+                <a:solidFill>
+                  <a:srgbClr val="000000"/>
+                </a:solidFill>
+                <a:effectLst/>
+                <a:latin typeface="Consolas" panose="020B0609020204030204" pitchFamily="49" charset="0"/>
+              </a:rPr>
+              <a:t> </a:t>
+            </a:r>
+          </a:p>
+          <a:p>
+            <a:pPr marL="0" marR="0" lvl="0" indent="0" algn="l" defTabSz="914400" rtl="0" eaLnBrk="0" fontAlgn="base" latinLnBrk="0" hangingPunct="0">
+              <a:lnSpc>
+                <a:spcPct val="100000"/>
+              </a:lnSpc>
+              <a:spcBef>
+                <a:spcPct val="0"/>
+              </a:spcBef>
+              <a:spcAft>
+                <a:spcPct val="0"/>
+              </a:spcAft>
+              <a:buClrTx/>
+              <a:buSzTx/>
+              <a:buFontTx/>
+              <a:buNone/>
+              <a:tabLst/>
+            </a:pPr>
+            <a:r>
+              <a:rPr kumimoji="0" lang="en-US" altLang="en-US" sz="2000" b="0" i="0" u="none" strike="noStrike" cap="none" normalizeH="0" baseline="0" dirty="0">
+                <a:ln>
+                  <a:noFill/>
+                </a:ln>
+                <a:solidFill>
+                  <a:srgbClr val="0000FF"/>
+                </a:solidFill>
+                <a:effectLst/>
+                <a:latin typeface="Consolas" panose="020B0609020204030204" pitchFamily="49" charset="0"/>
+              </a:rPr>
+              <a:t>int</a:t>
+            </a:r>
+            <a:r>
+              <a:rPr kumimoji="0" lang="en-US" altLang="en-US" sz="2000" b="0" i="0" u="none" strike="noStrike" cap="none" normalizeH="0" baseline="0" dirty="0">
+                <a:ln>
+                  <a:noFill/>
+                </a:ln>
+                <a:solidFill>
+                  <a:srgbClr val="000000"/>
+                </a:solidFill>
+                <a:effectLst/>
+                <a:latin typeface="Consolas" panose="020B0609020204030204" pitchFamily="49" charset="0"/>
+              </a:rPr>
+              <a:t> </a:t>
+            </a:r>
+            <a:r>
+              <a:rPr kumimoji="0" lang="en-US" altLang="en-US" sz="2000" b="0" i="0" u="none" strike="noStrike" cap="none" normalizeH="0" baseline="0" dirty="0">
+                <a:ln>
+                  <a:noFill/>
+                </a:ln>
+                <a:solidFill>
+                  <a:srgbClr val="74531F"/>
+                </a:solidFill>
+                <a:effectLst/>
+                <a:latin typeface="Consolas" panose="020B0609020204030204" pitchFamily="49" charset="0"/>
+              </a:rPr>
+              <a:t>main</a:t>
+            </a:r>
+            <a:r>
+              <a:rPr kumimoji="0" lang="en-US" altLang="en-US" sz="2000" b="0" i="0" u="none" strike="noStrike" cap="none" normalizeH="0" baseline="0" dirty="0">
+                <a:ln>
+                  <a:noFill/>
+                </a:ln>
+                <a:solidFill>
+                  <a:srgbClr val="000000"/>
+                </a:solidFill>
+                <a:effectLst/>
+                <a:latin typeface="Consolas" panose="020B0609020204030204" pitchFamily="49" charset="0"/>
+              </a:rPr>
+              <a:t>() { </a:t>
+            </a:r>
+          </a:p>
+          <a:p>
+            <a:pPr defTabSz="914400" eaLnBrk="0" fontAlgn="base" hangingPunct="0">
+              <a:spcBef>
+                <a:spcPct val="0"/>
+              </a:spcBef>
+              <a:spcAft>
+                <a:spcPct val="0"/>
+              </a:spcAft>
+            </a:pPr>
+            <a:r>
+              <a:rPr kumimoji="0" lang="en-US" altLang="en-US" sz="2000" b="0" i="0" u="none" strike="noStrike" cap="none" normalizeH="0" baseline="0" dirty="0">
+                <a:ln>
+                  <a:noFill/>
+                </a:ln>
+                <a:solidFill>
+                  <a:srgbClr val="0000FF"/>
+                </a:solidFill>
+                <a:effectLst/>
+                <a:latin typeface="Consolas" panose="020B0609020204030204" pitchFamily="49" charset="0"/>
+              </a:rPr>
+              <a:t> char</a:t>
+            </a:r>
+            <a:r>
+              <a:rPr kumimoji="0" lang="en-US" altLang="en-US" sz="2000" b="0" i="0" u="none" strike="noStrike" cap="none" normalizeH="0" baseline="0" dirty="0">
+                <a:ln>
+                  <a:noFill/>
+                </a:ln>
+                <a:solidFill>
+                  <a:srgbClr val="000000"/>
+                </a:solidFill>
+                <a:effectLst/>
+                <a:latin typeface="Consolas" panose="020B0609020204030204" pitchFamily="49" charset="0"/>
+              </a:rPr>
+              <a:t> </a:t>
+            </a:r>
+            <a:r>
+              <a:rPr kumimoji="0" lang="en-US" altLang="en-US" sz="2000" b="0" i="0" u="none" strike="noStrike" cap="none" normalizeH="0" baseline="0" dirty="0" err="1">
+                <a:ln>
+                  <a:noFill/>
+                </a:ln>
+                <a:solidFill>
+                  <a:srgbClr val="1F377F"/>
+                </a:solidFill>
+                <a:effectLst/>
+                <a:latin typeface="Consolas" panose="020B0609020204030204" pitchFamily="49" charset="0"/>
+              </a:rPr>
+              <a:t>mychar</a:t>
+            </a:r>
+            <a:r>
+              <a:rPr kumimoji="0" lang="en-US" altLang="en-US" sz="2000" b="0" i="0" u="none" strike="noStrike" cap="none" normalizeH="0" baseline="0" dirty="0">
+                <a:ln>
+                  <a:noFill/>
+                </a:ln>
+                <a:solidFill>
+                  <a:srgbClr val="000000"/>
+                </a:solidFill>
+                <a:effectLst/>
+                <a:latin typeface="Consolas" panose="020B0609020204030204" pitchFamily="49" charset="0"/>
+              </a:rPr>
+              <a:t> = </a:t>
+            </a:r>
+            <a:r>
+              <a:rPr kumimoji="0" lang="en-US" altLang="en-US" sz="2000" b="0" i="0" u="none" strike="noStrike" cap="none" normalizeH="0" baseline="0" dirty="0">
+                <a:ln>
+                  <a:noFill/>
+                </a:ln>
+                <a:solidFill>
+                  <a:srgbClr val="E21F1F"/>
+                </a:solidFill>
+                <a:effectLst/>
+                <a:latin typeface="Consolas" panose="020B0609020204030204" pitchFamily="49" charset="0"/>
+              </a:rPr>
+              <a:t>’</a:t>
+            </a:r>
+            <a:r>
+              <a:rPr kumimoji="0" lang="en-US" altLang="en-US" sz="2000" b="0" i="0" u="none" strike="noStrike" cap="none" normalizeH="0" baseline="0" dirty="0">
+                <a:ln>
+                  <a:noFill/>
+                </a:ln>
+                <a:solidFill>
+                  <a:srgbClr val="A31515"/>
+                </a:solidFill>
+                <a:effectLst/>
+                <a:latin typeface="Consolas" panose="020B0609020204030204" pitchFamily="49" charset="0"/>
+              </a:rPr>
+              <a:t>A</a:t>
+            </a:r>
+            <a:r>
+              <a:rPr kumimoji="0" lang="en-US" altLang="en-US" sz="2000" b="0" i="0" u="none" strike="noStrike" cap="none" normalizeH="0" baseline="0" dirty="0">
+                <a:ln>
+                  <a:noFill/>
+                </a:ln>
+                <a:solidFill>
+                  <a:srgbClr val="E21F1F"/>
+                </a:solidFill>
+                <a:effectLst/>
+                <a:latin typeface="Consolas" panose="020B0609020204030204" pitchFamily="49" charset="0"/>
+              </a:rPr>
+              <a:t>’</a:t>
+            </a:r>
+            <a:r>
+              <a:rPr kumimoji="0" lang="en-US" altLang="en-US" sz="2000" b="0" i="0" u="none" strike="noStrike" cap="none" normalizeH="0" baseline="0" dirty="0">
+                <a:ln>
+                  <a:noFill/>
+                </a:ln>
+                <a:solidFill>
+                  <a:srgbClr val="000000"/>
+                </a:solidFill>
+                <a:effectLst/>
+                <a:latin typeface="Consolas" panose="020B0609020204030204" pitchFamily="49" charset="0"/>
+              </a:rPr>
+              <a:t>; </a:t>
+            </a:r>
+          </a:p>
+          <a:p>
+            <a:pPr defTabSz="914400" eaLnBrk="0" fontAlgn="base" hangingPunct="0">
+              <a:spcBef>
+                <a:spcPct val="0"/>
+              </a:spcBef>
+              <a:spcAft>
+                <a:spcPct val="0"/>
+              </a:spcAft>
+            </a:pPr>
+            <a:r>
+              <a:rPr lang="en-US" altLang="en-US" sz="2000" dirty="0">
+                <a:solidFill>
+                  <a:srgbClr val="000000"/>
+                </a:solidFill>
+                <a:latin typeface="Consolas" panose="020B0609020204030204" pitchFamily="49" charset="0"/>
+              </a:rPr>
+              <a:t> </a:t>
+            </a:r>
+            <a:r>
+              <a:rPr kumimoji="0" lang="en-US" altLang="en-US" sz="2000" b="0" i="0" u="none" strike="noStrike" cap="none" normalizeH="0" baseline="0" dirty="0">
+                <a:ln>
+                  <a:noFill/>
+                </a:ln>
+                <a:solidFill>
+                  <a:srgbClr val="0000FF"/>
+                </a:solidFill>
+                <a:effectLst/>
+                <a:latin typeface="Consolas" panose="020B0609020204030204" pitchFamily="49" charset="0"/>
+              </a:rPr>
+              <a:t>int</a:t>
+            </a:r>
+            <a:r>
+              <a:rPr kumimoji="0" lang="en-US" altLang="en-US" sz="2000" b="0" i="0" u="none" strike="noStrike" cap="none" normalizeH="0" baseline="0" dirty="0">
+                <a:ln>
+                  <a:noFill/>
+                </a:ln>
+                <a:solidFill>
+                  <a:srgbClr val="000000"/>
+                </a:solidFill>
+                <a:effectLst/>
+                <a:latin typeface="Consolas" panose="020B0609020204030204" pitchFamily="49" charset="0"/>
+              </a:rPr>
+              <a:t> </a:t>
+            </a:r>
+            <a:r>
+              <a:rPr kumimoji="0" lang="en-US" altLang="en-US" sz="2000" b="0" i="0" u="none" strike="noStrike" cap="none" normalizeH="0" baseline="0" dirty="0" err="1">
+                <a:ln>
+                  <a:noFill/>
+                </a:ln>
+                <a:solidFill>
+                  <a:srgbClr val="1F377F"/>
+                </a:solidFill>
+                <a:effectLst/>
+                <a:latin typeface="Consolas" panose="020B0609020204030204" pitchFamily="49" charset="0"/>
+              </a:rPr>
+              <a:t>myint</a:t>
+            </a:r>
+            <a:r>
+              <a:rPr kumimoji="0" lang="en-US" altLang="en-US" sz="2000" b="0" i="0" u="none" strike="noStrike" cap="none" normalizeH="0" baseline="0" dirty="0">
+                <a:ln>
+                  <a:noFill/>
+                </a:ln>
+                <a:solidFill>
+                  <a:srgbClr val="000000"/>
+                </a:solidFill>
+                <a:effectLst/>
+                <a:latin typeface="Consolas" panose="020B0609020204030204" pitchFamily="49" charset="0"/>
+              </a:rPr>
+              <a:t> = 90; </a:t>
+            </a:r>
+          </a:p>
+          <a:p>
+            <a:pPr defTabSz="914400" eaLnBrk="0" fontAlgn="base" hangingPunct="0">
+              <a:spcBef>
+                <a:spcPct val="0"/>
+              </a:spcBef>
+              <a:spcAft>
+                <a:spcPct val="0"/>
+              </a:spcAft>
+            </a:pPr>
+            <a:r>
+              <a:rPr lang="en-US" altLang="en-US" sz="2000" dirty="0">
+                <a:solidFill>
+                  <a:srgbClr val="008000"/>
+                </a:solidFill>
+                <a:latin typeface="Consolas" panose="020B0609020204030204" pitchFamily="49" charset="0"/>
+              </a:rPr>
+              <a:t> //declare a character </a:t>
+            </a:r>
+            <a:r>
+              <a:rPr lang="en-US" altLang="en-US" sz="2000" dirty="0" err="1">
+                <a:solidFill>
+                  <a:srgbClr val="008000"/>
+                </a:solidFill>
+                <a:latin typeface="Consolas" panose="020B0609020204030204" pitchFamily="49" charset="0"/>
+              </a:rPr>
+              <a:t>ptr</a:t>
+            </a:r>
+            <a:r>
+              <a:rPr lang="en-US" altLang="en-US" sz="2000" dirty="0">
+                <a:solidFill>
+                  <a:srgbClr val="008000"/>
+                </a:solidFill>
+                <a:latin typeface="Consolas" panose="020B0609020204030204" pitchFamily="49" charset="0"/>
+              </a:rPr>
+              <a:t> and </a:t>
+            </a:r>
+            <a:r>
+              <a:rPr lang="en-US" altLang="en-US" sz="2000" dirty="0" err="1">
+                <a:solidFill>
+                  <a:srgbClr val="008000"/>
+                </a:solidFill>
+                <a:latin typeface="Consolas" panose="020B0609020204030204" pitchFamily="49" charset="0"/>
+              </a:rPr>
+              <a:t>init</a:t>
+            </a:r>
+            <a:r>
+              <a:rPr lang="en-US" altLang="en-US" sz="2000" dirty="0">
+                <a:solidFill>
+                  <a:srgbClr val="008000"/>
+                </a:solidFill>
+                <a:latin typeface="Consolas" panose="020B0609020204030204" pitchFamily="49" charset="0"/>
+              </a:rPr>
+              <a:t> with address of char variable</a:t>
+            </a:r>
+            <a:endParaRPr kumimoji="0" lang="en-US" altLang="en-US" sz="2000" b="0" i="0" u="none" strike="noStrike" cap="none" normalizeH="0" baseline="0" dirty="0">
+              <a:ln>
+                <a:noFill/>
+              </a:ln>
+              <a:solidFill>
+                <a:srgbClr val="000000"/>
+              </a:solidFill>
+              <a:effectLst/>
+              <a:latin typeface="Consolas" panose="020B0609020204030204" pitchFamily="49" charset="0"/>
+            </a:endParaRPr>
+          </a:p>
+          <a:p>
+            <a:pPr defTabSz="914400" eaLnBrk="0" fontAlgn="base" hangingPunct="0">
+              <a:spcBef>
+                <a:spcPct val="0"/>
+              </a:spcBef>
+              <a:spcAft>
+                <a:spcPct val="0"/>
+              </a:spcAft>
+            </a:pPr>
+            <a:r>
+              <a:rPr kumimoji="0" lang="en-US" altLang="en-US" sz="2000" b="0" i="0" u="none" strike="noStrike" cap="none" normalizeH="0" baseline="0" dirty="0">
+                <a:ln>
+                  <a:noFill/>
+                </a:ln>
+                <a:solidFill>
+                  <a:srgbClr val="0000FF"/>
+                </a:solidFill>
+                <a:effectLst/>
+                <a:latin typeface="Consolas" panose="020B0609020204030204" pitchFamily="49" charset="0"/>
+              </a:rPr>
+              <a:t> char</a:t>
+            </a:r>
+            <a:r>
+              <a:rPr kumimoji="0" lang="en-US" altLang="en-US" sz="2000" b="0" i="0" u="none" strike="noStrike" cap="none" normalizeH="0" baseline="0" dirty="0">
+                <a:ln>
+                  <a:noFill/>
+                </a:ln>
+                <a:solidFill>
+                  <a:srgbClr val="000000"/>
+                </a:solidFill>
+                <a:effectLst/>
+                <a:latin typeface="Consolas" panose="020B0609020204030204" pitchFamily="49" charset="0"/>
+              </a:rPr>
+              <a:t>* </a:t>
+            </a:r>
+            <a:r>
+              <a:rPr kumimoji="0" lang="en-US" altLang="en-US" sz="2000" b="0" i="0" u="none" strike="noStrike" cap="none" normalizeH="0" baseline="0" dirty="0" err="1">
+                <a:ln>
+                  <a:noFill/>
+                </a:ln>
+                <a:solidFill>
+                  <a:srgbClr val="1F377F"/>
+                </a:solidFill>
+                <a:effectLst/>
+                <a:latin typeface="Consolas" panose="020B0609020204030204" pitchFamily="49" charset="0"/>
+              </a:rPr>
+              <a:t>mycharptr</a:t>
+            </a:r>
+            <a:r>
+              <a:rPr kumimoji="0" lang="en-US" altLang="en-US" sz="2000" b="0" i="0" u="none" strike="noStrike" cap="none" normalizeH="0" baseline="0" dirty="0">
+                <a:ln>
+                  <a:noFill/>
+                </a:ln>
+                <a:solidFill>
+                  <a:srgbClr val="000000"/>
+                </a:solidFill>
+                <a:effectLst/>
+                <a:latin typeface="Consolas" panose="020B0609020204030204" pitchFamily="49" charset="0"/>
+              </a:rPr>
+              <a:t> = &amp;</a:t>
+            </a:r>
+            <a:r>
+              <a:rPr kumimoji="0" lang="en-US" altLang="en-US" sz="2000" b="0" i="0" u="none" strike="noStrike" cap="none" normalizeH="0" baseline="0" dirty="0" err="1">
+                <a:ln>
+                  <a:noFill/>
+                </a:ln>
+                <a:solidFill>
+                  <a:srgbClr val="1F377F"/>
+                </a:solidFill>
+                <a:effectLst/>
+                <a:latin typeface="Consolas" panose="020B0609020204030204" pitchFamily="49" charset="0"/>
+              </a:rPr>
+              <a:t>mychar</a:t>
+            </a:r>
+            <a:r>
+              <a:rPr kumimoji="0" lang="en-US" altLang="en-US" sz="2000" b="0" i="0" u="none" strike="noStrike" cap="none" normalizeH="0" baseline="0" dirty="0">
+                <a:ln>
+                  <a:noFill/>
+                </a:ln>
+                <a:solidFill>
+                  <a:srgbClr val="000000"/>
+                </a:solidFill>
+                <a:effectLst/>
+                <a:latin typeface="Consolas" panose="020B0609020204030204" pitchFamily="49" charset="0"/>
+              </a:rPr>
+              <a:t>; </a:t>
+            </a:r>
+          </a:p>
+          <a:p>
+            <a:pPr defTabSz="914400" eaLnBrk="0" fontAlgn="base" hangingPunct="0">
+              <a:spcBef>
+                <a:spcPct val="0"/>
+              </a:spcBef>
+              <a:spcAft>
+                <a:spcPct val="0"/>
+              </a:spcAft>
+            </a:pPr>
+            <a:r>
+              <a:rPr lang="en-US" altLang="en-US" sz="2000" dirty="0">
+                <a:solidFill>
+                  <a:srgbClr val="008000"/>
+                </a:solidFill>
+                <a:latin typeface="Consolas" panose="020B0609020204030204" pitchFamily="49" charset="0"/>
+              </a:rPr>
+              <a:t> //declare an int </a:t>
+            </a:r>
+            <a:r>
+              <a:rPr lang="en-US" altLang="en-US" sz="2000" dirty="0" err="1">
+                <a:solidFill>
+                  <a:srgbClr val="008000"/>
+                </a:solidFill>
+                <a:latin typeface="Consolas" panose="020B0609020204030204" pitchFamily="49" charset="0"/>
+              </a:rPr>
+              <a:t>ptr</a:t>
+            </a:r>
+            <a:r>
+              <a:rPr lang="en-US" altLang="en-US" sz="2000" dirty="0">
+                <a:solidFill>
+                  <a:srgbClr val="008000"/>
+                </a:solidFill>
+                <a:latin typeface="Consolas" panose="020B0609020204030204" pitchFamily="49" charset="0"/>
+              </a:rPr>
+              <a:t> and </a:t>
+            </a:r>
+            <a:r>
+              <a:rPr lang="en-US" altLang="en-US" sz="2000" dirty="0" err="1">
+                <a:solidFill>
+                  <a:srgbClr val="008000"/>
+                </a:solidFill>
+                <a:latin typeface="Consolas" panose="020B0609020204030204" pitchFamily="49" charset="0"/>
+              </a:rPr>
+              <a:t>init</a:t>
+            </a:r>
+            <a:r>
+              <a:rPr lang="en-US" altLang="en-US" sz="2000" dirty="0">
+                <a:solidFill>
+                  <a:srgbClr val="008000"/>
+                </a:solidFill>
+                <a:latin typeface="Consolas" panose="020B0609020204030204" pitchFamily="49" charset="0"/>
+              </a:rPr>
+              <a:t> with address of int variable</a:t>
+            </a:r>
+            <a:endParaRPr kumimoji="0" lang="en-US" altLang="en-US" sz="2000" b="0" i="0" u="none" strike="noStrike" cap="none" normalizeH="0" baseline="0" dirty="0">
+              <a:ln>
+                <a:noFill/>
+              </a:ln>
+              <a:solidFill>
+                <a:srgbClr val="000000"/>
+              </a:solidFill>
+              <a:effectLst/>
+              <a:latin typeface="Consolas" panose="020B0609020204030204" pitchFamily="49" charset="0"/>
+            </a:endParaRPr>
+          </a:p>
+          <a:p>
+            <a:pPr marL="0" marR="0" lvl="0" indent="0" algn="l" defTabSz="914400" rtl="0" eaLnBrk="0" fontAlgn="base" latinLnBrk="0" hangingPunct="0">
+              <a:lnSpc>
+                <a:spcPct val="100000"/>
+              </a:lnSpc>
+              <a:spcBef>
+                <a:spcPct val="0"/>
+              </a:spcBef>
+              <a:spcAft>
+                <a:spcPct val="0"/>
+              </a:spcAft>
+              <a:buClrTx/>
+              <a:buSzTx/>
+              <a:buFontTx/>
+              <a:buNone/>
+              <a:tabLst/>
+            </a:pPr>
+            <a:r>
+              <a:rPr kumimoji="0" lang="en-US" altLang="en-US" sz="2000" b="0" i="0" u="none" strike="noStrike" cap="none" normalizeH="0" baseline="0" dirty="0">
+                <a:ln>
+                  <a:noFill/>
+                </a:ln>
+                <a:solidFill>
+                  <a:srgbClr val="0000FF"/>
+                </a:solidFill>
+                <a:effectLst/>
+                <a:latin typeface="Consolas" panose="020B0609020204030204" pitchFamily="49" charset="0"/>
+              </a:rPr>
+              <a:t> int</a:t>
+            </a:r>
+            <a:r>
+              <a:rPr kumimoji="0" lang="en-US" altLang="en-US" sz="2000" b="0" i="0" u="none" strike="noStrike" cap="none" normalizeH="0" baseline="0" dirty="0">
+                <a:ln>
+                  <a:noFill/>
+                </a:ln>
+                <a:solidFill>
+                  <a:srgbClr val="000000"/>
+                </a:solidFill>
+                <a:effectLst/>
+                <a:latin typeface="Consolas" panose="020B0609020204030204" pitchFamily="49" charset="0"/>
+              </a:rPr>
+              <a:t>* </a:t>
+            </a:r>
+            <a:r>
+              <a:rPr kumimoji="0" lang="en-US" altLang="en-US" sz="2000" b="0" i="0" u="none" strike="noStrike" cap="none" normalizeH="0" baseline="0" dirty="0" err="1">
+                <a:ln>
+                  <a:noFill/>
+                </a:ln>
+                <a:solidFill>
+                  <a:srgbClr val="1F377F"/>
+                </a:solidFill>
+                <a:effectLst/>
+                <a:latin typeface="Consolas" panose="020B0609020204030204" pitchFamily="49" charset="0"/>
+              </a:rPr>
+              <a:t>myintptr</a:t>
+            </a:r>
+            <a:r>
+              <a:rPr kumimoji="0" lang="en-US" altLang="en-US" sz="2000" b="0" i="0" u="none" strike="noStrike" cap="none" normalizeH="0" baseline="0" dirty="0">
+                <a:ln>
+                  <a:noFill/>
+                </a:ln>
+                <a:solidFill>
+                  <a:srgbClr val="000000"/>
+                </a:solidFill>
+                <a:effectLst/>
+                <a:latin typeface="Consolas" panose="020B0609020204030204" pitchFamily="49" charset="0"/>
+              </a:rPr>
+              <a:t> = &amp;</a:t>
+            </a:r>
+            <a:r>
+              <a:rPr kumimoji="0" lang="en-US" altLang="en-US" sz="2000" b="0" i="0" u="none" strike="noStrike" cap="none" normalizeH="0" baseline="0" dirty="0" err="1">
+                <a:ln>
+                  <a:noFill/>
+                </a:ln>
+                <a:solidFill>
+                  <a:srgbClr val="1F377F"/>
+                </a:solidFill>
+                <a:effectLst/>
+                <a:latin typeface="Consolas" panose="020B0609020204030204" pitchFamily="49" charset="0"/>
+              </a:rPr>
+              <a:t>myint</a:t>
+            </a:r>
+            <a:r>
+              <a:rPr kumimoji="0" lang="en-US" altLang="en-US" sz="2000" b="0" i="0" u="none" strike="noStrike" cap="none" normalizeH="0" baseline="0" dirty="0">
+                <a:ln>
+                  <a:noFill/>
+                </a:ln>
+                <a:solidFill>
+                  <a:srgbClr val="000000"/>
+                </a:solidFill>
+                <a:effectLst/>
+                <a:latin typeface="Consolas" panose="020B0609020204030204" pitchFamily="49" charset="0"/>
+              </a:rPr>
+              <a:t>; </a:t>
+            </a:r>
+          </a:p>
+          <a:p>
+            <a:pPr marL="0" marR="0" lvl="0" indent="0" algn="l" defTabSz="914400" rtl="0" eaLnBrk="0" fontAlgn="base" latinLnBrk="0" hangingPunct="0">
+              <a:lnSpc>
+                <a:spcPct val="100000"/>
+              </a:lnSpc>
+              <a:spcBef>
+                <a:spcPct val="0"/>
+              </a:spcBef>
+              <a:spcAft>
+                <a:spcPct val="0"/>
+              </a:spcAft>
+              <a:buClrTx/>
+              <a:buSzTx/>
+              <a:buFontTx/>
+              <a:buNone/>
+              <a:tabLst/>
+            </a:pPr>
+            <a:r>
+              <a:rPr kumimoji="0" lang="en-US" altLang="en-US" sz="2000" b="0" i="0" u="none" strike="noStrike" cap="none" normalizeH="0" baseline="0" dirty="0">
+                <a:ln>
+                  <a:noFill/>
+                </a:ln>
+                <a:solidFill>
+                  <a:srgbClr val="000000"/>
+                </a:solidFill>
+                <a:effectLst/>
+                <a:latin typeface="Consolas" panose="020B0609020204030204" pitchFamily="49" charset="0"/>
+              </a:rPr>
+              <a:t> std::cout </a:t>
+            </a:r>
+            <a:r>
+              <a:rPr kumimoji="0" lang="en-US" altLang="en-US" sz="2000" b="0" i="0" u="none" strike="noStrike" cap="none" normalizeH="0" baseline="0" dirty="0">
+                <a:ln>
+                  <a:noFill/>
+                </a:ln>
+                <a:solidFill>
+                  <a:srgbClr val="008080"/>
+                </a:solidFill>
+                <a:effectLst/>
+                <a:latin typeface="Consolas" panose="020B0609020204030204" pitchFamily="49" charset="0"/>
+              </a:rPr>
+              <a:t>&lt;&lt;</a:t>
+            </a:r>
+            <a:r>
+              <a:rPr kumimoji="0" lang="en-US" altLang="en-US" sz="2000" b="0" i="0" u="none" strike="noStrike" cap="none" normalizeH="0" baseline="0" dirty="0">
+                <a:ln>
+                  <a:noFill/>
+                </a:ln>
+                <a:solidFill>
+                  <a:srgbClr val="000000"/>
+                </a:solidFill>
+                <a:effectLst/>
+                <a:latin typeface="Consolas" panose="020B0609020204030204" pitchFamily="49" charset="0"/>
+              </a:rPr>
+              <a:t> </a:t>
+            </a:r>
+            <a:r>
+              <a:rPr kumimoji="0" lang="en-US" altLang="en-US" sz="2000" b="0" i="0" u="none" strike="noStrike" cap="none" normalizeH="0" baseline="0" dirty="0">
+                <a:ln>
+                  <a:noFill/>
+                </a:ln>
+                <a:solidFill>
+                  <a:srgbClr val="E21F1F"/>
+                </a:solidFill>
+                <a:effectLst/>
+                <a:latin typeface="Consolas" panose="020B0609020204030204" pitchFamily="49" charset="0"/>
+              </a:rPr>
+              <a:t>"</a:t>
+            </a:r>
+            <a:r>
+              <a:rPr kumimoji="0" lang="en-US" altLang="en-US" sz="2000" b="0" i="0" u="none" strike="noStrike" cap="none" normalizeH="0" baseline="0" dirty="0">
+                <a:ln>
+                  <a:noFill/>
+                </a:ln>
+                <a:solidFill>
+                  <a:srgbClr val="A31515"/>
+                </a:solidFill>
+                <a:effectLst/>
+                <a:latin typeface="Consolas" panose="020B0609020204030204" pitchFamily="49" charset="0"/>
+              </a:rPr>
+              <a:t>The character value is: </a:t>
+            </a:r>
+            <a:r>
+              <a:rPr kumimoji="0" lang="en-US" altLang="en-US" sz="2000" b="0" i="0" u="none" strike="noStrike" cap="none" normalizeH="0" baseline="0" dirty="0">
+                <a:ln>
+                  <a:noFill/>
+                </a:ln>
+                <a:solidFill>
+                  <a:srgbClr val="E21F1F"/>
+                </a:solidFill>
+                <a:effectLst/>
+                <a:latin typeface="Consolas" panose="020B0609020204030204" pitchFamily="49" charset="0"/>
+              </a:rPr>
+              <a:t>"</a:t>
+            </a:r>
+            <a:r>
+              <a:rPr kumimoji="0" lang="en-US" altLang="en-US" sz="2000" b="0" i="0" u="none" strike="noStrike" cap="none" normalizeH="0" baseline="0" dirty="0">
+                <a:ln>
+                  <a:noFill/>
+                </a:ln>
+                <a:solidFill>
+                  <a:srgbClr val="000000"/>
+                </a:solidFill>
+                <a:effectLst/>
+                <a:latin typeface="Consolas" panose="020B0609020204030204" pitchFamily="49" charset="0"/>
+              </a:rPr>
+              <a:t> </a:t>
+            </a:r>
+            <a:r>
+              <a:rPr kumimoji="0" lang="en-US" altLang="en-US" sz="2000" b="0" i="0" u="none" strike="noStrike" cap="none" normalizeH="0" baseline="0" dirty="0">
+                <a:ln>
+                  <a:noFill/>
+                </a:ln>
+                <a:solidFill>
+                  <a:srgbClr val="008080"/>
+                </a:solidFill>
+                <a:effectLst/>
+                <a:latin typeface="Consolas" panose="020B0609020204030204" pitchFamily="49" charset="0"/>
+              </a:rPr>
+              <a:t>&lt;&lt;</a:t>
+            </a:r>
+            <a:r>
+              <a:rPr kumimoji="0" lang="en-US" altLang="en-US" sz="2000" b="0" i="0" u="none" strike="noStrike" cap="none" normalizeH="0" baseline="0" dirty="0">
+                <a:ln>
+                  <a:noFill/>
+                </a:ln>
+                <a:solidFill>
+                  <a:srgbClr val="000000"/>
+                </a:solidFill>
+                <a:effectLst/>
+                <a:latin typeface="Consolas" panose="020B0609020204030204" pitchFamily="49" charset="0"/>
+              </a:rPr>
+              <a:t>*</a:t>
+            </a:r>
+            <a:r>
+              <a:rPr kumimoji="0" lang="en-US" altLang="en-US" sz="2000" b="0" i="0" u="none" strike="noStrike" cap="none" normalizeH="0" baseline="0" dirty="0" err="1">
+                <a:ln>
+                  <a:noFill/>
+                </a:ln>
+                <a:solidFill>
+                  <a:srgbClr val="1F377F"/>
+                </a:solidFill>
+                <a:effectLst/>
+                <a:latin typeface="Consolas" panose="020B0609020204030204" pitchFamily="49" charset="0"/>
+              </a:rPr>
+              <a:t>mycharptr</a:t>
+            </a:r>
+            <a:r>
+              <a:rPr kumimoji="0" lang="en-US" altLang="en-US" sz="2000" b="0" i="0" u="none" strike="noStrike" cap="none" normalizeH="0" baseline="0" dirty="0">
+                <a:ln>
+                  <a:noFill/>
+                </a:ln>
+                <a:solidFill>
+                  <a:srgbClr val="000000"/>
+                </a:solidFill>
+                <a:effectLst/>
+                <a:latin typeface="Consolas" panose="020B0609020204030204" pitchFamily="49" charset="0"/>
+              </a:rPr>
+              <a:t> </a:t>
+            </a:r>
+          </a:p>
+          <a:p>
+            <a:pPr marL="0" marR="0" lvl="0" indent="0" algn="l" defTabSz="914400" rtl="0" eaLnBrk="0" fontAlgn="base" latinLnBrk="0" hangingPunct="0">
+              <a:lnSpc>
+                <a:spcPct val="100000"/>
+              </a:lnSpc>
+              <a:spcBef>
+                <a:spcPct val="0"/>
+              </a:spcBef>
+              <a:spcAft>
+                <a:spcPct val="0"/>
+              </a:spcAft>
+              <a:buClrTx/>
+              <a:buSzTx/>
+              <a:buFontTx/>
+              <a:buNone/>
+              <a:tabLst/>
+            </a:pPr>
+            <a:r>
+              <a:rPr lang="en-US" altLang="en-US" sz="2000" dirty="0">
+                <a:solidFill>
+                  <a:srgbClr val="000000"/>
+                </a:solidFill>
+                <a:latin typeface="Consolas" panose="020B0609020204030204" pitchFamily="49" charset="0"/>
+              </a:rPr>
+              <a:t>           </a:t>
+            </a:r>
+            <a:r>
+              <a:rPr kumimoji="0" lang="en-US" altLang="en-US" sz="2000" b="0" i="0" u="none" strike="noStrike" cap="none" normalizeH="0" baseline="0" dirty="0">
+                <a:ln>
+                  <a:noFill/>
+                </a:ln>
+                <a:solidFill>
+                  <a:srgbClr val="008080"/>
+                </a:solidFill>
+                <a:effectLst/>
+                <a:latin typeface="Consolas" panose="020B0609020204030204" pitchFamily="49" charset="0"/>
+              </a:rPr>
+              <a:t>&lt;&lt;</a:t>
+            </a:r>
+            <a:r>
+              <a:rPr kumimoji="0" lang="en-US" altLang="en-US" sz="2000" b="0" i="0" u="none" strike="noStrike" cap="none" normalizeH="0" baseline="0" dirty="0">
+                <a:ln>
+                  <a:noFill/>
+                </a:ln>
+                <a:solidFill>
+                  <a:srgbClr val="E21F1F"/>
+                </a:solidFill>
+                <a:effectLst/>
+                <a:latin typeface="Consolas" panose="020B0609020204030204" pitchFamily="49" charset="0"/>
+              </a:rPr>
+              <a:t>"</a:t>
+            </a:r>
+            <a:r>
+              <a:rPr kumimoji="0" lang="en-US" altLang="en-US" sz="2000" b="0" i="0" u="none" strike="noStrike" cap="none" normalizeH="0" baseline="0" dirty="0">
+                <a:ln>
+                  <a:noFill/>
+                </a:ln>
+                <a:solidFill>
+                  <a:srgbClr val="A31515"/>
+                </a:solidFill>
+                <a:effectLst/>
+                <a:latin typeface="Consolas" panose="020B0609020204030204" pitchFamily="49" charset="0"/>
+              </a:rPr>
+              <a:t>. The address is: </a:t>
+            </a:r>
+            <a:r>
+              <a:rPr kumimoji="0" lang="en-US" altLang="en-US" sz="2000" b="0" i="0" u="none" strike="noStrike" cap="none" normalizeH="0" baseline="0" dirty="0">
+                <a:ln>
+                  <a:noFill/>
+                </a:ln>
+                <a:solidFill>
+                  <a:srgbClr val="E21F1F"/>
+                </a:solidFill>
+                <a:effectLst/>
+                <a:latin typeface="Consolas" panose="020B0609020204030204" pitchFamily="49" charset="0"/>
+              </a:rPr>
+              <a:t>"</a:t>
+            </a:r>
+            <a:r>
+              <a:rPr kumimoji="0" lang="en-US" altLang="en-US" sz="2000" b="0" i="0" u="none" strike="noStrike" cap="none" normalizeH="0" baseline="0" dirty="0">
+                <a:ln>
+                  <a:noFill/>
+                </a:ln>
+                <a:solidFill>
+                  <a:srgbClr val="008080"/>
+                </a:solidFill>
+                <a:effectLst/>
+                <a:latin typeface="Consolas" panose="020B0609020204030204" pitchFamily="49" charset="0"/>
+              </a:rPr>
+              <a:t>&lt;&lt;</a:t>
+            </a:r>
+            <a:r>
+              <a:rPr kumimoji="0" lang="en-US" altLang="en-US" sz="2000" b="0" i="0" u="none" strike="noStrike" cap="none" normalizeH="0" baseline="0" dirty="0">
+                <a:ln>
+                  <a:noFill/>
+                </a:ln>
+                <a:solidFill>
+                  <a:srgbClr val="000000"/>
+                </a:solidFill>
+                <a:effectLst/>
+                <a:latin typeface="Consolas" panose="020B0609020204030204" pitchFamily="49" charset="0"/>
+              </a:rPr>
+              <a:t> </a:t>
+            </a:r>
+            <a:r>
+              <a:rPr kumimoji="0" lang="en-US" altLang="en-US" sz="2000" b="0" i="0" u="none" strike="noStrike" cap="none" normalizeH="0" baseline="0" dirty="0" err="1">
+                <a:ln>
+                  <a:noFill/>
+                </a:ln>
+                <a:solidFill>
+                  <a:srgbClr val="0000FF"/>
+                </a:solidFill>
+                <a:effectLst/>
+                <a:latin typeface="Consolas" panose="020B0609020204030204" pitchFamily="49" charset="0"/>
+              </a:rPr>
+              <a:t>static_cast</a:t>
+            </a:r>
+            <a:r>
+              <a:rPr kumimoji="0" lang="en-US" altLang="en-US" sz="2000" b="0" i="0" u="none" strike="noStrike" cap="none" normalizeH="0" baseline="0" dirty="0">
+                <a:ln>
+                  <a:noFill/>
+                </a:ln>
+                <a:solidFill>
+                  <a:srgbClr val="000000"/>
+                </a:solidFill>
+                <a:effectLst/>
+                <a:latin typeface="Consolas" panose="020B0609020204030204" pitchFamily="49" charset="0"/>
+              </a:rPr>
+              <a:t>&lt;</a:t>
+            </a:r>
+            <a:r>
+              <a:rPr kumimoji="0" lang="en-US" altLang="en-US" sz="2000" b="0" i="0" u="none" strike="noStrike" cap="none" normalizeH="0" baseline="0" dirty="0">
+                <a:ln>
+                  <a:noFill/>
+                </a:ln>
+                <a:solidFill>
+                  <a:srgbClr val="0000FF"/>
+                </a:solidFill>
+                <a:effectLst/>
+                <a:latin typeface="Consolas" panose="020B0609020204030204" pitchFamily="49" charset="0"/>
+              </a:rPr>
+              <a:t>void</a:t>
+            </a:r>
+            <a:r>
+              <a:rPr kumimoji="0" lang="en-US" altLang="en-US" sz="2000" b="0" i="0" u="none" strike="noStrike" cap="none" normalizeH="0" baseline="0" dirty="0">
+                <a:ln>
+                  <a:noFill/>
+                </a:ln>
+                <a:solidFill>
+                  <a:srgbClr val="000000"/>
+                </a:solidFill>
+                <a:effectLst/>
+                <a:latin typeface="Consolas" panose="020B0609020204030204" pitchFamily="49" charset="0"/>
+              </a:rPr>
+              <a:t>*&gt;(</a:t>
+            </a:r>
+            <a:r>
+              <a:rPr kumimoji="0" lang="en-US" altLang="en-US" sz="2000" b="0" i="0" u="none" strike="noStrike" cap="none" normalizeH="0" baseline="0" dirty="0" err="1">
+                <a:ln>
+                  <a:noFill/>
+                </a:ln>
+                <a:solidFill>
+                  <a:srgbClr val="1F377F"/>
+                </a:solidFill>
+                <a:effectLst/>
+                <a:latin typeface="Consolas" panose="020B0609020204030204" pitchFamily="49" charset="0"/>
+              </a:rPr>
+              <a:t>mycharptr</a:t>
+            </a:r>
+            <a:r>
+              <a:rPr kumimoji="0" lang="en-US" altLang="en-US" sz="2000" b="0" i="0" u="none" strike="noStrike" cap="none" normalizeH="0" baseline="0" dirty="0">
+                <a:ln>
+                  <a:noFill/>
+                </a:ln>
+                <a:solidFill>
+                  <a:srgbClr val="000000"/>
+                </a:solidFill>
+                <a:effectLst/>
+                <a:latin typeface="Consolas" panose="020B0609020204030204" pitchFamily="49" charset="0"/>
+              </a:rPr>
+              <a:t>) </a:t>
+            </a:r>
+          </a:p>
+          <a:p>
+            <a:pPr marL="0" marR="0" lvl="0" indent="0" algn="l" defTabSz="914400" rtl="0" eaLnBrk="0" fontAlgn="base" latinLnBrk="0" hangingPunct="0">
+              <a:lnSpc>
+                <a:spcPct val="100000"/>
+              </a:lnSpc>
+              <a:spcBef>
+                <a:spcPct val="0"/>
+              </a:spcBef>
+              <a:spcAft>
+                <a:spcPct val="0"/>
+              </a:spcAft>
+              <a:buClrTx/>
+              <a:buSzTx/>
+              <a:buFontTx/>
+              <a:buNone/>
+              <a:tabLst/>
+            </a:pPr>
+            <a:r>
+              <a:rPr lang="en-US" altLang="en-US" sz="2000" dirty="0">
+                <a:solidFill>
+                  <a:srgbClr val="000000"/>
+                </a:solidFill>
+                <a:latin typeface="Consolas" panose="020B0609020204030204" pitchFamily="49" charset="0"/>
+              </a:rPr>
+              <a:t>           </a:t>
+            </a:r>
+            <a:r>
+              <a:rPr kumimoji="0" lang="en-US" altLang="en-US" sz="2000" b="0" i="0" u="none" strike="noStrike" cap="none" normalizeH="0" baseline="0" dirty="0">
+                <a:ln>
+                  <a:noFill/>
+                </a:ln>
+                <a:solidFill>
+                  <a:srgbClr val="008080"/>
+                </a:solidFill>
+                <a:effectLst/>
+                <a:latin typeface="Consolas" panose="020B0609020204030204" pitchFamily="49" charset="0"/>
+              </a:rPr>
+              <a:t>&lt;&lt;</a:t>
+            </a:r>
+            <a:r>
+              <a:rPr kumimoji="0" lang="en-US" altLang="en-US" sz="2000" b="0" i="0" u="none" strike="noStrike" cap="none" normalizeH="0" baseline="0" dirty="0">
+                <a:ln>
+                  <a:noFill/>
+                </a:ln>
+                <a:solidFill>
+                  <a:srgbClr val="000000"/>
+                </a:solidFill>
+                <a:effectLst/>
+                <a:latin typeface="Consolas" panose="020B0609020204030204" pitchFamily="49" charset="0"/>
+              </a:rPr>
+              <a:t>std::</a:t>
+            </a:r>
+            <a:r>
+              <a:rPr kumimoji="0" lang="en-US" altLang="en-US" sz="2000" b="0" i="0" u="none" strike="noStrike" cap="none" normalizeH="0" baseline="0" dirty="0">
+                <a:ln>
+                  <a:noFill/>
+                </a:ln>
+                <a:solidFill>
+                  <a:srgbClr val="74531F"/>
+                </a:solidFill>
+                <a:effectLst/>
+                <a:latin typeface="Consolas" panose="020B0609020204030204" pitchFamily="49" charset="0"/>
+              </a:rPr>
+              <a:t>endl</a:t>
+            </a:r>
+            <a:r>
+              <a:rPr kumimoji="0" lang="en-US" altLang="en-US" sz="2000" b="0" i="0" u="none" strike="noStrike" cap="none" normalizeH="0" baseline="0" dirty="0">
+                <a:ln>
+                  <a:noFill/>
+                </a:ln>
+                <a:solidFill>
+                  <a:srgbClr val="000000"/>
+                </a:solidFill>
+                <a:effectLst/>
+                <a:latin typeface="Consolas" panose="020B0609020204030204" pitchFamily="49" charset="0"/>
+              </a:rPr>
+              <a:t>;</a:t>
+            </a:r>
+          </a:p>
+          <a:p>
+            <a:pPr marL="0" marR="0" lvl="0" indent="0" algn="l" defTabSz="914400" rtl="0" eaLnBrk="0" fontAlgn="base" latinLnBrk="0" hangingPunct="0">
+              <a:lnSpc>
+                <a:spcPct val="100000"/>
+              </a:lnSpc>
+              <a:spcBef>
+                <a:spcPct val="0"/>
+              </a:spcBef>
+              <a:spcAft>
+                <a:spcPct val="0"/>
+              </a:spcAft>
+              <a:buClrTx/>
+              <a:buSzTx/>
+              <a:buFontTx/>
+              <a:buNone/>
+              <a:tabLst/>
+            </a:pPr>
+            <a:r>
+              <a:rPr kumimoji="0" lang="en-US" altLang="en-US" sz="2000" b="0" i="0" u="none" strike="noStrike" cap="none" normalizeH="0" baseline="0" dirty="0">
+                <a:ln>
+                  <a:noFill/>
+                </a:ln>
+                <a:solidFill>
+                  <a:srgbClr val="000000"/>
+                </a:solidFill>
+                <a:effectLst/>
+                <a:latin typeface="Consolas" panose="020B0609020204030204" pitchFamily="49" charset="0"/>
+              </a:rPr>
+              <a:t> </a:t>
+            </a:r>
+          </a:p>
+          <a:p>
+            <a:pPr marL="0" marR="0" lvl="0" indent="0" algn="l" defTabSz="914400" rtl="0" eaLnBrk="0" fontAlgn="base" latinLnBrk="0" hangingPunct="0">
+              <a:lnSpc>
+                <a:spcPct val="100000"/>
+              </a:lnSpc>
+              <a:spcBef>
+                <a:spcPct val="0"/>
+              </a:spcBef>
+              <a:spcAft>
+                <a:spcPct val="0"/>
+              </a:spcAft>
+              <a:buClrTx/>
+              <a:buSzTx/>
+              <a:buFontTx/>
+              <a:buNone/>
+              <a:tabLst/>
+            </a:pPr>
+            <a:r>
+              <a:rPr kumimoji="0" lang="en-US" altLang="en-US" sz="2000" b="0" i="0" u="none" strike="noStrike" cap="none" normalizeH="0" baseline="0" dirty="0">
+                <a:ln>
+                  <a:noFill/>
+                </a:ln>
+                <a:solidFill>
+                  <a:srgbClr val="000000"/>
+                </a:solidFill>
+                <a:effectLst/>
+                <a:latin typeface="Consolas" panose="020B0609020204030204" pitchFamily="49" charset="0"/>
+              </a:rPr>
+              <a:t> std::cout </a:t>
+            </a:r>
+            <a:r>
+              <a:rPr kumimoji="0" lang="en-US" altLang="en-US" sz="2000" b="0" i="0" u="none" strike="noStrike" cap="none" normalizeH="0" baseline="0" dirty="0">
+                <a:ln>
+                  <a:noFill/>
+                </a:ln>
+                <a:solidFill>
+                  <a:srgbClr val="008080"/>
+                </a:solidFill>
+                <a:effectLst/>
+                <a:latin typeface="Consolas" panose="020B0609020204030204" pitchFamily="49" charset="0"/>
+              </a:rPr>
+              <a:t>&lt;&lt;</a:t>
+            </a:r>
+            <a:r>
+              <a:rPr kumimoji="0" lang="en-US" altLang="en-US" sz="2000" b="0" i="0" u="none" strike="noStrike" cap="none" normalizeH="0" baseline="0" dirty="0">
+                <a:ln>
+                  <a:noFill/>
+                </a:ln>
+                <a:solidFill>
+                  <a:srgbClr val="000000"/>
+                </a:solidFill>
+                <a:effectLst/>
+                <a:latin typeface="Consolas" panose="020B0609020204030204" pitchFamily="49" charset="0"/>
+              </a:rPr>
+              <a:t> </a:t>
+            </a:r>
+            <a:r>
+              <a:rPr kumimoji="0" lang="en-US" altLang="en-US" sz="2000" b="0" i="0" u="none" strike="noStrike" cap="none" normalizeH="0" baseline="0" dirty="0">
+                <a:ln>
+                  <a:noFill/>
+                </a:ln>
+                <a:solidFill>
+                  <a:srgbClr val="E21F1F"/>
+                </a:solidFill>
+                <a:effectLst/>
+                <a:latin typeface="Consolas" panose="020B0609020204030204" pitchFamily="49" charset="0"/>
+              </a:rPr>
+              <a:t>"</a:t>
+            </a:r>
+            <a:r>
+              <a:rPr kumimoji="0" lang="en-US" altLang="en-US" sz="2000" b="0" i="0" u="none" strike="noStrike" cap="none" normalizeH="0" baseline="0" dirty="0">
+                <a:ln>
+                  <a:noFill/>
+                </a:ln>
+                <a:solidFill>
+                  <a:srgbClr val="A31515"/>
+                </a:solidFill>
+                <a:effectLst/>
+                <a:latin typeface="Consolas" panose="020B0609020204030204" pitchFamily="49" charset="0"/>
+              </a:rPr>
+              <a:t>The integer value is: </a:t>
+            </a:r>
+            <a:r>
+              <a:rPr kumimoji="0" lang="en-US" altLang="en-US" sz="2000" b="0" i="0" u="none" strike="noStrike" cap="none" normalizeH="0" baseline="0" dirty="0">
+                <a:ln>
+                  <a:noFill/>
+                </a:ln>
+                <a:solidFill>
+                  <a:srgbClr val="E21F1F"/>
+                </a:solidFill>
+                <a:effectLst/>
+                <a:latin typeface="Consolas" panose="020B0609020204030204" pitchFamily="49" charset="0"/>
+              </a:rPr>
+              <a:t>"</a:t>
+            </a:r>
+            <a:r>
+              <a:rPr kumimoji="0" lang="en-US" altLang="en-US" sz="2000" b="0" i="0" u="none" strike="noStrike" cap="none" normalizeH="0" baseline="0" dirty="0">
+                <a:ln>
+                  <a:noFill/>
+                </a:ln>
+                <a:solidFill>
+                  <a:srgbClr val="000000"/>
+                </a:solidFill>
+                <a:effectLst/>
+                <a:latin typeface="Consolas" panose="020B0609020204030204" pitchFamily="49" charset="0"/>
+              </a:rPr>
+              <a:t> </a:t>
+            </a:r>
+            <a:r>
+              <a:rPr kumimoji="0" lang="en-US" altLang="en-US" sz="2000" b="0" i="0" u="none" strike="noStrike" cap="none" normalizeH="0" baseline="0" dirty="0">
+                <a:ln>
+                  <a:noFill/>
+                </a:ln>
+                <a:solidFill>
+                  <a:srgbClr val="008080"/>
+                </a:solidFill>
+                <a:effectLst/>
+                <a:latin typeface="Consolas" panose="020B0609020204030204" pitchFamily="49" charset="0"/>
+              </a:rPr>
+              <a:t>&lt;&lt;</a:t>
+            </a:r>
+            <a:r>
+              <a:rPr kumimoji="0" lang="en-US" altLang="en-US" sz="2000" b="0" i="0" u="none" strike="noStrike" cap="none" normalizeH="0" baseline="0" dirty="0">
+                <a:ln>
+                  <a:noFill/>
+                </a:ln>
+                <a:solidFill>
+                  <a:srgbClr val="000000"/>
+                </a:solidFill>
+                <a:effectLst/>
+                <a:latin typeface="Consolas" panose="020B0609020204030204" pitchFamily="49" charset="0"/>
+              </a:rPr>
+              <a:t> *</a:t>
+            </a:r>
+            <a:r>
+              <a:rPr kumimoji="0" lang="en-US" altLang="en-US" sz="2000" b="0" i="0" u="none" strike="noStrike" cap="none" normalizeH="0" baseline="0" dirty="0" err="1">
+                <a:ln>
+                  <a:noFill/>
+                </a:ln>
+                <a:solidFill>
+                  <a:srgbClr val="1F377F"/>
+                </a:solidFill>
+                <a:effectLst/>
+                <a:latin typeface="Consolas" panose="020B0609020204030204" pitchFamily="49" charset="0"/>
+              </a:rPr>
+              <a:t>myintptr</a:t>
+            </a:r>
+            <a:r>
+              <a:rPr kumimoji="0" lang="en-US" altLang="en-US" sz="2000" b="0" i="0" u="none" strike="noStrike" cap="none" normalizeH="0" baseline="0" dirty="0">
+                <a:ln>
+                  <a:noFill/>
+                </a:ln>
+                <a:solidFill>
+                  <a:srgbClr val="000000"/>
+                </a:solidFill>
+                <a:effectLst/>
+                <a:latin typeface="Consolas" panose="020B0609020204030204" pitchFamily="49" charset="0"/>
+              </a:rPr>
+              <a:t> </a:t>
+            </a:r>
+          </a:p>
+          <a:p>
+            <a:pPr marL="0" marR="0" lvl="0" indent="0" algn="l" defTabSz="914400" rtl="0" eaLnBrk="0" fontAlgn="base" latinLnBrk="0" hangingPunct="0">
+              <a:lnSpc>
+                <a:spcPct val="100000"/>
+              </a:lnSpc>
+              <a:spcBef>
+                <a:spcPct val="0"/>
+              </a:spcBef>
+              <a:spcAft>
+                <a:spcPct val="0"/>
+              </a:spcAft>
+              <a:buClrTx/>
+              <a:buSzTx/>
+              <a:buFontTx/>
+              <a:buNone/>
+              <a:tabLst/>
+            </a:pPr>
+            <a:r>
+              <a:rPr lang="en-US" altLang="en-US" sz="2000" dirty="0">
+                <a:solidFill>
+                  <a:srgbClr val="000000"/>
+                </a:solidFill>
+                <a:latin typeface="Consolas" panose="020B0609020204030204" pitchFamily="49" charset="0"/>
+              </a:rPr>
+              <a:t>           </a:t>
+            </a:r>
+            <a:r>
+              <a:rPr kumimoji="0" lang="en-US" altLang="en-US" sz="2000" b="0" i="0" u="none" strike="noStrike" cap="none" normalizeH="0" baseline="0" dirty="0">
+                <a:ln>
+                  <a:noFill/>
+                </a:ln>
+                <a:solidFill>
+                  <a:srgbClr val="008080"/>
+                </a:solidFill>
+                <a:effectLst/>
+                <a:latin typeface="Consolas" panose="020B0609020204030204" pitchFamily="49" charset="0"/>
+              </a:rPr>
+              <a:t>&lt;&lt;</a:t>
+            </a:r>
+            <a:r>
+              <a:rPr kumimoji="0" lang="en-US" altLang="en-US" sz="2000" b="0" i="0" u="none" strike="noStrike" cap="none" normalizeH="0" baseline="0" dirty="0">
+                <a:ln>
+                  <a:noFill/>
+                </a:ln>
+                <a:solidFill>
+                  <a:srgbClr val="000000"/>
+                </a:solidFill>
+                <a:effectLst/>
+                <a:latin typeface="Consolas" panose="020B0609020204030204" pitchFamily="49" charset="0"/>
+              </a:rPr>
+              <a:t> </a:t>
+            </a:r>
+            <a:r>
+              <a:rPr kumimoji="0" lang="en-US" altLang="en-US" sz="2000" b="0" i="0" u="none" strike="noStrike" cap="none" normalizeH="0" baseline="0" dirty="0">
+                <a:ln>
+                  <a:noFill/>
+                </a:ln>
+                <a:solidFill>
+                  <a:srgbClr val="E21F1F"/>
+                </a:solidFill>
+                <a:effectLst/>
+                <a:latin typeface="Consolas" panose="020B0609020204030204" pitchFamily="49" charset="0"/>
+              </a:rPr>
+              <a:t>"</a:t>
+            </a:r>
+            <a:r>
+              <a:rPr kumimoji="0" lang="en-US" altLang="en-US" sz="2000" b="0" i="0" u="none" strike="noStrike" cap="none" normalizeH="0" baseline="0" dirty="0">
+                <a:ln>
+                  <a:noFill/>
+                </a:ln>
+                <a:solidFill>
+                  <a:srgbClr val="A31515"/>
+                </a:solidFill>
+                <a:effectLst/>
+                <a:latin typeface="Consolas" panose="020B0609020204030204" pitchFamily="49" charset="0"/>
+              </a:rPr>
+              <a:t>. The address is: </a:t>
+            </a:r>
+            <a:r>
+              <a:rPr kumimoji="0" lang="en-US" altLang="en-US" sz="2000" b="0" i="0" u="none" strike="noStrike" cap="none" normalizeH="0" baseline="0" dirty="0">
+                <a:ln>
+                  <a:noFill/>
+                </a:ln>
+                <a:solidFill>
+                  <a:srgbClr val="E21F1F"/>
+                </a:solidFill>
+                <a:effectLst/>
+                <a:latin typeface="Consolas" panose="020B0609020204030204" pitchFamily="49" charset="0"/>
+              </a:rPr>
+              <a:t>"</a:t>
+            </a:r>
+            <a:r>
+              <a:rPr kumimoji="0" lang="en-US" altLang="en-US" sz="2000" b="0" i="0" u="none" strike="noStrike" cap="none" normalizeH="0" baseline="0" dirty="0">
+                <a:ln>
+                  <a:noFill/>
+                </a:ln>
+                <a:solidFill>
+                  <a:srgbClr val="000000"/>
+                </a:solidFill>
+                <a:effectLst/>
+                <a:latin typeface="Consolas" panose="020B0609020204030204" pitchFamily="49" charset="0"/>
+              </a:rPr>
+              <a:t> </a:t>
+            </a:r>
+            <a:r>
+              <a:rPr kumimoji="0" lang="en-US" altLang="en-US" sz="2000" b="0" i="0" u="none" strike="noStrike" cap="none" normalizeH="0" baseline="0" dirty="0">
+                <a:ln>
+                  <a:noFill/>
+                </a:ln>
+                <a:solidFill>
+                  <a:srgbClr val="008080"/>
+                </a:solidFill>
+                <a:effectLst/>
+                <a:latin typeface="Consolas" panose="020B0609020204030204" pitchFamily="49" charset="0"/>
+              </a:rPr>
+              <a:t>&lt;&lt;</a:t>
+            </a:r>
+            <a:r>
+              <a:rPr kumimoji="0" lang="en-US" altLang="en-US" sz="2000" b="0" i="0" u="none" strike="noStrike" cap="none" normalizeH="0" baseline="0" dirty="0">
+                <a:ln>
+                  <a:noFill/>
+                </a:ln>
+                <a:solidFill>
+                  <a:srgbClr val="000000"/>
+                </a:solidFill>
+                <a:effectLst/>
+                <a:latin typeface="Consolas" panose="020B0609020204030204" pitchFamily="49" charset="0"/>
+              </a:rPr>
+              <a:t> </a:t>
+            </a:r>
+            <a:r>
+              <a:rPr kumimoji="0" lang="en-US" altLang="en-US" sz="2000" b="0" i="0" u="none" strike="noStrike" cap="none" normalizeH="0" baseline="0" dirty="0" err="1">
+                <a:ln>
+                  <a:noFill/>
+                </a:ln>
+                <a:solidFill>
+                  <a:srgbClr val="1F377F"/>
+                </a:solidFill>
+                <a:effectLst/>
+                <a:latin typeface="Consolas" panose="020B0609020204030204" pitchFamily="49" charset="0"/>
+              </a:rPr>
+              <a:t>myintptr</a:t>
+            </a:r>
+            <a:r>
+              <a:rPr kumimoji="0" lang="en-US" altLang="en-US" sz="2000" b="0" i="0" u="none" strike="noStrike" cap="none" normalizeH="0" baseline="0" dirty="0">
+                <a:ln>
+                  <a:noFill/>
+                </a:ln>
+                <a:solidFill>
+                  <a:srgbClr val="000000"/>
+                </a:solidFill>
+                <a:effectLst/>
+                <a:latin typeface="Consolas" panose="020B0609020204030204" pitchFamily="49" charset="0"/>
+              </a:rPr>
+              <a:t> </a:t>
+            </a:r>
+          </a:p>
+          <a:p>
+            <a:pPr marL="0" marR="0" lvl="0" indent="0" algn="l" defTabSz="914400" rtl="0" eaLnBrk="0" fontAlgn="base" latinLnBrk="0" hangingPunct="0">
+              <a:lnSpc>
+                <a:spcPct val="100000"/>
+              </a:lnSpc>
+              <a:spcBef>
+                <a:spcPct val="0"/>
+              </a:spcBef>
+              <a:spcAft>
+                <a:spcPct val="0"/>
+              </a:spcAft>
+              <a:buClrTx/>
+              <a:buSzTx/>
+              <a:buFontTx/>
+              <a:buNone/>
+              <a:tabLst/>
+            </a:pPr>
+            <a:r>
+              <a:rPr lang="en-US" altLang="en-US" sz="2000" dirty="0">
+                <a:solidFill>
+                  <a:srgbClr val="000000"/>
+                </a:solidFill>
+                <a:latin typeface="Consolas" panose="020B0609020204030204" pitchFamily="49" charset="0"/>
+              </a:rPr>
+              <a:t>           </a:t>
+            </a:r>
+            <a:r>
+              <a:rPr kumimoji="0" lang="en-US" altLang="en-US" sz="2000" b="0" i="0" u="none" strike="noStrike" cap="none" normalizeH="0" baseline="0" dirty="0">
+                <a:ln>
+                  <a:noFill/>
+                </a:ln>
+                <a:solidFill>
+                  <a:srgbClr val="008080"/>
+                </a:solidFill>
+                <a:effectLst/>
+                <a:latin typeface="Consolas" panose="020B0609020204030204" pitchFamily="49" charset="0"/>
+              </a:rPr>
+              <a:t>&lt;&lt;</a:t>
+            </a:r>
+            <a:r>
+              <a:rPr kumimoji="0" lang="en-US" altLang="en-US" sz="2000" b="0" i="0" u="none" strike="noStrike" cap="none" normalizeH="0" baseline="0" dirty="0">
+                <a:ln>
+                  <a:noFill/>
+                </a:ln>
+                <a:solidFill>
+                  <a:srgbClr val="000000"/>
+                </a:solidFill>
+                <a:effectLst/>
+                <a:latin typeface="Consolas" panose="020B0609020204030204" pitchFamily="49" charset="0"/>
+              </a:rPr>
+              <a:t> std::</a:t>
+            </a:r>
+            <a:r>
+              <a:rPr kumimoji="0" lang="en-US" altLang="en-US" sz="2000" b="0" i="0" u="none" strike="noStrike" cap="none" normalizeH="0" baseline="0" dirty="0">
+                <a:ln>
+                  <a:noFill/>
+                </a:ln>
+                <a:solidFill>
+                  <a:srgbClr val="74531F"/>
+                </a:solidFill>
+                <a:effectLst/>
+                <a:latin typeface="Consolas" panose="020B0609020204030204" pitchFamily="49" charset="0"/>
+              </a:rPr>
+              <a:t>endl</a:t>
+            </a:r>
+            <a:r>
+              <a:rPr kumimoji="0" lang="en-US" altLang="en-US" sz="2000" b="0" i="0" u="none" strike="noStrike" cap="none" normalizeH="0" baseline="0" dirty="0">
+                <a:ln>
+                  <a:noFill/>
+                </a:ln>
+                <a:solidFill>
+                  <a:srgbClr val="000000"/>
+                </a:solidFill>
+                <a:effectLst/>
+                <a:latin typeface="Consolas" panose="020B0609020204030204" pitchFamily="49" charset="0"/>
+              </a:rPr>
+              <a:t>; </a:t>
+            </a:r>
+          </a:p>
+          <a:p>
+            <a:pPr marL="0" marR="0" lvl="0" indent="0" algn="l" defTabSz="914400" rtl="0" eaLnBrk="0" fontAlgn="base" latinLnBrk="0" hangingPunct="0">
+              <a:lnSpc>
+                <a:spcPct val="100000"/>
+              </a:lnSpc>
+              <a:spcBef>
+                <a:spcPct val="0"/>
+              </a:spcBef>
+              <a:spcAft>
+                <a:spcPct val="0"/>
+              </a:spcAft>
+              <a:buClrTx/>
+              <a:buSzTx/>
+              <a:buFontTx/>
+              <a:buNone/>
+              <a:tabLst/>
+            </a:pPr>
+            <a:r>
+              <a:rPr kumimoji="0" lang="en-US" altLang="en-US" sz="2000" b="0" i="0" u="none" strike="noStrike" cap="none" normalizeH="0" baseline="0" dirty="0">
+                <a:ln>
+                  <a:noFill/>
+                </a:ln>
+                <a:solidFill>
+                  <a:srgbClr val="8F08C4"/>
+                </a:solidFill>
+                <a:effectLst/>
+                <a:latin typeface="Consolas" panose="020B0609020204030204" pitchFamily="49" charset="0"/>
+              </a:rPr>
+              <a:t> return</a:t>
+            </a:r>
+            <a:r>
+              <a:rPr kumimoji="0" lang="en-US" altLang="en-US" sz="2000" b="0" i="0" u="none" strike="noStrike" cap="none" normalizeH="0" baseline="0" dirty="0">
+                <a:ln>
+                  <a:noFill/>
+                </a:ln>
+                <a:solidFill>
+                  <a:srgbClr val="000000"/>
+                </a:solidFill>
+                <a:effectLst/>
+                <a:latin typeface="Consolas" panose="020B0609020204030204" pitchFamily="49" charset="0"/>
+              </a:rPr>
+              <a:t> 0; </a:t>
+            </a:r>
+          </a:p>
+          <a:p>
+            <a:pPr marL="0" marR="0" lvl="0" indent="0" algn="l" defTabSz="914400" rtl="0" eaLnBrk="0" fontAlgn="base" latinLnBrk="0" hangingPunct="0">
+              <a:lnSpc>
+                <a:spcPct val="100000"/>
+              </a:lnSpc>
+              <a:spcBef>
+                <a:spcPct val="0"/>
+              </a:spcBef>
+              <a:spcAft>
+                <a:spcPct val="0"/>
+              </a:spcAft>
+              <a:buClrTx/>
+              <a:buSzTx/>
+              <a:buFontTx/>
+              <a:buNone/>
+              <a:tabLst/>
+            </a:pPr>
+            <a:r>
+              <a:rPr lang="en-US" altLang="en-US" sz="2000" dirty="0">
+                <a:solidFill>
+                  <a:srgbClr val="000000"/>
+                </a:solidFill>
+                <a:latin typeface="Consolas" panose="020B0609020204030204" pitchFamily="49" charset="0"/>
+              </a:rPr>
+              <a:t>}</a:t>
+            </a:r>
+            <a:endParaRPr kumimoji="0" lang="en-US" altLang="en-US" sz="4800" b="0" i="0" u="none" strike="noStrike" cap="none" normalizeH="0" baseline="0" dirty="0">
+              <a:ln>
+                <a:noFill/>
+              </a:ln>
+              <a:solidFill>
+                <a:schemeClr val="tx1"/>
+              </a:solidFill>
+              <a:effectLst/>
+              <a:latin typeface="Arial" panose="020B0604020202020204" pitchFamily="34" charset="0"/>
+            </a:endParaRPr>
+          </a:p>
+        </p:txBody>
+      </p:sp>
+    </p:spTree>
+    <p:extLst>
+      <p:ext uri="{BB962C8B-B14F-4D97-AF65-F5344CB8AC3E}">
+        <p14:creationId xmlns:p14="http://schemas.microsoft.com/office/powerpoint/2010/main" val="3432582783"/>
+      </p:ext>
+    </p:extLst>
+  </p:cSld>
+  <p:clrMapOvr>
+    <a:masterClrMapping/>
+  </p:clrMapOvr>
+</p:sld>
+</file>
+
+<file path=ppt/slides/slide9.xml><?xml version="1.0" encoding="utf-8"?>
+<p:sld xmlns:a="http://schemas.openxmlformats.org/drawingml/2006/main" xmlns:r="http://schemas.openxmlformats.org/officeDocument/2006/relationships" xmlns:p="http://schemas.openxmlformats.org/presentationml/2006/main">
+  <p:cSld>
+    <p:spTree>
+      <p:nvGrpSpPr>
+        <p:cNvPr id="1" name=""/>
+        <p:cNvGrpSpPr/>
+        <p:nvPr/>
+      </p:nvGrpSpPr>
+      <p:grpSpPr>
+        <a:xfrm>
+          <a:off x="0" y="0"/>
+          <a:ext cx="0" cy="0"/>
+          <a:chOff x="0" y="0"/>
+          <a:chExt cx="0" cy="0"/>
+        </a:xfrm>
+      </p:grpSpPr>
+      <p:sp>
+        <p:nvSpPr>
+          <p:cNvPr id="2" name="Title 1">
+            <a:extLst>
+              <a:ext uri="{FF2B5EF4-FFF2-40B4-BE49-F238E27FC236}">
+                <a16:creationId xmlns:a16="http://schemas.microsoft.com/office/drawing/2014/main" id="{370A12F9-281C-46C8-AE2C-15D1910958B0}"/>
+              </a:ext>
+            </a:extLst>
+          </p:cNvPr>
+          <p:cNvSpPr>
+            <a:spLocks noGrp="1"/>
+          </p:cNvSpPr>
+          <p:nvPr>
+            <p:ph type="title"/>
+          </p:nvPr>
+        </p:nvSpPr>
+        <p:spPr/>
+        <p:txBody>
+          <a:bodyPr/>
+          <a:lstStyle/>
+          <a:p>
+            <a:r>
+              <a:rPr lang="en-US" dirty="0"/>
+              <a:t>Pointers in C++</a:t>
+            </a:r>
+          </a:p>
+        </p:txBody>
+      </p:sp>
+      <p:sp>
+        <p:nvSpPr>
+          <p:cNvPr id="3" name="Content Placeholder 2">
+            <a:extLst>
+              <a:ext uri="{FF2B5EF4-FFF2-40B4-BE49-F238E27FC236}">
+                <a16:creationId xmlns:a16="http://schemas.microsoft.com/office/drawing/2014/main" id="{2C06C73B-97C8-4203-B063-FF8DC01B180D}"/>
+              </a:ext>
+            </a:extLst>
+          </p:cNvPr>
+          <p:cNvSpPr>
+            <a:spLocks noGrp="1"/>
+          </p:cNvSpPr>
+          <p:nvPr>
+            <p:ph idx="1"/>
+          </p:nvPr>
+        </p:nvSpPr>
+        <p:spPr>
+          <a:xfrm>
+            <a:off x="1371600" y="1638300"/>
+            <a:ext cx="9601200" cy="4796790"/>
+          </a:xfrm>
+        </p:spPr>
+        <p:txBody>
+          <a:bodyPr>
+            <a:normAutofit/>
+          </a:bodyPr>
+          <a:lstStyle/>
+          <a:p>
+            <a:pPr>
+              <a:lnSpc>
+                <a:spcPct val="150000"/>
+              </a:lnSpc>
+            </a:pPr>
+            <a:r>
+              <a:rPr lang="en-US" altLang="en-US" dirty="0">
+                <a:solidFill>
+                  <a:schemeClr val="tx1"/>
+                </a:solidFill>
+              </a:rPr>
+              <a:t>What is </a:t>
+            </a:r>
+            <a:r>
+              <a:rPr lang="en-US" altLang="en-US" dirty="0" err="1">
+                <a:solidFill>
+                  <a:srgbClr val="0000FF"/>
+                </a:solidFill>
+                <a:latin typeface="Consolas" panose="020B0609020204030204" pitchFamily="49" charset="0"/>
+              </a:rPr>
+              <a:t>static_cast</a:t>
+            </a:r>
+            <a:r>
+              <a:rPr lang="en-US" altLang="en-US" dirty="0">
+                <a:solidFill>
+                  <a:srgbClr val="000000"/>
+                </a:solidFill>
+                <a:latin typeface="Consolas" panose="020B0609020204030204" pitchFamily="49" charset="0"/>
+              </a:rPr>
+              <a:t>&lt;</a:t>
+            </a:r>
+            <a:r>
+              <a:rPr lang="en-US" altLang="en-US" dirty="0">
+                <a:solidFill>
+                  <a:srgbClr val="0000FF"/>
+                </a:solidFill>
+                <a:latin typeface="Consolas" panose="020B0609020204030204" pitchFamily="49" charset="0"/>
+              </a:rPr>
+              <a:t>void</a:t>
+            </a:r>
+            <a:r>
+              <a:rPr lang="en-US" altLang="en-US" dirty="0">
+                <a:solidFill>
+                  <a:srgbClr val="000000"/>
+                </a:solidFill>
+                <a:latin typeface="Consolas" panose="020B0609020204030204" pitchFamily="49" charset="0"/>
+              </a:rPr>
+              <a:t>*&gt;(</a:t>
+            </a:r>
+            <a:r>
+              <a:rPr lang="en-US" altLang="en-US" dirty="0" err="1">
+                <a:solidFill>
+                  <a:srgbClr val="1F377F"/>
+                </a:solidFill>
+                <a:latin typeface="Consolas" panose="020B0609020204030204" pitchFamily="49" charset="0"/>
+              </a:rPr>
+              <a:t>mycharptr</a:t>
+            </a:r>
+            <a:r>
+              <a:rPr lang="en-US" altLang="en-US" dirty="0">
+                <a:solidFill>
+                  <a:srgbClr val="000000"/>
+                </a:solidFill>
+                <a:latin typeface="Consolas" panose="020B0609020204030204" pitchFamily="49" charset="0"/>
+              </a:rPr>
+              <a:t>)</a:t>
+            </a:r>
+            <a:r>
+              <a:rPr lang="en-US" altLang="en-US" dirty="0">
+                <a:solidFill>
+                  <a:srgbClr val="000000"/>
+                </a:solidFill>
+              </a:rPr>
+              <a:t>?</a:t>
+            </a:r>
+          </a:p>
+          <a:p>
+            <a:pPr>
+              <a:lnSpc>
+                <a:spcPct val="150000"/>
+              </a:lnSpc>
+            </a:pPr>
+            <a:r>
+              <a:rPr lang="en-US" dirty="0"/>
+              <a:t>When taking the address of </a:t>
+            </a:r>
+            <a:r>
+              <a:rPr lang="en-US" dirty="0" err="1">
+                <a:latin typeface="Consolas" panose="020B0609020204030204" pitchFamily="49" charset="0"/>
+              </a:rPr>
+              <a:t>mycharptr</a:t>
+            </a:r>
+            <a:r>
+              <a:rPr lang="en-US" dirty="0"/>
+              <a:t> , you get </a:t>
+            </a:r>
+            <a:r>
+              <a:rPr lang="en-US" dirty="0">
+                <a:latin typeface="Consolas" panose="020B0609020204030204" pitchFamily="49" charset="0"/>
+              </a:rPr>
+              <a:t>char*. </a:t>
+            </a:r>
+            <a:r>
+              <a:rPr lang="en-US" dirty="0"/>
+              <a:t>The operator </a:t>
+            </a:r>
+            <a:r>
+              <a:rPr lang="en-US" dirty="0">
+                <a:latin typeface="Consolas" panose="020B0609020204030204" pitchFamily="49" charset="0"/>
+              </a:rPr>
+              <a:t>&lt;&lt;</a:t>
+            </a:r>
+            <a:r>
+              <a:rPr lang="en-US" dirty="0"/>
+              <a:t> interprets that as a C string, and attempts to display a character sequence instead of the address</a:t>
+            </a:r>
+          </a:p>
+          <a:p>
+            <a:pPr>
+              <a:lnSpc>
+                <a:spcPct val="150000"/>
+              </a:lnSpc>
+            </a:pPr>
+            <a:r>
+              <a:rPr lang="en-US" altLang="en-US" dirty="0">
+                <a:solidFill>
+                  <a:srgbClr val="000000"/>
+                </a:solidFill>
+              </a:rPr>
+              <a:t>That was needed only to display the address correctly but the underlying address is there to be used as normal </a:t>
+            </a:r>
+          </a:p>
+          <a:p>
+            <a:pPr>
+              <a:lnSpc>
+                <a:spcPct val="150000"/>
+              </a:lnSpc>
+            </a:pPr>
+            <a:r>
+              <a:rPr lang="en-US" dirty="0"/>
+              <a:t>Unlikely you’ll need this knowledge soon so don’t get bogged down with it</a:t>
+            </a:r>
+          </a:p>
+          <a:p>
+            <a:pPr marL="0" indent="0">
+              <a:lnSpc>
+                <a:spcPct val="150000"/>
+              </a:lnSpc>
+              <a:buNone/>
+            </a:pPr>
+            <a:endParaRPr lang="en-US" dirty="0"/>
+          </a:p>
+          <a:p>
+            <a:pPr>
+              <a:lnSpc>
+                <a:spcPct val="150000"/>
+              </a:lnSpc>
+            </a:pPr>
+            <a:endParaRPr lang="en-US" dirty="0"/>
+          </a:p>
+          <a:p>
+            <a:pPr>
+              <a:lnSpc>
+                <a:spcPct val="150000"/>
+              </a:lnSpc>
+            </a:pPr>
+            <a:endParaRPr lang="en-US" dirty="0"/>
+          </a:p>
+          <a:p>
+            <a:pPr>
+              <a:lnSpc>
+                <a:spcPct val="150000"/>
+              </a:lnSpc>
+            </a:pPr>
+            <a:endParaRPr lang="en-US" dirty="0"/>
+          </a:p>
+        </p:txBody>
+      </p:sp>
+    </p:spTree>
+    <p:extLst>
+      <p:ext uri="{BB962C8B-B14F-4D97-AF65-F5344CB8AC3E}">
+        <p14:creationId xmlns:p14="http://schemas.microsoft.com/office/powerpoint/2010/main" val="3325614049"/>
       </p:ext>
     </p:extLst>
   </p:cSld>

</xml_diff>